<commit_message>
Updates SME resume review training powerpoints. [Amends #88]
</commit_message>
<xml_diff>
--- a/toolkit/phone-assessment-interviews/phone-interview-training-presentation.pptx
+++ b/toolkit/phone-assessment-interviews/phone-interview-training-presentation.pptx
@@ -1,14 +1,14 @@
 
 <file path=ppt/presentation.xml><?xml version="1.0" encoding="utf-8"?>
-<p:presentation xmlns:a="http://schemas.openxmlformats.org/drawingml/2006/main" xmlns:r="http://schemas.openxmlformats.org/officeDocument/2006/relationships" xmlns:p="http://schemas.openxmlformats.org/presentationml/2006/main" showSpecialPlsOnTitleSld="0" strictFirstAndLastChars="0" embedTrueTypeFonts="1" autoCompressPictures="0">
+<p:presentation xmlns:a="http://schemas.openxmlformats.org/drawingml/2006/main" xmlns:r="http://schemas.openxmlformats.org/officeDocument/2006/relationships" xmlns:p="http://schemas.openxmlformats.org/presentationml/2006/main" showSpecialPlsOnTitleSld="0" strictFirstAndLastChars="0" embedTrueTypeFonts="1" saveSubsetFonts="1" autoCompressPictures="0">
   <p:sldMasterIdLst>
     <p:sldMasterId id="2147483666" r:id="rId1"/>
   </p:sldMasterIdLst>
   <p:notesMasterIdLst>
-    <p:notesMasterId r:id="rId28"/>
+    <p:notesMasterId r:id="rId26"/>
   </p:notesMasterIdLst>
   <p:handoutMasterIdLst>
-    <p:handoutMasterId r:id="rId29"/>
+    <p:handoutMasterId r:id="rId27"/>
   </p:handoutMasterIdLst>
   <p:sldIdLst>
     <p:sldId id="256" r:id="rId2"/>
@@ -18,54 +18,52 @@
     <p:sldId id="345" r:id="rId6"/>
     <p:sldId id="298" r:id="rId7"/>
     <p:sldId id="346" r:id="rId8"/>
-    <p:sldId id="358" r:id="rId9"/>
+    <p:sldId id="347" r:id="rId9"/>
     <p:sldId id="348" r:id="rId10"/>
-    <p:sldId id="347" r:id="rId11"/>
-    <p:sldId id="364" r:id="rId12"/>
-    <p:sldId id="349" r:id="rId13"/>
-    <p:sldId id="350" r:id="rId14"/>
-    <p:sldId id="338" r:id="rId15"/>
-    <p:sldId id="352" r:id="rId16"/>
-    <p:sldId id="353" r:id="rId17"/>
-    <p:sldId id="354" r:id="rId18"/>
-    <p:sldId id="361" r:id="rId19"/>
-    <p:sldId id="359" r:id="rId20"/>
-    <p:sldId id="355" r:id="rId21"/>
-    <p:sldId id="281" r:id="rId22"/>
-    <p:sldId id="333" r:id="rId23"/>
-    <p:sldId id="356" r:id="rId24"/>
-    <p:sldId id="357" r:id="rId25"/>
-    <p:sldId id="363" r:id="rId26"/>
-    <p:sldId id="291" r:id="rId27"/>
+    <p:sldId id="349" r:id="rId11"/>
+    <p:sldId id="350" r:id="rId12"/>
+    <p:sldId id="351" r:id="rId13"/>
+    <p:sldId id="338" r:id="rId14"/>
+    <p:sldId id="352" r:id="rId15"/>
+    <p:sldId id="353" r:id="rId16"/>
+    <p:sldId id="354" r:id="rId17"/>
+    <p:sldId id="335" r:id="rId18"/>
+    <p:sldId id="355" r:id="rId19"/>
+    <p:sldId id="281" r:id="rId20"/>
+    <p:sldId id="331" r:id="rId21"/>
+    <p:sldId id="333" r:id="rId22"/>
+    <p:sldId id="356" r:id="rId23"/>
+    <p:sldId id="357" r:id="rId24"/>
+    <p:sldId id="291" r:id="rId25"/>
   </p:sldIdLst>
   <p:sldSz cx="17340263" cy="9753600"/>
   <p:notesSz cx="6881813" cy="9296400"/>
   <p:embeddedFontLst>
     <p:embeddedFont>
       <p:font typeface="Avenir" panose="02000503020000020003" pitchFamily="2" charset="0"/>
-      <p:regular r:id="rId30"/>
-      <p:italic r:id="rId31"/>
+      <p:regular r:id="rId28"/>
+      <p:italic r:id="rId29"/>
     </p:embeddedFont>
     <p:embeddedFont>
       <p:font typeface="Merriweather Sans" pitchFamily="2" charset="77"/>
-      <p:regular r:id="rId32"/>
-      <p:bold r:id="rId33"/>
-      <p:italic r:id="rId34"/>
-      <p:boldItalic r:id="rId35"/>
+      <p:regular r:id="rId30"/>
+      <p:bold r:id="rId31"/>
+      <p:italic r:id="rId32"/>
+      <p:boldItalic r:id="rId33"/>
     </p:embeddedFont>
     <p:embeddedFont>
       <p:font typeface="Rockwell" panose="02060603020205020403" pitchFamily="18" charset="77"/>
-      <p:regular r:id="rId36"/>
-      <p:bold r:id="rId37"/>
-      <p:italic r:id="rId38"/>
-      <p:boldItalic r:id="rId39"/>
+      <p:regular r:id="rId34"/>
+      <p:bold r:id="rId35"/>
+      <p:italic r:id="rId36"/>
+      <p:boldItalic r:id="rId37"/>
     </p:embeddedFont>
     <p:embeddedFont>
       <p:font typeface="Source Sans Pro" panose="020B0503030403020204" pitchFamily="34" charset="0"/>
-      <p:regular r:id="rId40"/>
-      <p:bold r:id="rId41"/>
-      <p:italic r:id="rId42"/>
-      <p:boldItalic r:id="rId43"/>
+      <p:regular r:id="rId38"/>
+      <p:bold r:id="rId39"/>
+      <p:italic r:id="rId40"/>
+      <p:boldItalic r:id="rId41"/>
     </p:embeddedFont>
   </p:embeddedFontLst>
   <p:defaultTextStyle>
@@ -328,154 +326,7 @@
       </p:ext>
     </p:extLst>
   </p:cmAuthor>
-  <p:cmAuthor id="2" name="Microsoft Office User" initials="MOU" lastIdx="15" clrIdx="1">
-    <p:extLst>
-      <p:ext uri="{19B8F6BF-5375-455C-9EA6-DF929625EA0E}">
-        <p15:presenceInfo xmlns:p15="http://schemas.microsoft.com/office/powerpoint/2012/main" userId="Microsoft Office User" providerId="None"/>
-      </p:ext>
-    </p:extLst>
-  </p:cmAuthor>
 </p:cmAuthorLst>
-</file>
-
-<file path=ppt/comments/comment1.xml><?xml version="1.0" encoding="utf-8"?>
-<p:cmLst xmlns:a="http://schemas.openxmlformats.org/drawingml/2006/main" xmlns:r="http://schemas.openxmlformats.org/officeDocument/2006/relationships" xmlns:p="http://schemas.openxmlformats.org/presentationml/2006/main">
-  <p:cm authorId="2" dt="2019-09-25T10:52:33.350" idx="3">
-    <p:pos x="10" y="10"/>
-    <p:text>idea: just jump into the mock interview now. Half the team asks the other half a question and the other half responds. Based on these responses, we adjust the questions/good responses/follow ups. Switch halves for the next question</p:text>
-    <p:extLst>
-      <p:ext uri="{C676402C-5697-4E1C-873F-D02D1690AC5C}">
-        <p15:threadingInfo xmlns:p15="http://schemas.microsoft.com/office/powerpoint/2012/main" timeZoneBias="240"/>
-      </p:ext>
-    </p:extLst>
-  </p:cm>
-  <p:cm authorId="2" dt="2019-09-25T14:18:03.198" idx="14">
-    <p:pos x="106" y="106"/>
-    <p:text>Rename "Ratings Template". I</p:text>
-    <p:extLst>
-      <p:ext uri="{C676402C-5697-4E1C-873F-D02D1690AC5C}">
-        <p15:threadingInfo xmlns:p15="http://schemas.microsoft.com/office/powerpoint/2012/main" timeZoneBias="240"/>
-      </p:ext>
-    </p:extLst>
-  </p:cm>
-  <p:cm authorId="2" dt="2019-09-25T14:19:03.907" idx="15">
-    <p:pos x="106" y="202"/>
-    <p:text>suggestion: Interview Assessment pdf</p:text>
-    <p:extLst>
-      <p:ext uri="{C676402C-5697-4E1C-873F-D02D1690AC5C}">
-        <p15:threadingInfo xmlns:p15="http://schemas.microsoft.com/office/powerpoint/2012/main" timeZoneBias="240">
-          <p15:parentCm authorId="2" idx="14"/>
-        </p15:threadingInfo>
-      </p:ext>
-    </p:extLst>
-  </p:cm>
-</p:cmLst>
-</file>
-
-<file path=ppt/comments/comment2.xml><?xml version="1.0" encoding="utf-8"?>
-<p:cmLst xmlns:a="http://schemas.openxmlformats.org/drawingml/2006/main" xmlns:r="http://schemas.openxmlformats.org/officeDocument/2006/relationships" xmlns:p="http://schemas.openxmlformats.org/presentationml/2006/main">
-  <p:cm authorId="2" dt="2019-09-25T10:52:33.350" idx="3">
-    <p:pos x="10" y="10"/>
-    <p:text>idea: just jump into the mock interview now. Half the team asks the other half a question and the other half responds. Based on these responses, we adjust the questions/good responses/follow ups. Switch halves for the next question</p:text>
-    <p:extLst>
-      <p:ext uri="{C676402C-5697-4E1C-873F-D02D1690AC5C}">
-        <p15:threadingInfo xmlns:p15="http://schemas.microsoft.com/office/powerpoint/2012/main" timeZoneBias="240"/>
-      </p:ext>
-    </p:extLst>
-  </p:cm>
-  <p:cm authorId="2" dt="2019-09-25T11:07:41.298" idx="6">
-    <p:pos x="10" y="106"/>
-    <p:text>Flesh out good responses while we're doing this</p:text>
-    <p:extLst>
-      <p:ext uri="{C676402C-5697-4E1C-873F-D02D1690AC5C}">
-        <p15:threadingInfo xmlns:p15="http://schemas.microsoft.com/office/powerpoint/2012/main" timeZoneBias="240">
-          <p15:parentCm authorId="2" idx="3"/>
-        </p15:threadingInfo>
-      </p:ext>
-    </p:extLst>
-  </p:cm>
-  <p:cm authorId="2" dt="2019-09-25T11:09:08.992" idx="7">
-    <p:pos x="10" y="202"/>
-    <p:text>also, refine "exceeds" level</p:text>
-    <p:extLst>
-      <p:ext uri="{C676402C-5697-4E1C-873F-D02D1690AC5C}">
-        <p15:threadingInfo xmlns:p15="http://schemas.microsoft.com/office/powerpoint/2012/main" timeZoneBias="240">
-          <p15:parentCm authorId="2" idx="3"/>
-        </p15:threadingInfo>
-      </p:ext>
-    </p:extLst>
-  </p:cm>
-</p:cmLst>
-</file>
-
-<file path=ppt/comments/comment3.xml><?xml version="1.0" encoding="utf-8"?>
-<p:cmLst xmlns:a="http://schemas.openxmlformats.org/drawingml/2006/main" xmlns:r="http://schemas.openxmlformats.org/officeDocument/2006/relationships" xmlns:p="http://schemas.openxmlformats.org/presentationml/2006/main">
-  <p:cm authorId="2" dt="2019-09-25T10:55:09.320" idx="4">
-    <p:pos x="10" y="10"/>
-    <p:text>This is no longer true. We are potentially redefining them right now</p:text>
-    <p:extLst>
-      <p:ext uri="{C676402C-5697-4E1C-873F-D02D1690AC5C}">
-        <p15:threadingInfo xmlns:p15="http://schemas.microsoft.com/office/powerpoint/2012/main" timeZoneBias="240"/>
-      </p:ext>
-    </p:extLst>
-  </p:cm>
-</p:cmLst>
-</file>
-
-<file path=ppt/comments/comment4.xml><?xml version="1.0" encoding="utf-8"?>
-<p:cmLst xmlns:a="http://schemas.openxmlformats.org/drawingml/2006/main" xmlns:r="http://schemas.openxmlformats.org/officeDocument/2006/relationships" xmlns:p="http://schemas.openxmlformats.org/presentationml/2006/main">
-  <p:cm authorId="2" dt="2019-09-25T10:55:09.320" idx="4">
-    <p:pos x="10" y="10"/>
-    <p:text>This is no longer true. We are potentially redefining them right now</p:text>
-    <p:extLst>
-      <p:ext uri="{C676402C-5697-4E1C-873F-D02D1690AC5C}">
-        <p15:threadingInfo xmlns:p15="http://schemas.microsoft.com/office/powerpoint/2012/main" timeZoneBias="240"/>
-      </p:ext>
-    </p:extLst>
-  </p:cm>
-</p:cmLst>
-</file>
-
-<file path=ppt/comments/comment5.xml><?xml version="1.0" encoding="utf-8"?>
-<p:cmLst xmlns:a="http://schemas.openxmlformats.org/drawingml/2006/main" xmlns:r="http://schemas.openxmlformats.org/officeDocument/2006/relationships" xmlns:p="http://schemas.openxmlformats.org/presentationml/2006/main">
-  <p:cm authorId="2" dt="2019-09-25T14:11:34.009" idx="13">
-    <p:pos x="10" y="10"/>
-    <p:text>I don't know what "Your transcript and proficiency determination should be aligned" means</p:text>
-    <p:extLst>
-      <p:ext uri="{C676402C-5697-4E1C-873F-D02D1690AC5C}">
-        <p15:threadingInfo xmlns:p15="http://schemas.microsoft.com/office/powerpoint/2012/main" timeZoneBias="240"/>
-      </p:ext>
-    </p:extLst>
-  </p:cm>
-</p:cmLst>
-</file>
-
-<file path=ppt/comments/comment6.xml><?xml version="1.0" encoding="utf-8"?>
-<p:cmLst xmlns:a="http://schemas.openxmlformats.org/drawingml/2006/main" xmlns:r="http://schemas.openxmlformats.org/officeDocument/2006/relationships" xmlns:p="http://schemas.openxmlformats.org/presentationml/2006/main">
-  <p:cm authorId="2" dt="2019-09-25T11:17:27.431" idx="8">
-    <p:pos x="10" y="10"/>
-    <p:text>KILL</p:text>
-    <p:extLst>
-      <p:ext uri="{C676402C-5697-4E1C-873F-D02D1690AC5C}">
-        <p15:threadingInfo xmlns:p15="http://schemas.microsoft.com/office/powerpoint/2012/main" timeZoneBias="240"/>
-      </p:ext>
-    </p:extLst>
-  </p:cm>
-</p:cmLst>
-</file>
-
-<file path=ppt/comments/comment7.xml><?xml version="1.0" encoding="utf-8"?>
-<p:cmLst xmlns:a="http://schemas.openxmlformats.org/drawingml/2006/main" xmlns:r="http://schemas.openxmlformats.org/officeDocument/2006/relationships" xmlns:p="http://schemas.openxmlformats.org/presentationml/2006/main">
-  <p:cm authorId="2" dt="2019-09-25T10:55:09.320" idx="4">
-    <p:pos x="10" y="10"/>
-    <p:text>This is no longer true. We are potentially redefining them right now</p:text>
-    <p:extLst>
-      <p:ext uri="{C676402C-5697-4E1C-873F-D02D1690AC5C}">
-        <p15:threadingInfo xmlns:p15="http://schemas.microsoft.com/office/powerpoint/2012/main" timeZoneBias="240"/>
-      </p:ext>
-    </p:extLst>
-  </p:cm>
-</p:cmLst>
 </file>
 
 <file path=ppt/handoutMasters/handoutMaster1.xml><?xml version="1.0" encoding="utf-8"?>
@@ -572,7 +423,7 @@
           <a:p>
             <a:fld id="{5F1244B9-655E-9143-8F11-143B7EBD7CDE}" type="datetimeFigureOut">
               <a:rPr lang="en-US" smtClean="0"/>
-              <a:t>9/25/19</a:t>
+              <a:t>9/6/19</a:t>
             </a:fld>
             <a:endParaRPr lang="en-US"/>
           </a:p>
@@ -1398,7 +1249,25 @@
           <a:bodyPr/>
           <a:lstStyle/>
           <a:p>
-            <a:pPr marL="457200" marR="0" indent="-228600" algn="l" defTabSz="914400" rtl="0" eaLnBrk="1" fontAlgn="auto" latinLnBrk="0" hangingPunct="1">
+            <a:r>
+              <a:rPr lang="en-US" dirty="0"/>
+              <a:t>This is a good</a:t>
+            </a:r>
+            <a:r>
+              <a:rPr lang="en-US" baseline="0" dirty="0"/>
+              <a:t> example</a:t>
+            </a:r>
+            <a:r>
+              <a:rPr lang="en-US" dirty="0"/>
+              <a:t>.</a:t>
+            </a:r>
+            <a:r>
+              <a:rPr lang="en-US" baseline="0" dirty="0"/>
+              <a:t> Reasons:</a:t>
+            </a:r>
+          </a:p>
+          <a:p>
+            <a:pPr marL="571500" marR="0" indent="-342900" algn="l" defTabSz="914400" rtl="0" eaLnBrk="1" fontAlgn="auto" latinLnBrk="0" hangingPunct="1">
               <a:lnSpc>
                 <a:spcPct val="100000"/>
               </a:lnSpc>
@@ -1412,151 +1281,49 @@
                 <a:srgbClr val="000000"/>
               </a:buClr>
               <a:buSzPts val="1400"/>
-              <a:buFont typeface="Arial"/>
-              <a:buNone/>
+              <a:buFontTx/>
+              <a:buChar char="-"/>
               <a:tabLst/>
               <a:defRPr/>
             </a:pPr>
             <a:r>
-              <a:rPr lang="en-US" sz="2200" b="0" i="0" u="none" strike="noStrike" cap="none" baseline="0" dirty="0">
-                <a:solidFill>
-                  <a:srgbClr val="000000"/>
-                </a:solidFill>
-                <a:effectLst/>
-                <a:latin typeface="Merriweather Sans"/>
-                <a:ea typeface="Merriweather Sans"/>
-                <a:cs typeface="Merriweather Sans"/>
-                <a:sym typeface="Merriweather Sans"/>
-              </a:rPr>
-              <a:t>This is not a good example. Reasons:</a:t>
-            </a:r>
-          </a:p>
-          <a:p>
-            <a:pPr marL="457200" marR="0" indent="-228600" algn="l" defTabSz="914400" rtl="0" eaLnBrk="1" fontAlgn="auto" latinLnBrk="0" hangingPunct="1">
-              <a:lnSpc>
-                <a:spcPct val="100000"/>
-              </a:lnSpc>
-              <a:spcBef>
-                <a:spcPts val="0"/>
-              </a:spcBef>
-              <a:spcAft>
-                <a:spcPts val="0"/>
-              </a:spcAft>
-              <a:buClr>
-                <a:srgbClr val="000000"/>
-              </a:buClr>
-              <a:buSzPts val="1400"/>
-              <a:buFont typeface="Arial"/>
-              <a:buNone/>
-              <a:tabLst/>
-              <a:defRPr/>
+              <a:rPr lang="en-US" baseline="0" dirty="0"/>
+              <a:t>Transcription with details? Yes, this is a transcription</a:t>
+            </a:r>
+          </a:p>
+          <a:p>
+            <a:pPr marL="571500" indent="-342900">
+              <a:buFontTx/>
+              <a:buChar char="-"/>
             </a:pPr>
             <a:r>
-              <a:rPr lang="en-US" sz="2200" b="0" i="0" u="none" strike="noStrike" cap="none" baseline="0" dirty="0">
-                <a:solidFill>
-                  <a:srgbClr val="000000"/>
-                </a:solidFill>
-                <a:effectLst/>
-                <a:latin typeface="Merriweather Sans"/>
-                <a:ea typeface="Merriweather Sans"/>
-                <a:cs typeface="Merriweather Sans"/>
-                <a:sym typeface="Merriweather Sans"/>
-              </a:rPr>
-              <a:t>- Transcription with details? no -- the notes are high-level and overly summarized.</a:t>
-            </a:r>
-          </a:p>
-          <a:p>
-            <a:pPr marL="457200" marR="0" indent="-228600" algn="l" defTabSz="914400" rtl="0" eaLnBrk="1" fontAlgn="auto" latinLnBrk="0" hangingPunct="1">
-              <a:lnSpc>
-                <a:spcPct val="100000"/>
-              </a:lnSpc>
-              <a:spcBef>
-                <a:spcPts val="0"/>
-              </a:spcBef>
-              <a:spcAft>
-                <a:spcPts val="0"/>
-              </a:spcAft>
-              <a:buClr>
-                <a:srgbClr val="000000"/>
-              </a:buClr>
-              <a:buSzPts val="1400"/>
-              <a:buFont typeface="Arial"/>
-              <a:buNone/>
-              <a:tabLst/>
-              <a:defRPr/>
+              <a:rPr lang="en-US" baseline="0" dirty="0"/>
+              <a:t>Analysis: yes. Short but separate</a:t>
+            </a:r>
+          </a:p>
+          <a:p>
+            <a:pPr marL="571500" indent="-342900">
+              <a:buFontTx/>
+              <a:buChar char="-"/>
             </a:pPr>
             <a:r>
-              <a:rPr lang="en-US" sz="2200" b="0" i="0" u="none" strike="noStrike" cap="none" baseline="0" dirty="0">
-                <a:solidFill>
-                  <a:srgbClr val="000000"/>
-                </a:solidFill>
-                <a:effectLst/>
-                <a:latin typeface="Merriweather Sans"/>
-                <a:ea typeface="Merriweather Sans"/>
-                <a:cs typeface="Merriweather Sans"/>
-                <a:sym typeface="Merriweather Sans"/>
-              </a:rPr>
-              <a:t>- Analysis at the end? yes</a:t>
-            </a:r>
-          </a:p>
-          <a:p>
-            <a:pPr marL="457200" marR="0" indent="-228600" algn="l" defTabSz="914400" rtl="0" eaLnBrk="1" fontAlgn="auto" latinLnBrk="0" hangingPunct="1">
-              <a:lnSpc>
-                <a:spcPct val="100000"/>
-              </a:lnSpc>
-              <a:spcBef>
-                <a:spcPts val="0"/>
-              </a:spcBef>
-              <a:spcAft>
-                <a:spcPts val="0"/>
-              </a:spcAft>
-              <a:buClr>
-                <a:srgbClr val="000000"/>
-              </a:buClr>
-              <a:buSzPts val="1400"/>
-              <a:buFont typeface="Arial"/>
-              <a:buNone/>
-              <a:tabLst/>
-              <a:defRPr/>
+              <a:rPr lang="en-US" baseline="0" dirty="0"/>
+              <a:t>Can another SME make a determination? yes, because details are provided</a:t>
+            </a:r>
+          </a:p>
+          <a:p>
+            <a:pPr marL="571500" indent="-342900">
+              <a:buFontTx/>
+              <a:buChar char="-"/>
             </a:pPr>
-            <a:r>
-              <a:rPr lang="en-US" sz="2200" b="0" i="0" u="none" strike="noStrike" cap="none" baseline="0" dirty="0">
-                <a:solidFill>
-                  <a:srgbClr val="000000"/>
-                </a:solidFill>
-                <a:effectLst/>
-                <a:latin typeface="Merriweather Sans"/>
-                <a:ea typeface="Merriweather Sans"/>
-                <a:cs typeface="Merriweather Sans"/>
-                <a:sym typeface="Merriweather Sans"/>
-              </a:rPr>
-              <a:t>- </a:t>
-            </a:r>
-            <a:r>
-              <a:rPr lang="en-US" baseline="0" dirty="0"/>
-              <a:t>Can another SME make a determination?</a:t>
-            </a:r>
-            <a:r>
-              <a:rPr lang="en-US" sz="2200" b="0" i="0" u="none" strike="noStrike" cap="none" baseline="0" dirty="0">
-                <a:solidFill>
-                  <a:srgbClr val="000000"/>
-                </a:solidFill>
-                <a:effectLst/>
-                <a:latin typeface="Merriweather Sans"/>
-                <a:ea typeface="Merriweather Sans"/>
-                <a:cs typeface="Merriweather Sans"/>
-                <a:sym typeface="Merriweather Sans"/>
-              </a:rPr>
-              <a:t> no, not without details</a:t>
-            </a:r>
-            <a:endParaRPr lang="en-US" dirty="0"/>
+            <a:endParaRPr lang="en-US" baseline="0" dirty="0"/>
           </a:p>
         </p:txBody>
       </p:sp>
     </p:spTree>
     <p:extLst>
       <p:ext uri="{BB962C8B-B14F-4D97-AF65-F5344CB8AC3E}">
-        <p14:creationId xmlns:p14="http://schemas.microsoft.com/office/powerpoint/2010/main" val="344949007"/>
+        <p14:creationId xmlns:p14="http://schemas.microsoft.com/office/powerpoint/2010/main" val="2932580209"/>
       </p:ext>
     </p:extLst>
   </p:cSld>
@@ -1612,64 +1379,7 @@
           <a:p>
             <a:r>
               <a:rPr lang="en-US" dirty="0"/>
-              <a:t>This is a good</a:t>
-            </a:r>
-            <a:r>
-              <a:rPr lang="en-US" baseline="0" dirty="0"/>
-              <a:t> example</a:t>
-            </a:r>
-            <a:r>
-              <a:rPr lang="en-US" dirty="0"/>
-              <a:t>.</a:t>
-            </a:r>
-            <a:r>
-              <a:rPr lang="en-US" baseline="0" dirty="0"/>
-              <a:t> Reasons:</a:t>
-            </a:r>
-          </a:p>
-          <a:p>
-            <a:pPr marL="571500" marR="0" indent="-342900" algn="l" defTabSz="914400" rtl="0" eaLnBrk="1" fontAlgn="auto" latinLnBrk="0" hangingPunct="1">
-              <a:lnSpc>
-                <a:spcPct val="100000"/>
-              </a:lnSpc>
-              <a:spcBef>
-                <a:spcPts val="0"/>
-              </a:spcBef>
-              <a:spcAft>
-                <a:spcPts val="0"/>
-              </a:spcAft>
-              <a:buClr>
-                <a:srgbClr val="000000"/>
-              </a:buClr>
-              <a:buSzPts val="1400"/>
-              <a:buFontTx/>
-              <a:buChar char="-"/>
-              <a:tabLst/>
-              <a:defRPr/>
-            </a:pPr>
-            <a:r>
-              <a:rPr lang="en-US" baseline="0" dirty="0"/>
-              <a:t>Transcription with details? Yes, this is a transcription</a:t>
-            </a:r>
-          </a:p>
-          <a:p>
-            <a:pPr marL="571500" indent="-342900">
-              <a:buFontTx/>
-              <a:buChar char="-"/>
-            </a:pPr>
-            <a:r>
-              <a:rPr lang="en-US" baseline="0" dirty="0"/>
-              <a:t>Analysis: yes. Short but separate</a:t>
-            </a:r>
-          </a:p>
-          <a:p>
-            <a:pPr marL="571500" indent="-342900">
-              <a:buFontTx/>
-              <a:buChar char="-"/>
-            </a:pPr>
-            <a:r>
-              <a:rPr lang="en-US" baseline="0" dirty="0"/>
-              <a:t>Can another SME make a determination? yes, because details are provided</a:t>
+              <a:t>Refer back to your interview transcript to determine proficiency level for each competency.</a:t>
             </a:r>
           </a:p>
         </p:txBody>
@@ -1677,7 +1387,7 @@
     </p:spTree>
     <p:extLst>
       <p:ext uri="{BB962C8B-B14F-4D97-AF65-F5344CB8AC3E}">
-        <p14:creationId xmlns:p14="http://schemas.microsoft.com/office/powerpoint/2010/main" val="2191510207"/>
+        <p14:creationId xmlns:p14="http://schemas.microsoft.com/office/powerpoint/2010/main" val="2731592162"/>
       </p:ext>
     </p:extLst>
   </p:cSld>
@@ -1688,350 +1398,6 @@
 </file>
 
 <file path=ppt/notesSlides/notesSlide12.xml><?xml version="1.0" encoding="utf-8"?>
-<p:notes xmlns:a="http://schemas.openxmlformats.org/drawingml/2006/main" xmlns:r="http://schemas.openxmlformats.org/officeDocument/2006/relationships" xmlns:p="http://schemas.openxmlformats.org/presentationml/2006/main">
-  <p:cSld>
-    <p:spTree>
-      <p:nvGrpSpPr>
-        <p:cNvPr id="1" name=""/>
-        <p:cNvGrpSpPr/>
-        <p:nvPr/>
-      </p:nvGrpSpPr>
-      <p:grpSpPr>
-        <a:xfrm>
-          <a:off x="0" y="0"/>
-          <a:ext cx="0" cy="0"/>
-          <a:chOff x="0" y="0"/>
-          <a:chExt cx="0" cy="0"/>
-        </a:xfrm>
-      </p:grpSpPr>
-      <p:sp>
-        <p:nvSpPr>
-          <p:cNvPr id="2" name="Slide Image Placeholder 1"/>
-          <p:cNvSpPr>
-            <a:spLocks noGrp="1" noRot="1" noChangeAspect="1"/>
-          </p:cNvSpPr>
-          <p:nvPr>
-            <p:ph type="sldImg"/>
-          </p:nvPr>
-        </p:nvSpPr>
-        <p:spPr/>
-      </p:sp>
-      <p:sp>
-        <p:nvSpPr>
-          <p:cNvPr id="3" name="Notes Placeholder 2"/>
-          <p:cNvSpPr>
-            <a:spLocks noGrp="1"/>
-          </p:cNvSpPr>
-          <p:nvPr>
-            <p:ph type="body" idx="1"/>
-          </p:nvPr>
-        </p:nvSpPr>
-        <p:spPr/>
-        <p:txBody>
-          <a:bodyPr/>
-          <a:lstStyle/>
-          <a:p>
-            <a:r>
-              <a:rPr lang="en-US" dirty="0"/>
-              <a:t>This is a good</a:t>
-            </a:r>
-            <a:r>
-              <a:rPr lang="en-US" baseline="0" dirty="0"/>
-              <a:t> example</a:t>
-            </a:r>
-            <a:r>
-              <a:rPr lang="en-US" dirty="0"/>
-              <a:t>.</a:t>
-            </a:r>
-            <a:r>
-              <a:rPr lang="en-US" baseline="0" dirty="0"/>
-              <a:t> Reasons:</a:t>
-            </a:r>
-          </a:p>
-          <a:p>
-            <a:pPr marL="571500" marR="0" indent="-342900" algn="l" defTabSz="914400" rtl="0" eaLnBrk="1" fontAlgn="auto" latinLnBrk="0" hangingPunct="1">
-              <a:lnSpc>
-                <a:spcPct val="100000"/>
-              </a:lnSpc>
-              <a:spcBef>
-                <a:spcPts val="0"/>
-              </a:spcBef>
-              <a:spcAft>
-                <a:spcPts val="0"/>
-              </a:spcAft>
-              <a:buClr>
-                <a:srgbClr val="000000"/>
-              </a:buClr>
-              <a:buSzPts val="1400"/>
-              <a:buFontTx/>
-              <a:buChar char="-"/>
-              <a:tabLst/>
-              <a:defRPr/>
-            </a:pPr>
-            <a:r>
-              <a:rPr lang="en-US" baseline="0" dirty="0"/>
-              <a:t>Transcription with details? Yes, this is a transcription</a:t>
-            </a:r>
-          </a:p>
-          <a:p>
-            <a:pPr marL="571500" indent="-342900">
-              <a:buFontTx/>
-              <a:buChar char="-"/>
-            </a:pPr>
-            <a:r>
-              <a:rPr lang="en-US" baseline="0" dirty="0"/>
-              <a:t>Analysis: yes. Short but separate</a:t>
-            </a:r>
-          </a:p>
-          <a:p>
-            <a:pPr marL="571500" indent="-342900">
-              <a:buFontTx/>
-              <a:buChar char="-"/>
-            </a:pPr>
-            <a:r>
-              <a:rPr lang="en-US" baseline="0" dirty="0"/>
-              <a:t>Can another SME make a determination? yes, because details are provided</a:t>
-            </a:r>
-          </a:p>
-          <a:p>
-            <a:pPr marL="571500" indent="-342900">
-              <a:buFontTx/>
-              <a:buChar char="-"/>
-            </a:pPr>
-            <a:endParaRPr lang="en-US" baseline="0" dirty="0"/>
-          </a:p>
-        </p:txBody>
-      </p:sp>
-    </p:spTree>
-    <p:extLst>
-      <p:ext uri="{BB962C8B-B14F-4D97-AF65-F5344CB8AC3E}">
-        <p14:creationId xmlns:p14="http://schemas.microsoft.com/office/powerpoint/2010/main" val="2932580209"/>
-      </p:ext>
-    </p:extLst>
-  </p:cSld>
-  <p:clrMapOvr>
-    <a:masterClrMapping/>
-  </p:clrMapOvr>
-</p:notes>
-</file>
-
-<file path=ppt/notesSlides/notesSlide13.xml><?xml version="1.0" encoding="utf-8"?>
-<p:notes xmlns:a="http://schemas.openxmlformats.org/drawingml/2006/main" xmlns:r="http://schemas.openxmlformats.org/officeDocument/2006/relationships" xmlns:p="http://schemas.openxmlformats.org/presentationml/2006/main">
-  <p:cSld>
-    <p:spTree>
-      <p:nvGrpSpPr>
-        <p:cNvPr id="1" name=""/>
-        <p:cNvGrpSpPr/>
-        <p:nvPr/>
-      </p:nvGrpSpPr>
-      <p:grpSpPr>
-        <a:xfrm>
-          <a:off x="0" y="0"/>
-          <a:ext cx="0" cy="0"/>
-          <a:chOff x="0" y="0"/>
-          <a:chExt cx="0" cy="0"/>
-        </a:xfrm>
-      </p:grpSpPr>
-      <p:sp>
-        <p:nvSpPr>
-          <p:cNvPr id="2" name="Slide Image Placeholder 1"/>
-          <p:cNvSpPr>
-            <a:spLocks noGrp="1" noRot="1" noChangeAspect="1"/>
-          </p:cNvSpPr>
-          <p:nvPr>
-            <p:ph type="sldImg"/>
-          </p:nvPr>
-        </p:nvSpPr>
-        <p:spPr/>
-      </p:sp>
-      <p:sp>
-        <p:nvSpPr>
-          <p:cNvPr id="3" name="Notes Placeholder 2"/>
-          <p:cNvSpPr>
-            <a:spLocks noGrp="1"/>
-          </p:cNvSpPr>
-          <p:nvPr>
-            <p:ph type="body" idx="1"/>
-          </p:nvPr>
-        </p:nvSpPr>
-        <p:spPr/>
-        <p:txBody>
-          <a:bodyPr/>
-          <a:lstStyle/>
-          <a:p>
-            <a:endParaRPr lang="en-US" dirty="0"/>
-          </a:p>
-        </p:txBody>
-      </p:sp>
-    </p:spTree>
-    <p:extLst>
-      <p:ext uri="{BB962C8B-B14F-4D97-AF65-F5344CB8AC3E}">
-        <p14:creationId xmlns:p14="http://schemas.microsoft.com/office/powerpoint/2010/main" val="1943242387"/>
-      </p:ext>
-    </p:extLst>
-  </p:cSld>
-  <p:clrMapOvr>
-    <a:masterClrMapping/>
-  </p:clrMapOvr>
-</p:notes>
-</file>
-
-<file path=ppt/notesSlides/notesSlide14.xml><?xml version="1.0" encoding="utf-8"?>
-<p:notes xmlns:a="http://schemas.openxmlformats.org/drawingml/2006/main" xmlns:r="http://schemas.openxmlformats.org/officeDocument/2006/relationships" xmlns:p="http://schemas.openxmlformats.org/presentationml/2006/main">
-  <p:cSld>
-    <p:spTree>
-      <p:nvGrpSpPr>
-        <p:cNvPr id="1" name=""/>
-        <p:cNvGrpSpPr/>
-        <p:nvPr/>
-      </p:nvGrpSpPr>
-      <p:grpSpPr>
-        <a:xfrm>
-          <a:off x="0" y="0"/>
-          <a:ext cx="0" cy="0"/>
-          <a:chOff x="0" y="0"/>
-          <a:chExt cx="0" cy="0"/>
-        </a:xfrm>
-      </p:grpSpPr>
-      <p:sp>
-        <p:nvSpPr>
-          <p:cNvPr id="2" name="Slide Image Placeholder 1"/>
-          <p:cNvSpPr>
-            <a:spLocks noGrp="1" noRot="1" noChangeAspect="1"/>
-          </p:cNvSpPr>
-          <p:nvPr>
-            <p:ph type="sldImg"/>
-          </p:nvPr>
-        </p:nvSpPr>
-        <p:spPr/>
-      </p:sp>
-      <p:sp>
-        <p:nvSpPr>
-          <p:cNvPr id="3" name="Notes Placeholder 2"/>
-          <p:cNvSpPr>
-            <a:spLocks noGrp="1"/>
-          </p:cNvSpPr>
-          <p:nvPr>
-            <p:ph type="body" idx="1"/>
-          </p:nvPr>
-        </p:nvSpPr>
-        <p:spPr/>
-        <p:txBody>
-          <a:bodyPr/>
-          <a:lstStyle/>
-          <a:p>
-            <a:r>
-              <a:rPr lang="en-US" dirty="0"/>
-              <a:t>If the applicant does not meet the proficiency level, you *must* give them a Does not Meet. Each interview is its own filter step.</a:t>
-            </a:r>
-          </a:p>
-          <a:p>
-            <a:endParaRPr lang="en-US" dirty="0"/>
-          </a:p>
-          <a:p>
-            <a:r>
-              <a:rPr lang="en-US" dirty="0"/>
-              <a:t>If an applicant does not do well, do not pass them along to be filtered later</a:t>
-            </a:r>
-          </a:p>
-          <a:p>
-            <a:endParaRPr lang="en-US" dirty="0"/>
-          </a:p>
-          <a:p>
-            <a:r>
-              <a:rPr lang="en-US" dirty="0"/>
-              <a:t>An applicant that gets one or more “exceeds” in an interview will be placed in a higher rating category compared to an applicant that just got “meets” across the board</a:t>
-            </a:r>
-          </a:p>
-        </p:txBody>
-      </p:sp>
-    </p:spTree>
-    <p:extLst>
-      <p:ext uri="{BB962C8B-B14F-4D97-AF65-F5344CB8AC3E}">
-        <p14:creationId xmlns:p14="http://schemas.microsoft.com/office/powerpoint/2010/main" val="3225495847"/>
-      </p:ext>
-    </p:extLst>
-  </p:cSld>
-  <p:clrMapOvr>
-    <a:masterClrMapping/>
-  </p:clrMapOvr>
-</p:notes>
-</file>
-
-<file path=ppt/notesSlides/notesSlide15.xml><?xml version="1.0" encoding="utf-8"?>
-<p:notes xmlns:a="http://schemas.openxmlformats.org/drawingml/2006/main" xmlns:r="http://schemas.openxmlformats.org/officeDocument/2006/relationships" xmlns:p="http://schemas.openxmlformats.org/presentationml/2006/main">
-  <p:cSld>
-    <p:spTree>
-      <p:nvGrpSpPr>
-        <p:cNvPr id="1" name=""/>
-        <p:cNvGrpSpPr/>
-        <p:nvPr/>
-      </p:nvGrpSpPr>
-      <p:grpSpPr>
-        <a:xfrm>
-          <a:off x="0" y="0"/>
-          <a:ext cx="0" cy="0"/>
-          <a:chOff x="0" y="0"/>
-          <a:chExt cx="0" cy="0"/>
-        </a:xfrm>
-      </p:grpSpPr>
-      <p:sp>
-        <p:nvSpPr>
-          <p:cNvPr id="2" name="Slide Image Placeholder 1"/>
-          <p:cNvSpPr>
-            <a:spLocks noGrp="1" noRot="1" noChangeAspect="1"/>
-          </p:cNvSpPr>
-          <p:nvPr>
-            <p:ph type="sldImg"/>
-          </p:nvPr>
-        </p:nvSpPr>
-        <p:spPr/>
-      </p:sp>
-      <p:sp>
-        <p:nvSpPr>
-          <p:cNvPr id="3" name="Notes Placeholder 2"/>
-          <p:cNvSpPr>
-            <a:spLocks noGrp="1"/>
-          </p:cNvSpPr>
-          <p:nvPr>
-            <p:ph type="body" idx="1"/>
-          </p:nvPr>
-        </p:nvSpPr>
-        <p:spPr/>
-        <p:txBody>
-          <a:bodyPr/>
-          <a:lstStyle/>
-          <a:p>
-            <a:r>
-              <a:rPr lang="en-US" dirty="0"/>
-              <a:t>If no one meets the bar, no one should pass. </a:t>
-            </a:r>
-          </a:p>
-          <a:p>
-            <a:endParaRPr lang="en-US" dirty="0"/>
-          </a:p>
-          <a:p>
-            <a:r>
-              <a:rPr lang="en-US" dirty="0"/>
-              <a:t>If everyone meets the bar, everyone should pass. </a:t>
-            </a:r>
-          </a:p>
-        </p:txBody>
-      </p:sp>
-    </p:spTree>
-    <p:extLst>
-      <p:ext uri="{BB962C8B-B14F-4D97-AF65-F5344CB8AC3E}">
-        <p14:creationId xmlns:p14="http://schemas.microsoft.com/office/powerpoint/2010/main" val="3491890565"/>
-      </p:ext>
-    </p:extLst>
-  </p:cSld>
-  <p:clrMapOvr>
-    <a:masterClrMapping/>
-  </p:clrMapOvr>
-</p:notes>
-</file>
-
-<file path=ppt/notesSlides/notesSlide16.xml><?xml version="1.0" encoding="utf-8"?>
 <p:notes xmlns:a="http://schemas.openxmlformats.org/drawingml/2006/main" xmlns:r="http://schemas.openxmlformats.org/officeDocument/2006/relationships" xmlns:p="http://schemas.openxmlformats.org/presentationml/2006/main" showMasterSp="0" showMasterPhAnim="0">
   <p:cSld>
     <p:spTree>
@@ -2152,7 +1518,76 @@
 </p:notes>
 </file>
 
-<file path=ppt/notesSlides/notesSlide17.xml><?xml version="1.0" encoding="utf-8"?>
+<file path=ppt/notesSlides/notesSlide13.xml><?xml version="1.0" encoding="utf-8"?>
+<p:notes xmlns:a="http://schemas.openxmlformats.org/drawingml/2006/main" xmlns:r="http://schemas.openxmlformats.org/officeDocument/2006/relationships" xmlns:p="http://schemas.openxmlformats.org/presentationml/2006/main">
+  <p:cSld>
+    <p:spTree>
+      <p:nvGrpSpPr>
+        <p:cNvPr id="1" name=""/>
+        <p:cNvGrpSpPr/>
+        <p:nvPr/>
+      </p:nvGrpSpPr>
+      <p:grpSpPr>
+        <a:xfrm>
+          <a:off x="0" y="0"/>
+          <a:ext cx="0" cy="0"/>
+          <a:chOff x="0" y="0"/>
+          <a:chExt cx="0" cy="0"/>
+        </a:xfrm>
+      </p:grpSpPr>
+      <p:sp>
+        <p:nvSpPr>
+          <p:cNvPr id="2" name="Slide Image Placeholder 1"/>
+          <p:cNvSpPr>
+            <a:spLocks noGrp="1" noRot="1" noChangeAspect="1"/>
+          </p:cNvSpPr>
+          <p:nvPr>
+            <p:ph type="sldImg"/>
+          </p:nvPr>
+        </p:nvSpPr>
+        <p:spPr/>
+      </p:sp>
+      <p:sp>
+        <p:nvSpPr>
+          <p:cNvPr id="3" name="Notes Placeholder 2"/>
+          <p:cNvSpPr>
+            <a:spLocks noGrp="1"/>
+          </p:cNvSpPr>
+          <p:nvPr>
+            <p:ph type="body" idx="1"/>
+          </p:nvPr>
+        </p:nvSpPr>
+        <p:spPr/>
+        <p:txBody>
+          <a:bodyPr/>
+          <a:lstStyle/>
+          <a:p>
+            <a:r>
+              <a:rPr lang="en-US" dirty="0"/>
+              <a:t>TODO:</a:t>
+            </a:r>
+            <a:r>
+              <a:rPr lang="en-US" baseline="0" dirty="0"/>
+              <a:t> give a script to SMEs, or get a volunteer. </a:t>
+            </a:r>
+            <a:endParaRPr lang="en-US" dirty="0"/>
+          </a:p>
+        </p:txBody>
+      </p:sp>
+    </p:spTree>
+    <p:extLst>
+      <p:ext uri="{BB962C8B-B14F-4D97-AF65-F5344CB8AC3E}">
+        <p14:creationId xmlns:p14="http://schemas.microsoft.com/office/powerpoint/2010/main" val="1380038752"/>
+      </p:ext>
+    </p:extLst>
+  </p:cSld>
+  <p:clrMapOvr>
+    <a:masterClrMapping/>
+  </p:clrMapOvr>
+</p:notes>
+</file>
+
+<file path=ppt/notesSlides/notesSlide14.xml><?xml version="1.0" encoding="utf-8"?>
 <p:notes xmlns:a="http://schemas.openxmlformats.org/drawingml/2006/main" xmlns:r="http://schemas.openxmlformats.org/officeDocument/2006/relationships" xmlns:p="http://schemas.openxmlformats.org/presentationml/2006/main" showMasterSp="0" showMasterPhAnim="0">
   <p:cSld>
     <p:spTree>
@@ -2277,7 +1712,7 @@
 </p:notes>
 </file>
 
-<file path=ppt/notesSlides/notesSlide18.xml><?xml version="1.0" encoding="utf-8"?>
+<file path=ppt/notesSlides/notesSlide15.xml><?xml version="1.0" encoding="utf-8"?>
 <p:notes xmlns:a="http://schemas.openxmlformats.org/drawingml/2006/main" xmlns:r="http://schemas.openxmlformats.org/officeDocument/2006/relationships" xmlns:p="http://schemas.openxmlformats.org/presentationml/2006/main" showMasterSp="0" showMasterPhAnim="0">
   <p:cSld>
     <p:spTree>
@@ -2437,7 +1872,7 @@
 </p:notes>
 </file>
 
-<file path=ppt/notesSlides/notesSlide19.xml><?xml version="1.0" encoding="utf-8"?>
+<file path=ppt/notesSlides/notesSlide16.xml><?xml version="1.0" encoding="utf-8"?>
 <p:notes xmlns:a="http://schemas.openxmlformats.org/drawingml/2006/main" xmlns:r="http://schemas.openxmlformats.org/officeDocument/2006/relationships" xmlns:p="http://schemas.openxmlformats.org/presentationml/2006/main" showMasterSp="0" showMasterPhAnim="0">
   <p:cSld>
     <p:spTree>
@@ -3030,24 +2465,6 @@
               <a:t>Reminder of relevant legal requirements around personnel practices</a:t>
             </a:r>
           </a:p>
-          <a:p>
-            <a:endParaRPr lang="en-US" dirty="0"/>
-          </a:p>
-          <a:p>
-            <a:r>
-              <a:rPr lang="en-US" dirty="0"/>
-              <a:t>Cannot discriminate for or against vets</a:t>
-            </a:r>
-          </a:p>
-          <a:p>
-            <a:endParaRPr lang="en-US" dirty="0"/>
-          </a:p>
-          <a:p>
-            <a:r>
-              <a:rPr lang="en-US" dirty="0"/>
-              <a:t>Cannot bias for or against internal applicants or internal contractors</a:t>
-            </a:r>
-          </a:p>
         </p:txBody>
       </p:sp>
       <p:sp>
@@ -3133,7 +2550,7 @@
           <a:p>
             <a:r>
               <a:rPr lang="en-US" dirty="0"/>
-              <a:t>This should take about 5 min. </a:t>
+              <a:t>This should take about an hour to review the template in-depth. </a:t>
             </a:r>
           </a:p>
         </p:txBody>
@@ -3197,51 +2614,29 @@
           <a:p>
             <a:r>
               <a:rPr lang="en-US" dirty="0"/>
-              <a:t>Split the group in two. One asks questions and the other answers. Take turns asking/answering the question.</a:t>
-            </a:r>
-          </a:p>
-          <a:p>
+              <a:t>Reference the competency/target</a:t>
+            </a:r>
+            <a:r>
+              <a:rPr lang="en-US" baseline="0" dirty="0"/>
+              <a:t> proficiency after reviewing *each* question.</a:t>
+            </a:r>
+          </a:p>
+          <a:p>
+            <a:endParaRPr lang="en-US" baseline="0" dirty="0"/>
+          </a:p>
+          <a:p>
+            <a:r>
+              <a:rPr lang="en-US" baseline="0" dirty="0"/>
+              <a:t>Talking point: cannot deviate from probe questions to be fair to all applicants.</a:t>
+            </a:r>
             <a:endParaRPr lang="en-US" dirty="0"/>
-          </a:p>
-          <a:p>
-            <a:r>
-              <a:rPr lang="en-US" dirty="0"/>
-              <a:t>No one should be put on the spot</a:t>
-            </a:r>
-          </a:p>
-          <a:p>
-            <a:endParaRPr lang="en-US" dirty="0"/>
-          </a:p>
-          <a:p>
-            <a:r>
-              <a:rPr lang="en-US" dirty="0"/>
-              <a:t>Go through the whole process from start to finish – everything from script to analysis</a:t>
-            </a:r>
-          </a:p>
-          <a:p>
-            <a:endParaRPr lang="en-US" dirty="0"/>
-          </a:p>
-          <a:p>
-            <a:r>
-              <a:rPr lang="en-US" dirty="0"/>
-              <a:t>Have the SMEs read the “expected good responses” to answer the questions</a:t>
-            </a:r>
-          </a:p>
-          <a:p>
-            <a:endParaRPr lang="en-US" dirty="0"/>
-          </a:p>
-          <a:p>
-            <a:r>
-              <a:rPr lang="en-US" dirty="0"/>
-              <a:t>Get on the same page about what the questions are asking for</a:t>
-            </a:r>
           </a:p>
         </p:txBody>
       </p:sp>
     </p:spTree>
     <p:extLst>
       <p:ext uri="{BB962C8B-B14F-4D97-AF65-F5344CB8AC3E}">
-        <p14:creationId xmlns:p14="http://schemas.microsoft.com/office/powerpoint/2010/main" val="3014894637"/>
+        <p14:creationId xmlns:p14="http://schemas.microsoft.com/office/powerpoint/2010/main" val="3118806151"/>
       </p:ext>
     </p:extLst>
   </p:cSld>
@@ -3252,11 +2647,11 @@
 </file>
 
 <file path=ppt/notesSlides/notesSlide7.xml><?xml version="1.0" encoding="utf-8"?>
-<p:notes xmlns:a="http://schemas.openxmlformats.org/drawingml/2006/main" xmlns:r="http://schemas.openxmlformats.org/officeDocument/2006/relationships" xmlns:p="http://schemas.openxmlformats.org/presentationml/2006/main">
+<p:notes xmlns:a="http://schemas.openxmlformats.org/drawingml/2006/main" xmlns:r="http://schemas.openxmlformats.org/officeDocument/2006/relationships" xmlns:p="http://schemas.openxmlformats.org/presentationml/2006/main" showMasterSp="0" showMasterPhAnim="0">
   <p:cSld>
     <p:spTree>
       <p:nvGrpSpPr>
-        <p:cNvPr id="1" name=""/>
+        <p:cNvPr id="1" name="Shape 239"/>
         <p:cNvGrpSpPr/>
         <p:nvPr/>
       </p:nvGrpSpPr>
@@ -3270,56 +2665,99 @@
       </p:grpSpPr>
       <p:sp>
         <p:nvSpPr>
-          <p:cNvPr id="2" name="Slide Image Placeholder 1"/>
-          <p:cNvSpPr>
-            <a:spLocks noGrp="1" noRot="1" noChangeAspect="1"/>
-          </p:cNvSpPr>
-          <p:nvPr>
-            <p:ph type="sldImg"/>
-          </p:nvPr>
-        </p:nvSpPr>
-        <p:spPr/>
-      </p:sp>
-      <p:sp>
-        <p:nvSpPr>
-          <p:cNvPr id="3" name="Notes Placeholder 2"/>
-          <p:cNvSpPr>
+          <p:cNvPr id="240" name="Google Shape;240;p24:notes"/>
+          <p:cNvSpPr txBox="1">
             <a:spLocks noGrp="1"/>
           </p:cNvSpPr>
           <p:nvPr>
             <p:ph type="body" idx="1"/>
           </p:nvPr>
         </p:nvSpPr>
-        <p:spPr/>
+        <p:spPr>
+          <a:xfrm>
+            <a:off x="917575" y="4415790"/>
+            <a:ext cx="5046663" cy="4183380"/>
+          </a:xfrm>
+          <a:prstGeom prst="rect">
+            <a:avLst/>
+          </a:prstGeom>
+          <a:noFill/>
+          <a:ln>
+            <a:noFill/>
+          </a:ln>
+        </p:spPr>
         <p:txBody>
-          <a:bodyPr/>
+          <a:bodyPr spcFirstLastPara="1" wrap="square" lIns="92425" tIns="46200" rIns="92425" bIns="46200" anchor="t" anchorCtr="0">
+            <a:noAutofit/>
+          </a:bodyPr>
           <a:lstStyle/>
           <a:p>
-            <a:r>
-              <a:rPr lang="en-US" dirty="0"/>
-              <a:t>Reference the competency/target</a:t>
-            </a:r>
-            <a:r>
-              <a:rPr lang="en-US" baseline="0" dirty="0"/>
-              <a:t> proficiency after reviewing *each* question.</a:t>
-            </a:r>
-          </a:p>
-          <a:p>
-            <a:endParaRPr lang="en-US" baseline="0" dirty="0"/>
-          </a:p>
-          <a:p>
-            <a:r>
-              <a:rPr lang="en-US" baseline="0" dirty="0"/>
-              <a:t>Talking point: cannot deviate from probe questions to be fair to all applicants.</a:t>
-            </a:r>
-            <a:endParaRPr lang="en-US" dirty="0"/>
+            <a:pPr marL="0" lvl="0" indent="0" algn="l" rtl="0">
+              <a:lnSpc>
+                <a:spcPct val="100000"/>
+              </a:lnSpc>
+              <a:spcBef>
+                <a:spcPts val="0"/>
+              </a:spcBef>
+              <a:spcAft>
+                <a:spcPts val="0"/>
+              </a:spcAft>
+              <a:buSzPts val="1400"/>
+              <a:buNone/>
+            </a:pPr>
+            <a:endParaRPr/>
           </a:p>
         </p:txBody>
+      </p:sp>
+      <p:sp>
+        <p:nvSpPr>
+          <p:cNvPr id="241" name="Google Shape;241;p24:notes"/>
+          <p:cNvSpPr>
+            <a:spLocks noGrp="1" noRot="1" noChangeAspect="1"/>
+          </p:cNvSpPr>
+          <p:nvPr>
+            <p:ph type="sldImg" idx="2"/>
+          </p:nvPr>
+        </p:nvSpPr>
+        <p:spPr>
+          <a:xfrm>
+            <a:off x="342900" y="696913"/>
+            <a:ext cx="6197600" cy="3486150"/>
+          </a:xfrm>
+          <a:custGeom>
+            <a:avLst/>
+            <a:gdLst/>
+            <a:ahLst/>
+            <a:cxnLst/>
+            <a:rect l="l" t="t" r="r" b="b"/>
+            <a:pathLst>
+              <a:path w="120000" h="120000" extrusionOk="0">
+                <a:moveTo>
+                  <a:pt x="0" y="0"/>
+                </a:moveTo>
+                <a:lnTo>
+                  <a:pt x="120000" y="0"/>
+                </a:lnTo>
+                <a:lnTo>
+                  <a:pt x="120000" y="120000"/>
+                </a:lnTo>
+                <a:lnTo>
+                  <a:pt x="0" y="120000"/>
+                </a:lnTo>
+                <a:close/>
+              </a:path>
+            </a:pathLst>
+          </a:custGeom>
+          <a:noFill/>
+          <a:ln>
+            <a:noFill/>
+          </a:ln>
+        </p:spPr>
       </p:sp>
     </p:spTree>
     <p:extLst>
       <p:ext uri="{BB962C8B-B14F-4D97-AF65-F5344CB8AC3E}">
-        <p14:creationId xmlns:p14="http://schemas.microsoft.com/office/powerpoint/2010/main" val="3118806151"/>
+        <p14:creationId xmlns:p14="http://schemas.microsoft.com/office/powerpoint/2010/main" val="3455970479"/>
       </p:ext>
     </p:extLst>
   </p:cSld>
@@ -3373,17 +2811,165 @@
           <a:bodyPr/>
           <a:lstStyle/>
           <a:p>
-            <a:r>
-              <a:rPr lang="en-US" dirty="0"/>
-              <a:t>You can ask questions like “tell me more about that” more than once</a:t>
-            </a:r>
+            <a:pPr marL="457200" marR="0" indent="-228600" algn="l" defTabSz="914400" rtl="0" eaLnBrk="1" fontAlgn="auto" latinLnBrk="0" hangingPunct="1">
+              <a:lnSpc>
+                <a:spcPct val="100000"/>
+              </a:lnSpc>
+              <a:spcBef>
+                <a:spcPts val="0"/>
+              </a:spcBef>
+              <a:spcAft>
+                <a:spcPts val="0"/>
+              </a:spcAft>
+              <a:buClr>
+                <a:srgbClr val="000000"/>
+              </a:buClr>
+              <a:buSzPts val="1400"/>
+              <a:buFont typeface="Arial"/>
+              <a:buNone/>
+              <a:tabLst/>
+              <a:defRPr/>
+            </a:pPr>
+            <a:r>
+              <a:rPr lang="en-US" sz="2200" b="0" i="0" u="none" strike="noStrike" cap="none" baseline="0" dirty="0">
+                <a:solidFill>
+                  <a:srgbClr val="000000"/>
+                </a:solidFill>
+                <a:effectLst/>
+                <a:latin typeface="Merriweather Sans"/>
+                <a:ea typeface="Merriweather Sans"/>
+                <a:cs typeface="Merriweather Sans"/>
+                <a:sym typeface="Merriweather Sans"/>
+              </a:rPr>
+              <a:t>This is not a good example. Reasons:</a:t>
+            </a:r>
+          </a:p>
+          <a:p>
+            <a:pPr marL="457200" marR="0" indent="-228600" algn="l" defTabSz="914400" rtl="0" eaLnBrk="1" fontAlgn="auto" latinLnBrk="0" hangingPunct="1">
+              <a:lnSpc>
+                <a:spcPct val="100000"/>
+              </a:lnSpc>
+              <a:spcBef>
+                <a:spcPts val="0"/>
+              </a:spcBef>
+              <a:spcAft>
+                <a:spcPts val="0"/>
+              </a:spcAft>
+              <a:buClr>
+                <a:srgbClr val="000000"/>
+              </a:buClr>
+              <a:buSzPts val="1400"/>
+              <a:buFont typeface="Arial"/>
+              <a:buNone/>
+              <a:tabLst/>
+              <a:defRPr/>
+            </a:pPr>
+            <a:r>
+              <a:rPr lang="en-US" sz="2200" b="0" i="0" u="none" strike="noStrike" cap="none" baseline="0" dirty="0">
+                <a:solidFill>
+                  <a:srgbClr val="000000"/>
+                </a:solidFill>
+                <a:effectLst/>
+                <a:latin typeface="Merriweather Sans"/>
+                <a:ea typeface="Merriweather Sans"/>
+                <a:cs typeface="Merriweather Sans"/>
+                <a:sym typeface="Merriweather Sans"/>
+              </a:rPr>
+              <a:t>- Transcription with details? no -- the notes are high-level and overly summarized.</a:t>
+            </a:r>
+          </a:p>
+          <a:p>
+            <a:pPr marL="457200" marR="0" indent="-228600" algn="l" defTabSz="914400" rtl="0" eaLnBrk="1" fontAlgn="auto" latinLnBrk="0" hangingPunct="1">
+              <a:lnSpc>
+                <a:spcPct val="100000"/>
+              </a:lnSpc>
+              <a:spcBef>
+                <a:spcPts val="0"/>
+              </a:spcBef>
+              <a:spcAft>
+                <a:spcPts val="0"/>
+              </a:spcAft>
+              <a:buClr>
+                <a:srgbClr val="000000"/>
+              </a:buClr>
+              <a:buSzPts val="1400"/>
+              <a:buFont typeface="Arial"/>
+              <a:buNone/>
+              <a:tabLst/>
+              <a:defRPr/>
+            </a:pPr>
+            <a:r>
+              <a:rPr lang="en-US" sz="2200" b="0" i="0" u="none" strike="noStrike" cap="none" baseline="0" dirty="0">
+                <a:solidFill>
+                  <a:srgbClr val="000000"/>
+                </a:solidFill>
+                <a:effectLst/>
+                <a:latin typeface="Merriweather Sans"/>
+                <a:ea typeface="Merriweather Sans"/>
+                <a:cs typeface="Merriweather Sans"/>
+                <a:sym typeface="Merriweather Sans"/>
+              </a:rPr>
+              <a:t>- Analysis at the end? yes</a:t>
+            </a:r>
+          </a:p>
+          <a:p>
+            <a:pPr marL="457200" marR="0" indent="-228600" algn="l" defTabSz="914400" rtl="0" eaLnBrk="1" fontAlgn="auto" latinLnBrk="0" hangingPunct="1">
+              <a:lnSpc>
+                <a:spcPct val="100000"/>
+              </a:lnSpc>
+              <a:spcBef>
+                <a:spcPts val="0"/>
+              </a:spcBef>
+              <a:spcAft>
+                <a:spcPts val="0"/>
+              </a:spcAft>
+              <a:buClr>
+                <a:srgbClr val="000000"/>
+              </a:buClr>
+              <a:buSzPts val="1400"/>
+              <a:buFont typeface="Arial"/>
+              <a:buNone/>
+              <a:tabLst/>
+              <a:defRPr/>
+            </a:pPr>
+            <a:r>
+              <a:rPr lang="en-US" sz="2200" b="0" i="0" u="none" strike="noStrike" cap="none" baseline="0" dirty="0">
+                <a:solidFill>
+                  <a:srgbClr val="000000"/>
+                </a:solidFill>
+                <a:effectLst/>
+                <a:latin typeface="Merriweather Sans"/>
+                <a:ea typeface="Merriweather Sans"/>
+                <a:cs typeface="Merriweather Sans"/>
+                <a:sym typeface="Merriweather Sans"/>
+              </a:rPr>
+              <a:t>- </a:t>
+            </a:r>
+            <a:r>
+              <a:rPr lang="en-US" baseline="0" dirty="0"/>
+              <a:t>Can another SME make a determination?</a:t>
+            </a:r>
+            <a:r>
+              <a:rPr lang="en-US" sz="2200" b="0" i="0" u="none" strike="noStrike" cap="none" baseline="0" dirty="0">
+                <a:solidFill>
+                  <a:srgbClr val="000000"/>
+                </a:solidFill>
+                <a:effectLst/>
+                <a:latin typeface="Merriweather Sans"/>
+                <a:ea typeface="Merriweather Sans"/>
+                <a:cs typeface="Merriweather Sans"/>
+                <a:sym typeface="Merriweather Sans"/>
+              </a:rPr>
+              <a:t> no, not without details</a:t>
+            </a:r>
+            <a:endParaRPr lang="en-US" dirty="0"/>
           </a:p>
         </p:txBody>
       </p:sp>
     </p:spTree>
     <p:extLst>
       <p:ext uri="{BB962C8B-B14F-4D97-AF65-F5344CB8AC3E}">
-        <p14:creationId xmlns:p14="http://schemas.microsoft.com/office/powerpoint/2010/main" val="2935044806"/>
+        <p14:creationId xmlns:p14="http://schemas.microsoft.com/office/powerpoint/2010/main" val="344949007"/>
       </p:ext>
     </p:extLst>
   </p:cSld>
@@ -3439,7 +3025,44 @@
           <a:p>
             <a:r>
               <a:rPr lang="en-US" dirty="0"/>
-              <a:t>Example:</a:t>
+              <a:t>This is a good</a:t>
+            </a:r>
+            <a:r>
+              <a:rPr lang="en-US" baseline="0" dirty="0"/>
+              <a:t> example</a:t>
+            </a:r>
+            <a:r>
+              <a:rPr lang="en-US" dirty="0"/>
+              <a:t>.</a:t>
+            </a:r>
+            <a:r>
+              <a:rPr lang="en-US" baseline="0" dirty="0"/>
+              <a:t> Reasons:</a:t>
+            </a:r>
+          </a:p>
+          <a:p>
+            <a:pPr marL="571500" marR="0" indent="-342900" algn="l" defTabSz="914400" rtl="0" eaLnBrk="1" fontAlgn="auto" latinLnBrk="0" hangingPunct="1">
+              <a:lnSpc>
+                <a:spcPct val="100000"/>
+              </a:lnSpc>
+              <a:spcBef>
+                <a:spcPts val="0"/>
+              </a:spcBef>
+              <a:spcAft>
+                <a:spcPts val="0"/>
+              </a:spcAft>
+              <a:buClr>
+                <a:srgbClr val="000000"/>
+              </a:buClr>
+              <a:buSzPts val="1400"/>
+              <a:buFontTx/>
+              <a:buChar char="-"/>
+              <a:tabLst/>
+              <a:defRPr/>
+            </a:pPr>
+            <a:r>
+              <a:rPr lang="en-US" baseline="0" dirty="0"/>
+              <a:t>Transcription with details? Yes, this is a transcription</a:t>
             </a:r>
           </a:p>
           <a:p>
@@ -3448,8 +3071,18 @@
               <a:buChar char="-"/>
             </a:pPr>
             <a:r>
-              <a:rPr lang="en-US" dirty="0"/>
-              <a:t>If the transcript shows a poor response, you can’t give them a “meets”</a:t>
+              <a:rPr lang="en-US" baseline="0" dirty="0"/>
+              <a:t>Analysis: yes. Short but separate</a:t>
+            </a:r>
+          </a:p>
+          <a:p>
+            <a:pPr marL="571500" indent="-342900">
+              <a:buFontTx/>
+              <a:buChar char="-"/>
+            </a:pPr>
+            <a:r>
+              <a:rPr lang="en-US" baseline="0" dirty="0"/>
+              <a:t>Can another SME make a determination? yes, because details are provided</a:t>
             </a:r>
           </a:p>
         </p:txBody>
@@ -3457,7 +3090,7 @@
     </p:spTree>
     <p:extLst>
       <p:ext uri="{BB962C8B-B14F-4D97-AF65-F5344CB8AC3E}">
-        <p14:creationId xmlns:p14="http://schemas.microsoft.com/office/powerpoint/2010/main" val="256299654"/>
+        <p14:creationId xmlns:p14="http://schemas.microsoft.com/office/powerpoint/2010/main" val="2191510207"/>
       </p:ext>
     </p:extLst>
   </p:cSld>
@@ -5505,7 +5138,7 @@
             <a:fld id="{42D41BD8-F932-40AA-8DAC-647898DB09A3}" type="datetime1">
               <a:rPr lang="en-US" smtClean="0"/>
               <a:pPr/>
-              <a:t>9/25/19</a:t>
+              <a:t>9/6/19</a:t>
             </a:fld>
             <a:endParaRPr lang="en-US" dirty="0"/>
           </a:p>
@@ -7213,122 +6846,6 @@
           <p:cNvPr id="2" name="Title 1">
             <a:extLst>
               <a:ext uri="{FF2B5EF4-FFF2-40B4-BE49-F238E27FC236}">
-                <a16:creationId xmlns:a16="http://schemas.microsoft.com/office/drawing/2014/main" id="{4D5CCF48-DC4B-DD49-88F7-241CFCA64AB0}"/>
-              </a:ext>
-            </a:extLst>
-          </p:cNvPr>
-          <p:cNvSpPr>
-            <a:spLocks noGrp="1"/>
-          </p:cNvSpPr>
-          <p:nvPr>
-            <p:ph type="title"/>
-          </p:nvPr>
-        </p:nvSpPr>
-        <p:spPr/>
-        <p:txBody>
-          <a:bodyPr/>
-          <a:lstStyle/>
-          <a:p>
-            <a:r>
-              <a:rPr lang="en-US" dirty="0"/>
-              <a:t>During the interview, you can’t change questions, but you can repeat and clarify questions if needed.</a:t>
-            </a:r>
-          </a:p>
-        </p:txBody>
-      </p:sp>
-    </p:spTree>
-    <p:extLst>
-      <p:ext uri="{BB962C8B-B14F-4D97-AF65-F5344CB8AC3E}">
-        <p14:creationId xmlns:p14="http://schemas.microsoft.com/office/powerpoint/2010/main" val="2642887974"/>
-      </p:ext>
-    </p:extLst>
-  </p:cSld>
-  <p:clrMapOvr>
-    <a:masterClrMapping/>
-  </p:clrMapOvr>
-</p:sld>
-</file>
-
-<file path=ppt/slides/slide11.xml><?xml version="1.0" encoding="utf-8"?>
-<p:sld xmlns:a="http://schemas.openxmlformats.org/drawingml/2006/main" xmlns:r="http://schemas.openxmlformats.org/officeDocument/2006/relationships" xmlns:p="http://schemas.openxmlformats.org/presentationml/2006/main">
-  <p:cSld>
-    <p:spTree>
-      <p:nvGrpSpPr>
-        <p:cNvPr id="1" name=""/>
-        <p:cNvGrpSpPr/>
-        <p:nvPr/>
-      </p:nvGrpSpPr>
-      <p:grpSpPr>
-        <a:xfrm>
-          <a:off x="0" y="0"/>
-          <a:ext cx="0" cy="0"/>
-          <a:chOff x="0" y="0"/>
-          <a:chExt cx="0" cy="0"/>
-        </a:xfrm>
-      </p:grpSpPr>
-      <p:sp>
-        <p:nvSpPr>
-          <p:cNvPr id="2" name="Title 1">
-            <a:extLst>
-              <a:ext uri="{FF2B5EF4-FFF2-40B4-BE49-F238E27FC236}">
-                <a16:creationId xmlns:a16="http://schemas.microsoft.com/office/drawing/2014/main" id="{4D5CCF48-DC4B-DD49-88F7-241CFCA64AB0}"/>
-              </a:ext>
-            </a:extLst>
-          </p:cNvPr>
-          <p:cNvSpPr>
-            <a:spLocks noGrp="1"/>
-          </p:cNvSpPr>
-          <p:nvPr>
-            <p:ph type="title"/>
-          </p:nvPr>
-        </p:nvSpPr>
-        <p:spPr/>
-        <p:txBody>
-          <a:bodyPr/>
-          <a:lstStyle/>
-          <a:p>
-            <a:r>
-              <a:rPr lang="en-US" dirty="0"/>
-              <a:t>Take advantage of probe questions</a:t>
-            </a:r>
-          </a:p>
-        </p:txBody>
-      </p:sp>
-    </p:spTree>
-    <p:extLst>
-      <p:ext uri="{BB962C8B-B14F-4D97-AF65-F5344CB8AC3E}">
-        <p14:creationId xmlns:p14="http://schemas.microsoft.com/office/powerpoint/2010/main" val="3089427177"/>
-      </p:ext>
-    </p:extLst>
-  </p:cSld>
-  <p:clrMapOvr>
-    <a:masterClrMapping/>
-  </p:clrMapOvr>
-</p:sld>
-</file>
-
-<file path=ppt/slides/slide12.xml><?xml version="1.0" encoding="utf-8"?>
-<p:sld xmlns:a="http://schemas.openxmlformats.org/drawingml/2006/main" xmlns:r="http://schemas.openxmlformats.org/officeDocument/2006/relationships" xmlns:p="http://schemas.openxmlformats.org/presentationml/2006/main">
-  <p:cSld>
-    <p:spTree>
-      <p:nvGrpSpPr>
-        <p:cNvPr id="1" name=""/>
-        <p:cNvGrpSpPr/>
-        <p:nvPr/>
-      </p:nvGrpSpPr>
-      <p:grpSpPr>
-        <a:xfrm>
-          <a:off x="0" y="0"/>
-          <a:ext cx="0" cy="0"/>
-          <a:chOff x="0" y="0"/>
-          <a:chExt cx="0" cy="0"/>
-        </a:xfrm>
-      </p:grpSpPr>
-      <p:sp>
-        <p:nvSpPr>
-          <p:cNvPr id="2" name="Title 1">
-            <a:extLst>
-              <a:ext uri="{FF2B5EF4-FFF2-40B4-BE49-F238E27FC236}">
                 <a16:creationId xmlns:a16="http://schemas.microsoft.com/office/drawing/2014/main" id="{7DA0374D-F5D3-0A43-8539-D4FEAF6E0214}"/>
               </a:ext>
             </a:extLst>
@@ -7347,13 +6864,6 @@
           <a:p>
             <a:r>
               <a:rPr lang="en-US" dirty="0"/>
-              <a:t>DURING THE INTERVIEW:</a:t>
-            </a:r>
-            <a:br>
-              <a:rPr lang="en-US" dirty="0"/>
-            </a:br>
-            <a:r>
-              <a:rPr lang="en-US" dirty="0"/>
               <a:t>Transcribing responses</a:t>
             </a:r>
           </a:p>
@@ -7372,7 +6882,7 @@
 </p:sld>
 </file>
 
-<file path=ppt/slides/slide13.xml><?xml version="1.0" encoding="utf-8"?>
+<file path=ppt/slides/slide11.xml><?xml version="1.0" encoding="utf-8"?>
 <p:sld xmlns:a="http://schemas.openxmlformats.org/drawingml/2006/main" xmlns:r="http://schemas.openxmlformats.org/officeDocument/2006/relationships" xmlns:p="http://schemas.openxmlformats.org/presentationml/2006/main">
   <p:cSld>
     <p:spTree>
@@ -7456,12 +6966,397 @@
               <a:t>Transcript does not have to be a verbatim transcription, but do it to the best of your ability.</a:t>
             </a:r>
           </a:p>
+          <a:p>
+            <a:r>
+              <a:rPr lang="en-US" dirty="0"/>
+              <a:t>Your transcript and proficiency determination should be aligned.</a:t>
+            </a:r>
+          </a:p>
         </p:txBody>
       </p:sp>
     </p:spTree>
     <p:extLst>
       <p:ext uri="{BB962C8B-B14F-4D97-AF65-F5344CB8AC3E}">
         <p14:creationId xmlns:p14="http://schemas.microsoft.com/office/powerpoint/2010/main" val="1841999195"/>
+      </p:ext>
+    </p:extLst>
+  </p:cSld>
+  <p:clrMapOvr>
+    <a:masterClrMapping/>
+  </p:clrMapOvr>
+</p:sld>
+</file>
+
+<file path=ppt/slides/slide12.xml><?xml version="1.0" encoding="utf-8"?>
+<p:sld xmlns:a="http://schemas.openxmlformats.org/drawingml/2006/main" xmlns:r="http://schemas.openxmlformats.org/officeDocument/2006/relationships" xmlns:p="http://schemas.openxmlformats.org/presentationml/2006/main">
+  <p:cSld>
+    <p:spTree>
+      <p:nvGrpSpPr>
+        <p:cNvPr id="1" name="Shape 242"/>
+        <p:cNvGrpSpPr/>
+        <p:nvPr/>
+      </p:nvGrpSpPr>
+      <p:grpSpPr>
+        <a:xfrm>
+          <a:off x="0" y="0"/>
+          <a:ext cx="0" cy="0"/>
+          <a:chOff x="0" y="0"/>
+          <a:chExt cx="0" cy="0"/>
+        </a:xfrm>
+      </p:grpSpPr>
+      <p:sp>
+        <p:nvSpPr>
+          <p:cNvPr id="243" name="Google Shape;243;p45"/>
+          <p:cNvSpPr txBox="1">
+            <a:spLocks noGrp="1"/>
+          </p:cNvSpPr>
+          <p:nvPr>
+            <p:ph type="title"/>
+          </p:nvPr>
+        </p:nvSpPr>
+        <p:spPr>
+          <a:prstGeom prst="rect">
+            <a:avLst/>
+          </a:prstGeom>
+          <a:noFill/>
+          <a:ln>
+            <a:noFill/>
+          </a:ln>
+        </p:spPr>
+        <p:txBody>
+          <a:bodyPr spcFirstLastPara="1" wrap="square" lIns="121904" tIns="60935" rIns="121904" bIns="60935" anchor="t" anchorCtr="0">
+            <a:noAutofit/>
+          </a:bodyPr>
+          <a:lstStyle/>
+          <a:p>
+            <a:r>
+              <a:rPr lang="en-US" dirty="0"/>
+              <a:t>Jot down your reaction (optional)</a:t>
+            </a:r>
+            <a:endParaRPr dirty="0"/>
+          </a:p>
+        </p:txBody>
+      </p:sp>
+      <p:sp>
+        <p:nvSpPr>
+          <p:cNvPr id="2" name="Text Placeholder 1">
+            <a:extLst>
+              <a:ext uri="{FF2B5EF4-FFF2-40B4-BE49-F238E27FC236}">
+                <a16:creationId xmlns:a16="http://schemas.microsoft.com/office/drawing/2014/main" id="{0B6FBA02-17EB-9B44-9451-15D976348E1B}"/>
+              </a:ext>
+            </a:extLst>
+          </p:cNvPr>
+          <p:cNvSpPr>
+            <a:spLocks noGrp="1"/>
+          </p:cNvSpPr>
+          <p:nvPr>
+            <p:ph type="body" idx="1"/>
+          </p:nvPr>
+        </p:nvSpPr>
+        <p:spPr/>
+        <p:txBody>
+          <a:bodyPr>
+            <a:normAutofit/>
+          </a:bodyPr>
+          <a:lstStyle/>
+          <a:p>
+            <a:pPr marL="228611" indent="0">
+              <a:buNone/>
+            </a:pPr>
+            <a:r>
+              <a:rPr lang="en-US" dirty="0"/>
+              <a:t>	“Great example – shows expertise”</a:t>
+            </a:r>
+          </a:p>
+          <a:p>
+            <a:pPr marL="228611" indent="0">
+              <a:buNone/>
+            </a:pPr>
+            <a:r>
+              <a:rPr lang="en-US" dirty="0"/>
+              <a:t>	“Right terms but is not making sense”</a:t>
+            </a:r>
+          </a:p>
+          <a:p>
+            <a:pPr marL="228611" indent="0">
+              <a:buNone/>
+            </a:pPr>
+            <a:r>
+              <a:rPr lang="en-US" dirty="0"/>
+              <a:t>	“Response lacked sufficient detail to meet proficiency level”</a:t>
+            </a:r>
+          </a:p>
+        </p:txBody>
+      </p:sp>
+    </p:spTree>
+    <p:extLst>
+      <p:ext uri="{BB962C8B-B14F-4D97-AF65-F5344CB8AC3E}">
+        <p14:creationId xmlns:p14="http://schemas.microsoft.com/office/powerpoint/2010/main" val="1789250179"/>
+      </p:ext>
+    </p:extLst>
+  </p:cSld>
+  <p:clrMapOvr>
+    <a:masterClrMapping/>
+  </p:clrMapOvr>
+</p:sld>
+</file>
+
+<file path=ppt/slides/slide13.xml><?xml version="1.0" encoding="utf-8"?>
+<p:sld xmlns:a="http://schemas.openxmlformats.org/drawingml/2006/main" xmlns:r="http://schemas.openxmlformats.org/officeDocument/2006/relationships" xmlns:p="http://schemas.openxmlformats.org/presentationml/2006/main">
+  <p:cSld>
+    <p:spTree>
+      <p:nvGrpSpPr>
+        <p:cNvPr id="1" name=""/>
+        <p:cNvGrpSpPr/>
+        <p:nvPr/>
+      </p:nvGrpSpPr>
+      <p:grpSpPr>
+        <a:xfrm>
+          <a:off x="0" y="0"/>
+          <a:ext cx="0" cy="0"/>
+          <a:chOff x="0" y="0"/>
+          <a:chExt cx="0" cy="0"/>
+        </a:xfrm>
+      </p:grpSpPr>
+      <p:sp>
+        <p:nvSpPr>
+          <p:cNvPr id="2" name="Title 1">
+            <a:extLst>
+              <a:ext uri="{FF2B5EF4-FFF2-40B4-BE49-F238E27FC236}">
+                <a16:creationId xmlns:a16="http://schemas.microsoft.com/office/drawing/2014/main" id="{0416B85F-4789-7349-885A-3A9736185D78}"/>
+              </a:ext>
+            </a:extLst>
+          </p:cNvPr>
+          <p:cNvSpPr>
+            <a:spLocks noGrp="1"/>
+          </p:cNvSpPr>
+          <p:nvPr>
+            <p:ph type="title"/>
+          </p:nvPr>
+        </p:nvSpPr>
+        <p:spPr/>
+        <p:txBody>
+          <a:bodyPr/>
+          <a:lstStyle/>
+          <a:p>
+            <a:r>
+              <a:rPr lang="en-US" dirty="0"/>
+              <a:t>Transcript Example 1</a:t>
+            </a:r>
+          </a:p>
+        </p:txBody>
+      </p:sp>
+      <p:sp>
+        <p:nvSpPr>
+          <p:cNvPr id="3" name="Text Placeholder 2">
+            <a:extLst>
+              <a:ext uri="{FF2B5EF4-FFF2-40B4-BE49-F238E27FC236}">
+                <a16:creationId xmlns:a16="http://schemas.microsoft.com/office/drawing/2014/main" id="{66BF03FA-C93D-B241-A6A3-12292798BBE4}"/>
+              </a:ext>
+            </a:extLst>
+          </p:cNvPr>
+          <p:cNvSpPr>
+            <a:spLocks noGrp="1"/>
+          </p:cNvSpPr>
+          <p:nvPr>
+            <p:ph type="body" idx="1"/>
+          </p:nvPr>
+        </p:nvSpPr>
+        <p:spPr/>
+        <p:txBody>
+          <a:bodyPr>
+            <a:normAutofit lnSpcReduction="10000"/>
+          </a:bodyPr>
+          <a:lstStyle/>
+          <a:p>
+            <a:pPr marL="0" indent="0">
+              <a:spcBef>
+                <a:spcPts val="0"/>
+              </a:spcBef>
+              <a:buClrTx/>
+              <a:buSzTx/>
+              <a:buNone/>
+            </a:pPr>
+            <a:r>
+              <a:rPr lang="en-US" dirty="0"/>
+              <a:t>Question (Communication and Collaboration): </a:t>
+            </a:r>
+          </a:p>
+          <a:p>
+            <a:pPr marL="0" indent="0">
+              <a:spcBef>
+                <a:spcPts val="0"/>
+              </a:spcBef>
+              <a:buClrTx/>
+              <a:buSzTx/>
+              <a:buNone/>
+            </a:pPr>
+            <a:r>
+              <a:rPr lang="en-US" b="1" dirty="0"/>
+              <a:t>Tell me about a time you worked with a team to solve a technical issue? How was the problem identified and how did your group communicate your findings?</a:t>
+            </a:r>
+          </a:p>
+          <a:p>
+            <a:pPr marL="0" marR="0" lvl="0" indent="0" defTabSz="914400" eaLnBrk="1" fontAlgn="auto" latinLnBrk="0" hangingPunct="1">
+              <a:lnSpc>
+                <a:spcPct val="100000"/>
+              </a:lnSpc>
+              <a:spcBef>
+                <a:spcPts val="0"/>
+              </a:spcBef>
+              <a:spcAft>
+                <a:spcPts val="0"/>
+              </a:spcAft>
+              <a:buClrTx/>
+              <a:buSzTx/>
+              <a:buFontTx/>
+              <a:buNone/>
+              <a:tabLst/>
+              <a:defRPr/>
+            </a:pPr>
+            <a:endParaRPr lang="en-US" dirty="0"/>
+          </a:p>
+          <a:p>
+            <a:pPr marL="0" marR="0" lvl="0" indent="0" defTabSz="914400" eaLnBrk="1" fontAlgn="auto" latinLnBrk="0" hangingPunct="1">
+              <a:lnSpc>
+                <a:spcPct val="100000"/>
+              </a:lnSpc>
+              <a:spcBef>
+                <a:spcPts val="0"/>
+              </a:spcBef>
+              <a:spcAft>
+                <a:spcPts val="0"/>
+              </a:spcAft>
+              <a:buClrTx/>
+              <a:buSzTx/>
+              <a:buFontTx/>
+              <a:buNone/>
+              <a:tabLst/>
+              <a:defRPr/>
+            </a:pPr>
+            <a:endParaRPr lang="en-US" dirty="0"/>
+          </a:p>
+          <a:p>
+            <a:pPr marL="0" marR="0" lvl="0" indent="0" defTabSz="914400" eaLnBrk="1" fontAlgn="auto" latinLnBrk="0" hangingPunct="1">
+              <a:lnSpc>
+                <a:spcPct val="100000"/>
+              </a:lnSpc>
+              <a:spcBef>
+                <a:spcPts val="0"/>
+              </a:spcBef>
+              <a:spcAft>
+                <a:spcPts val="0"/>
+              </a:spcAft>
+              <a:buClrTx/>
+              <a:buSzTx/>
+              <a:buFontTx/>
+              <a:buNone/>
+              <a:tabLst/>
+              <a:defRPr/>
+            </a:pPr>
+            <a:r>
+              <a:rPr lang="en-US" dirty="0"/>
+              <a:t>Transcript:</a:t>
+            </a:r>
+          </a:p>
+          <a:p>
+            <a:pPr marL="571500" marR="0" lvl="0" indent="-571500" defTabSz="914400" eaLnBrk="1" fontAlgn="auto" latinLnBrk="0" hangingPunct="1">
+              <a:lnSpc>
+                <a:spcPct val="100000"/>
+              </a:lnSpc>
+              <a:spcBef>
+                <a:spcPts val="0"/>
+              </a:spcBef>
+              <a:spcAft>
+                <a:spcPts val="0"/>
+              </a:spcAft>
+              <a:buClrTx/>
+              <a:buSzTx/>
+              <a:buFontTx/>
+              <a:buChar char="-"/>
+              <a:tabLst/>
+              <a:defRPr/>
+            </a:pPr>
+            <a:r>
+              <a:rPr lang="en-US" dirty="0"/>
+              <a:t>Able to give a detailed description of an issue and its resolution</a:t>
+            </a:r>
+          </a:p>
+          <a:p>
+            <a:pPr marL="571500" marR="0" lvl="0" indent="-571500" defTabSz="914400" eaLnBrk="1" fontAlgn="auto" latinLnBrk="0" hangingPunct="1">
+              <a:lnSpc>
+                <a:spcPct val="100000"/>
+              </a:lnSpc>
+              <a:spcBef>
+                <a:spcPts val="0"/>
+              </a:spcBef>
+              <a:spcAft>
+                <a:spcPts val="0"/>
+              </a:spcAft>
+              <a:buClrTx/>
+              <a:buSzTx/>
+              <a:buFontTx/>
+              <a:buChar char="-"/>
+              <a:tabLst/>
+              <a:defRPr/>
+            </a:pPr>
+            <a:r>
+              <a:rPr lang="en-US" dirty="0"/>
+              <a:t>Describes that they played an active role in finding and mitigating the risk (vs watching their team find and solve the problem)</a:t>
+            </a:r>
+          </a:p>
+          <a:p>
+            <a:pPr marL="571500" marR="0" lvl="0" indent="-571500" defTabSz="914400" eaLnBrk="1" fontAlgn="auto" latinLnBrk="0" hangingPunct="1">
+              <a:lnSpc>
+                <a:spcPct val="100000"/>
+              </a:lnSpc>
+              <a:spcBef>
+                <a:spcPts val="0"/>
+              </a:spcBef>
+              <a:spcAft>
+                <a:spcPts val="0"/>
+              </a:spcAft>
+              <a:buClrTx/>
+              <a:buSzTx/>
+              <a:buFontTx/>
+              <a:buChar char="-"/>
+              <a:tabLst/>
+              <a:defRPr/>
+            </a:pPr>
+            <a:r>
+              <a:rPr lang="en-US" dirty="0"/>
+              <a:t>Candidate identified size and scope of risk and how it would affect users</a:t>
+            </a:r>
+          </a:p>
+          <a:p>
+            <a:pPr marL="571500" marR="0" lvl="0" indent="-571500" defTabSz="914400" eaLnBrk="1" fontAlgn="auto" latinLnBrk="0" hangingPunct="1">
+              <a:lnSpc>
+                <a:spcPct val="100000"/>
+              </a:lnSpc>
+              <a:spcBef>
+                <a:spcPts val="0"/>
+              </a:spcBef>
+              <a:spcAft>
+                <a:spcPts val="0"/>
+              </a:spcAft>
+              <a:buClrTx/>
+              <a:buSzTx/>
+              <a:buFontTx/>
+              <a:buChar char="-"/>
+              <a:tabLst/>
+              <a:defRPr/>
+            </a:pPr>
+            <a:r>
+              <a:rPr lang="en-US" dirty="0"/>
+              <a:t>Candidate mentioned informing stakeholders</a:t>
+            </a:r>
+          </a:p>
+        </p:txBody>
+      </p:sp>
+    </p:spTree>
+    <p:extLst>
+      <p:ext uri="{BB962C8B-B14F-4D97-AF65-F5344CB8AC3E}">
+        <p14:creationId xmlns:p14="http://schemas.microsoft.com/office/powerpoint/2010/main" val="4208729609"/>
       </p:ext>
     </p:extLst>
   </p:cSld>
@@ -7511,7 +7406,7 @@
           <a:p>
             <a:r>
               <a:rPr lang="en-US" dirty="0"/>
-              <a:t>Good or bad Transcript: Example 1</a:t>
+              <a:t>Transcript Example 2</a:t>
             </a:r>
           </a:p>
         </p:txBody>
@@ -7549,7 +7444,7 @@
             </a:pPr>
             <a:r>
               <a:rPr lang="en-US" dirty="0"/>
-              <a:t>Question (Communication and Collaboration): </a:t>
+              <a:t>Question (Active Directory): </a:t>
             </a:r>
           </a:p>
           <a:p>
@@ -7563,7 +7458,7 @@
             </a:pPr>
             <a:r>
               <a:rPr lang="en-US" b="1" dirty="0"/>
-              <a:t>Tell me about a time you worked with a team to solve a technical issue? How was the problem identified and how did your group communicate your findings?</a:t>
+              <a:t>How does DNS resolution work?</a:t>
             </a:r>
           </a:p>
           <a:p>
@@ -7630,7 +7525,77 @@
             </a:r>
           </a:p>
           <a:p>
-            <a:pPr marL="571500" marR="0" lvl="0" indent="-571500" defTabSz="914400" eaLnBrk="1" fontAlgn="auto" latinLnBrk="0" hangingPunct="1">
+            <a:pPr marL="571500" indent="-571500">
+              <a:spcBef>
+                <a:spcPts val="0"/>
+              </a:spcBef>
+              <a:buClrTx/>
+              <a:buSzTx/>
+              <a:defRPr/>
+            </a:pPr>
+            <a:r>
+              <a:rPr lang="en-US" dirty="0"/>
+              <a:t>User makes a request to a URL</a:t>
+            </a:r>
+          </a:p>
+          <a:p>
+            <a:pPr marL="571500" indent="-571500">
+              <a:spcBef>
+                <a:spcPts val="0"/>
+              </a:spcBef>
+              <a:buClrTx/>
+              <a:buSzTx/>
+              <a:defRPr/>
+            </a:pPr>
+            <a:r>
+              <a:rPr lang="en-US" dirty="0"/>
+              <a:t>DNS caches along the way</a:t>
+            </a:r>
+          </a:p>
+          <a:p>
+            <a:pPr marL="571500" indent="-571500">
+              <a:spcBef>
+                <a:spcPts val="0"/>
+              </a:spcBef>
+              <a:buClrTx/>
+              <a:buSzTx/>
+              <a:defRPr/>
+            </a:pPr>
+            <a:r>
+              <a:rPr lang="en-US" dirty="0"/>
+              <a:t>Local machine, network, and ISP have them</a:t>
+            </a:r>
+          </a:p>
+          <a:p>
+            <a:pPr marL="571500" indent="-571500">
+              <a:spcBef>
+                <a:spcPts val="0"/>
+              </a:spcBef>
+              <a:buClrTx/>
+              <a:buSzTx/>
+              <a:defRPr/>
+            </a:pPr>
+            <a:r>
+              <a:rPr lang="en-US" dirty="0"/>
+              <a:t>There are DNS lookup providers out there</a:t>
+            </a:r>
+          </a:p>
+          <a:p>
+            <a:pPr marL="571500" indent="-571500">
+              <a:spcBef>
+                <a:spcPts val="0"/>
+              </a:spcBef>
+              <a:buClrTx/>
+              <a:buSzTx/>
+              <a:defRPr/>
+            </a:pPr>
+            <a:r>
+              <a:rPr lang="en-US" dirty="0"/>
+              <a:t>Essentially what they are doing is mapping the domain name that you put in with the correct IP address that you're trying to go to.</a:t>
+            </a:r>
+          </a:p>
+          <a:p>
+            <a:pPr marL="0" marR="0" lvl="0" indent="0" defTabSz="914400" eaLnBrk="1" fontAlgn="auto" latinLnBrk="0" hangingPunct="1">
               <a:lnSpc>
                 <a:spcPct val="100000"/>
               </a:lnSpc>
@@ -7643,82 +7608,19 @@
               <a:buClrTx/>
               <a:buSzTx/>
               <a:buFontTx/>
-              <a:buChar char="-"/>
+              <a:buNone/>
               <a:tabLst/>
               <a:defRPr/>
             </a:pPr>
-            <a:r>
+            <a:br>
               <a:rPr lang="en-US" dirty="0"/>
-              <a:t>Able to give a detailed description of an issue and its resolution</a:t>
-            </a:r>
-          </a:p>
-          <a:p>
-            <a:pPr marL="571500" marR="0" lvl="0" indent="-571500" defTabSz="914400" eaLnBrk="1" fontAlgn="auto" latinLnBrk="0" hangingPunct="1">
-              <a:lnSpc>
-                <a:spcPct val="100000"/>
-              </a:lnSpc>
-              <a:spcBef>
-                <a:spcPts val="0"/>
-              </a:spcBef>
-              <a:spcAft>
-                <a:spcPts val="0"/>
-              </a:spcAft>
-              <a:buClrTx/>
-              <a:buSzTx/>
-              <a:buFontTx/>
-              <a:buChar char="-"/>
-              <a:tabLst/>
-              <a:defRPr/>
-            </a:pPr>
-            <a:r>
+            </a:br>
+            <a:br>
               <a:rPr lang="en-US" dirty="0"/>
-              <a:t>Describes that they played an active role in finding and mitigating the risk (vs watching their team find and solve the problem)</a:t>
-            </a:r>
-          </a:p>
-          <a:p>
-            <a:pPr marL="571500" marR="0" lvl="0" indent="-571500" defTabSz="914400" eaLnBrk="1" fontAlgn="auto" latinLnBrk="0" hangingPunct="1">
-              <a:lnSpc>
-                <a:spcPct val="100000"/>
-              </a:lnSpc>
-              <a:spcBef>
-                <a:spcPts val="0"/>
-              </a:spcBef>
-              <a:spcAft>
-                <a:spcPts val="0"/>
-              </a:spcAft>
-              <a:buClrTx/>
-              <a:buSzTx/>
-              <a:buFontTx/>
-              <a:buChar char="-"/>
-              <a:tabLst/>
-              <a:defRPr/>
-            </a:pPr>
+            </a:br>
             <a:r>
               <a:rPr lang="en-US" dirty="0"/>
-              <a:t>Candidate identified size and scope of risk and how it would affect users</a:t>
-            </a:r>
-          </a:p>
-          <a:p>
-            <a:pPr marL="571500" marR="0" lvl="0" indent="-571500" defTabSz="914400" eaLnBrk="1" fontAlgn="auto" latinLnBrk="0" hangingPunct="1">
-              <a:lnSpc>
-                <a:spcPct val="100000"/>
-              </a:lnSpc>
-              <a:spcBef>
-                <a:spcPts val="0"/>
-              </a:spcBef>
-              <a:spcAft>
-                <a:spcPts val="0"/>
-              </a:spcAft>
-              <a:buClrTx/>
-              <a:buSzTx/>
-              <a:buFontTx/>
-              <a:buChar char="-"/>
-              <a:tabLst/>
-              <a:defRPr/>
-            </a:pPr>
-            <a:r>
-              <a:rPr lang="en-US" dirty="0"/>
-              <a:t>Candidate mentioned informing stakeholders</a:t>
+              <a:t>Impression: Covers basics, but lacks details </a:t>
             </a:r>
           </a:p>
         </p:txBody>
@@ -7726,7 +7628,7 @@
     </p:spTree>
     <p:extLst>
       <p:ext uri="{BB962C8B-B14F-4D97-AF65-F5344CB8AC3E}">
-        <p14:creationId xmlns:p14="http://schemas.microsoft.com/office/powerpoint/2010/main" val="4208729609"/>
+        <p14:creationId xmlns:p14="http://schemas.microsoft.com/office/powerpoint/2010/main" val="3935892684"/>
       </p:ext>
     </p:extLst>
   </p:cSld>
@@ -7776,279 +7678,7 @@
           <a:p>
             <a:r>
               <a:rPr lang="en-US" dirty="0"/>
-              <a:t>Good or bad Transcript: Example 2</a:t>
-            </a:r>
-          </a:p>
-        </p:txBody>
-      </p:sp>
-      <p:sp>
-        <p:nvSpPr>
-          <p:cNvPr id="3" name="Text Placeholder 2">
-            <a:extLst>
-              <a:ext uri="{FF2B5EF4-FFF2-40B4-BE49-F238E27FC236}">
-                <a16:creationId xmlns:a16="http://schemas.microsoft.com/office/drawing/2014/main" id="{66BF03FA-C93D-B241-A6A3-12292798BBE4}"/>
-              </a:ext>
-            </a:extLst>
-          </p:cNvPr>
-          <p:cNvSpPr>
-            <a:spLocks noGrp="1"/>
-          </p:cNvSpPr>
-          <p:nvPr>
-            <p:ph type="body" idx="1"/>
-          </p:nvPr>
-        </p:nvSpPr>
-        <p:spPr/>
-        <p:txBody>
-          <a:bodyPr>
-            <a:normAutofit lnSpcReduction="10000"/>
-          </a:bodyPr>
-          <a:lstStyle/>
-          <a:p>
-            <a:pPr marL="0" indent="0">
-              <a:spcBef>
-                <a:spcPts val="0"/>
-              </a:spcBef>
-              <a:buClrTx/>
-              <a:buSzTx/>
-              <a:buNone/>
-            </a:pPr>
-            <a:r>
-              <a:rPr lang="en-US" dirty="0"/>
-              <a:t>Question (Active Directory): </a:t>
-            </a:r>
-          </a:p>
-          <a:p>
-            <a:pPr marL="0" indent="0">
-              <a:spcBef>
-                <a:spcPts val="0"/>
-              </a:spcBef>
-              <a:buClrTx/>
-              <a:buSzTx/>
-              <a:buNone/>
-            </a:pPr>
-            <a:r>
-              <a:rPr lang="en-US" b="1" dirty="0"/>
-              <a:t>How does DNS resolution work?</a:t>
-            </a:r>
-          </a:p>
-          <a:p>
-            <a:pPr marL="0" marR="0" lvl="0" indent="0" defTabSz="914400" eaLnBrk="1" fontAlgn="auto" latinLnBrk="0" hangingPunct="1">
-              <a:lnSpc>
-                <a:spcPct val="100000"/>
-              </a:lnSpc>
-              <a:spcBef>
-                <a:spcPts val="0"/>
-              </a:spcBef>
-              <a:spcAft>
-                <a:spcPts val="0"/>
-              </a:spcAft>
-              <a:buClrTx/>
-              <a:buSzTx/>
-              <a:buFontTx/>
-              <a:buNone/>
-              <a:tabLst/>
-              <a:defRPr/>
-            </a:pPr>
-            <a:endParaRPr lang="en-US" dirty="0"/>
-          </a:p>
-          <a:p>
-            <a:pPr marL="0" marR="0" lvl="0" indent="0" defTabSz="914400" eaLnBrk="1" fontAlgn="auto" latinLnBrk="0" hangingPunct="1">
-              <a:lnSpc>
-                <a:spcPct val="100000"/>
-              </a:lnSpc>
-              <a:spcBef>
-                <a:spcPts val="0"/>
-              </a:spcBef>
-              <a:spcAft>
-                <a:spcPts val="0"/>
-              </a:spcAft>
-              <a:buClrTx/>
-              <a:buSzTx/>
-              <a:buFontTx/>
-              <a:buNone/>
-              <a:tabLst/>
-              <a:defRPr/>
-            </a:pPr>
-            <a:endParaRPr lang="en-US" dirty="0"/>
-          </a:p>
-          <a:p>
-            <a:pPr marL="0" marR="0" lvl="0" indent="0" defTabSz="914400" eaLnBrk="1" fontAlgn="auto" latinLnBrk="0" hangingPunct="1">
-              <a:lnSpc>
-                <a:spcPct val="100000"/>
-              </a:lnSpc>
-              <a:spcBef>
-                <a:spcPts val="0"/>
-              </a:spcBef>
-              <a:spcAft>
-                <a:spcPts val="0"/>
-              </a:spcAft>
-              <a:buClrTx/>
-              <a:buSzTx/>
-              <a:buFontTx/>
-              <a:buNone/>
-              <a:tabLst/>
-              <a:defRPr/>
-            </a:pPr>
-            <a:r>
-              <a:rPr lang="en-US" dirty="0"/>
-              <a:t>Transcript:</a:t>
-            </a:r>
-          </a:p>
-          <a:p>
-            <a:pPr marL="571500" indent="-571500">
-              <a:spcBef>
-                <a:spcPts val="0"/>
-              </a:spcBef>
-              <a:buClrTx/>
-              <a:buSzTx/>
-              <a:defRPr/>
-            </a:pPr>
-            <a:r>
-              <a:rPr lang="en-US" dirty="0"/>
-              <a:t>User makes a request to a URL</a:t>
-            </a:r>
-          </a:p>
-          <a:p>
-            <a:pPr marL="571500" indent="-571500">
-              <a:spcBef>
-                <a:spcPts val="0"/>
-              </a:spcBef>
-              <a:buClrTx/>
-              <a:buSzTx/>
-              <a:defRPr/>
-            </a:pPr>
-            <a:r>
-              <a:rPr lang="en-US" dirty="0"/>
-              <a:t>DNS caches along the way</a:t>
-            </a:r>
-          </a:p>
-          <a:p>
-            <a:pPr marL="571500" indent="-571500">
-              <a:spcBef>
-                <a:spcPts val="0"/>
-              </a:spcBef>
-              <a:buClrTx/>
-              <a:buSzTx/>
-              <a:defRPr/>
-            </a:pPr>
-            <a:r>
-              <a:rPr lang="en-US" dirty="0"/>
-              <a:t>Local machine, network, and ISP have them</a:t>
-            </a:r>
-          </a:p>
-          <a:p>
-            <a:pPr marL="571500" indent="-571500">
-              <a:spcBef>
-                <a:spcPts val="0"/>
-              </a:spcBef>
-              <a:buClrTx/>
-              <a:buSzTx/>
-              <a:defRPr/>
-            </a:pPr>
-            <a:r>
-              <a:rPr lang="en-US" dirty="0"/>
-              <a:t>There are DNS lookup providers out there</a:t>
-            </a:r>
-          </a:p>
-          <a:p>
-            <a:pPr marL="571500" indent="-571500">
-              <a:spcBef>
-                <a:spcPts val="0"/>
-              </a:spcBef>
-              <a:buClrTx/>
-              <a:buSzTx/>
-              <a:defRPr/>
-            </a:pPr>
-            <a:r>
-              <a:rPr lang="en-US" dirty="0"/>
-              <a:t>Essentially what they are doing is mapping the domain name that you put in with the correct IP address that you're trying to go to.</a:t>
-            </a:r>
-          </a:p>
-          <a:p>
-            <a:pPr marL="0" marR="0" lvl="0" indent="0" defTabSz="914400" eaLnBrk="1" fontAlgn="auto" latinLnBrk="0" hangingPunct="1">
-              <a:lnSpc>
-                <a:spcPct val="100000"/>
-              </a:lnSpc>
-              <a:spcBef>
-                <a:spcPts val="0"/>
-              </a:spcBef>
-              <a:spcAft>
-                <a:spcPts val="0"/>
-              </a:spcAft>
-              <a:buClrTx/>
-              <a:buSzTx/>
-              <a:buFontTx/>
-              <a:buNone/>
-              <a:tabLst/>
-              <a:defRPr/>
-            </a:pPr>
-            <a:br>
-              <a:rPr lang="en-US" dirty="0"/>
-            </a:br>
-            <a:br>
-              <a:rPr lang="en-US" dirty="0"/>
-            </a:br>
-            <a:r>
-              <a:rPr lang="en-US" dirty="0"/>
-              <a:t>Impression: Covers basics, but lacks details </a:t>
-            </a:r>
-          </a:p>
-        </p:txBody>
-      </p:sp>
-    </p:spTree>
-    <p:extLst>
-      <p:ext uri="{BB962C8B-B14F-4D97-AF65-F5344CB8AC3E}">
-        <p14:creationId xmlns:p14="http://schemas.microsoft.com/office/powerpoint/2010/main" val="3935892684"/>
-      </p:ext>
-    </p:extLst>
-  </p:cSld>
-  <p:clrMapOvr>
-    <a:masterClrMapping/>
-  </p:clrMapOvr>
-</p:sld>
-</file>
-
-<file path=ppt/slides/slide16.xml><?xml version="1.0" encoding="utf-8"?>
-<p:sld xmlns:a="http://schemas.openxmlformats.org/drawingml/2006/main" xmlns:r="http://schemas.openxmlformats.org/officeDocument/2006/relationships" xmlns:p="http://schemas.openxmlformats.org/presentationml/2006/main">
-  <p:cSld>
-    <p:spTree>
-      <p:nvGrpSpPr>
-        <p:cNvPr id="1" name=""/>
-        <p:cNvGrpSpPr/>
-        <p:nvPr/>
-      </p:nvGrpSpPr>
-      <p:grpSpPr>
-        <a:xfrm>
-          <a:off x="0" y="0"/>
-          <a:ext cx="0" cy="0"/>
-          <a:chOff x="0" y="0"/>
-          <a:chExt cx="0" cy="0"/>
-        </a:xfrm>
-      </p:grpSpPr>
-      <p:sp>
-        <p:nvSpPr>
-          <p:cNvPr id="2" name="Title 1">
-            <a:extLst>
-              <a:ext uri="{FF2B5EF4-FFF2-40B4-BE49-F238E27FC236}">
-                <a16:creationId xmlns:a16="http://schemas.microsoft.com/office/drawing/2014/main" id="{0416B85F-4789-7349-885A-3A9736185D78}"/>
-              </a:ext>
-            </a:extLst>
-          </p:cNvPr>
-          <p:cNvSpPr>
-            <a:spLocks noGrp="1"/>
-          </p:cNvSpPr>
-          <p:nvPr>
-            <p:ph type="title"/>
-          </p:nvPr>
-        </p:nvSpPr>
-        <p:spPr/>
-        <p:txBody>
-          <a:bodyPr/>
-          <a:lstStyle/>
-          <a:p>
-            <a:r>
-              <a:rPr lang="en-US" dirty="0"/>
-              <a:t>Good or bad Transcript: Example 3</a:t>
+              <a:t>Transcript Example 3</a:t>
             </a:r>
           </a:p>
         </p:txBody>
@@ -8353,7 +7983,7 @@
 </p:sld>
 </file>
 
-<file path=ppt/slides/slide17.xml><?xml version="1.0" encoding="utf-8"?>
+<file path=ppt/slides/slide16.xml><?xml version="1.0" encoding="utf-8"?>
 <p:sld xmlns:a="http://schemas.openxmlformats.org/drawingml/2006/main" xmlns:r="http://schemas.openxmlformats.org/officeDocument/2006/relationships" xmlns:p="http://schemas.openxmlformats.org/presentationml/2006/main">
   <p:cSld>
     <p:spTree>
@@ -8393,14 +8023,7 @@
           <a:p>
             <a:r>
               <a:rPr lang="en-US" dirty="0"/>
-              <a:t>AFTER THE INTERVIEW:</a:t>
-            </a:r>
-            <a:br>
-              <a:rPr lang="en-US" dirty="0"/>
-            </a:br>
-            <a:r>
-              <a:rPr lang="en-US" dirty="0"/>
-              <a:t>Rating applicant responses</a:t>
+              <a:t>Proficiency determination</a:t>
             </a:r>
           </a:p>
         </p:txBody>
@@ -8418,86 +8041,7 @@
 </p:sld>
 </file>
 
-<file path=ppt/slides/slide18.xml><?xml version="1.0" encoding="utf-8"?>
-<p:sld xmlns:a="http://schemas.openxmlformats.org/drawingml/2006/main" xmlns:r="http://schemas.openxmlformats.org/officeDocument/2006/relationships" xmlns:p="http://schemas.openxmlformats.org/presentationml/2006/main">
-  <p:cSld>
-    <p:spTree>
-      <p:nvGrpSpPr>
-        <p:cNvPr id="1" name=""/>
-        <p:cNvGrpSpPr/>
-        <p:nvPr/>
-      </p:nvGrpSpPr>
-      <p:grpSpPr>
-        <a:xfrm>
-          <a:off x="0" y="0"/>
-          <a:ext cx="0" cy="0"/>
-          <a:chOff x="0" y="0"/>
-          <a:chExt cx="0" cy="0"/>
-        </a:xfrm>
-      </p:grpSpPr>
-      <p:sp>
-        <p:nvSpPr>
-          <p:cNvPr id="2" name="Title 1">
-            <a:extLst>
-              <a:ext uri="{FF2B5EF4-FFF2-40B4-BE49-F238E27FC236}">
-                <a16:creationId xmlns:a16="http://schemas.microsoft.com/office/drawing/2014/main" id="{6F62C4EB-5A15-DA40-8817-DF283295DEC1}"/>
-              </a:ext>
-            </a:extLst>
-          </p:cNvPr>
-          <p:cNvSpPr>
-            <a:spLocks noGrp="1"/>
-          </p:cNvSpPr>
-          <p:nvPr>
-            <p:ph type="title"/>
-          </p:nvPr>
-        </p:nvSpPr>
-        <p:spPr/>
-        <p:txBody>
-          <a:bodyPr/>
-          <a:lstStyle/>
-          <a:p>
-            <a:r>
-              <a:rPr lang="en-US" dirty="0"/>
-              <a:t>Ratings:</a:t>
-            </a:r>
-            <a:br>
-              <a:rPr lang="en-US" dirty="0"/>
-            </a:br>
-            <a:r>
-              <a:rPr lang="en-US" dirty="0"/>
-              <a:t>- Does not meet</a:t>
-            </a:r>
-            <a:br>
-              <a:rPr lang="en-US" dirty="0"/>
-            </a:br>
-            <a:r>
-              <a:rPr lang="en-US" dirty="0"/>
-              <a:t>- Meets</a:t>
-            </a:r>
-            <a:br>
-              <a:rPr lang="en-US" dirty="0"/>
-            </a:br>
-            <a:r>
-              <a:rPr lang="en-US" dirty="0"/>
-              <a:t>- Exceeds</a:t>
-            </a:r>
-          </a:p>
-        </p:txBody>
-      </p:sp>
-    </p:spTree>
-    <p:extLst>
-      <p:ext uri="{BB962C8B-B14F-4D97-AF65-F5344CB8AC3E}">
-        <p14:creationId xmlns:p14="http://schemas.microsoft.com/office/powerpoint/2010/main" val="3808926530"/>
-      </p:ext>
-    </p:extLst>
-  </p:cSld>
-  <p:clrMapOvr>
-    <a:masterClrMapping/>
-  </p:clrMapOvr>
-</p:sld>
-</file>
-
-<file path=ppt/slides/slide19.xml><?xml version="1.0" encoding="utf-8"?>
+<file path=ppt/slides/slide17.xml><?xml version="1.0" encoding="utf-8"?>
 <p:sld xmlns:a="http://schemas.openxmlformats.org/drawingml/2006/main" xmlns:r="http://schemas.openxmlformats.org/officeDocument/2006/relationships" xmlns:p="http://schemas.openxmlformats.org/presentationml/2006/main">
   <p:cSld>
     <p:spTree>
@@ -8539,7 +8083,7 @@
           <a:p>
             <a:r>
               <a:rPr lang="en-US" dirty="0"/>
-              <a:t>There is no quota for how many applicants should pass. </a:t>
+              <a:t>Reminder: Reference the competency and proficiency definitions.</a:t>
             </a:r>
           </a:p>
         </p:txBody>
@@ -8547,7 +8091,174 @@
     </p:spTree>
     <p:extLst>
       <p:ext uri="{BB962C8B-B14F-4D97-AF65-F5344CB8AC3E}">
-        <p14:creationId xmlns:p14="http://schemas.microsoft.com/office/powerpoint/2010/main" val="879723152"/>
+        <p14:creationId xmlns:p14="http://schemas.microsoft.com/office/powerpoint/2010/main" val="3246139380"/>
+      </p:ext>
+    </p:extLst>
+  </p:cSld>
+  <p:clrMapOvr>
+    <a:masterClrMapping/>
+  </p:clrMapOvr>
+</p:sld>
+</file>
+
+<file path=ppt/slides/slide18.xml><?xml version="1.0" encoding="utf-8"?>
+<p:sld xmlns:a="http://schemas.openxmlformats.org/drawingml/2006/main" xmlns:r="http://schemas.openxmlformats.org/officeDocument/2006/relationships" xmlns:p="http://schemas.openxmlformats.org/presentationml/2006/main">
+  <p:cSld>
+    <p:spTree>
+      <p:nvGrpSpPr>
+        <p:cNvPr id="1" name=""/>
+        <p:cNvGrpSpPr/>
+        <p:nvPr/>
+      </p:nvGrpSpPr>
+      <p:grpSpPr>
+        <a:xfrm>
+          <a:off x="0" y="0"/>
+          <a:ext cx="0" cy="0"/>
+          <a:chOff x="0" y="0"/>
+          <a:chExt cx="0" cy="0"/>
+        </a:xfrm>
+      </p:grpSpPr>
+      <p:sp>
+        <p:nvSpPr>
+          <p:cNvPr id="2" name="Title 1">
+            <a:extLst>
+              <a:ext uri="{FF2B5EF4-FFF2-40B4-BE49-F238E27FC236}">
+                <a16:creationId xmlns:a16="http://schemas.microsoft.com/office/drawing/2014/main" id="{499D8981-1C90-1B42-8D01-C7AB82A1A3C2}"/>
+              </a:ext>
+            </a:extLst>
+          </p:cNvPr>
+          <p:cNvSpPr>
+            <a:spLocks noGrp="1"/>
+          </p:cNvSpPr>
+          <p:nvPr>
+            <p:ph type="title"/>
+          </p:nvPr>
+        </p:nvSpPr>
+        <p:spPr/>
+        <p:txBody>
+          <a:bodyPr/>
+          <a:lstStyle/>
+          <a:p>
+            <a:r>
+              <a:rPr lang="en-US" dirty="0"/>
+              <a:t>Writing your analysis</a:t>
+            </a:r>
+          </a:p>
+        </p:txBody>
+      </p:sp>
+    </p:spTree>
+    <p:extLst>
+      <p:ext uri="{BB962C8B-B14F-4D97-AF65-F5344CB8AC3E}">
+        <p14:creationId xmlns:p14="http://schemas.microsoft.com/office/powerpoint/2010/main" val="1467090001"/>
+      </p:ext>
+    </p:extLst>
+  </p:cSld>
+  <p:clrMapOvr>
+    <a:masterClrMapping/>
+  </p:clrMapOvr>
+</p:sld>
+</file>
+
+<file path=ppt/slides/slide19.xml><?xml version="1.0" encoding="utf-8"?>
+<p:sld xmlns:a="http://schemas.openxmlformats.org/drawingml/2006/main" xmlns:r="http://schemas.openxmlformats.org/officeDocument/2006/relationships" xmlns:p="http://schemas.openxmlformats.org/presentationml/2006/main">
+  <p:cSld>
+    <p:spTree>
+      <p:nvGrpSpPr>
+        <p:cNvPr id="1" name="Shape 242"/>
+        <p:cNvGrpSpPr/>
+        <p:nvPr/>
+      </p:nvGrpSpPr>
+      <p:grpSpPr>
+        <a:xfrm>
+          <a:off x="0" y="0"/>
+          <a:ext cx="0" cy="0"/>
+          <a:chOff x="0" y="0"/>
+          <a:chExt cx="0" cy="0"/>
+        </a:xfrm>
+      </p:grpSpPr>
+      <p:sp>
+        <p:nvSpPr>
+          <p:cNvPr id="243" name="Google Shape;243;p45"/>
+          <p:cNvSpPr txBox="1">
+            <a:spLocks noGrp="1"/>
+          </p:cNvSpPr>
+          <p:nvPr>
+            <p:ph type="title"/>
+          </p:nvPr>
+        </p:nvSpPr>
+        <p:spPr>
+          <a:prstGeom prst="rect">
+            <a:avLst/>
+          </a:prstGeom>
+          <a:noFill/>
+          <a:ln>
+            <a:noFill/>
+          </a:ln>
+        </p:spPr>
+        <p:txBody>
+          <a:bodyPr spcFirstLastPara="1" wrap="square" lIns="121904" tIns="60935" rIns="121904" bIns="60935" anchor="t" anchorCtr="0">
+            <a:noAutofit/>
+          </a:bodyPr>
+          <a:lstStyle/>
+          <a:p>
+            <a:r>
+              <a:rPr lang="en-US" dirty="0"/>
+              <a:t>Example Interview Analysis</a:t>
+            </a:r>
+            <a:endParaRPr dirty="0">
+              <a:solidFill>
+                <a:srgbClr val="FF0000"/>
+              </a:solidFill>
+            </a:endParaRPr>
+          </a:p>
+        </p:txBody>
+      </p:sp>
+      <p:sp>
+        <p:nvSpPr>
+          <p:cNvPr id="2" name="Text Placeholder 1">
+            <a:extLst>
+              <a:ext uri="{FF2B5EF4-FFF2-40B4-BE49-F238E27FC236}">
+                <a16:creationId xmlns:a16="http://schemas.microsoft.com/office/drawing/2014/main" id="{0B6FBA02-17EB-9B44-9451-15D976348E1B}"/>
+              </a:ext>
+            </a:extLst>
+          </p:cNvPr>
+          <p:cNvSpPr>
+            <a:spLocks noGrp="1"/>
+          </p:cNvSpPr>
+          <p:nvPr>
+            <p:ph type="body" idx="1"/>
+          </p:nvPr>
+        </p:nvSpPr>
+        <p:spPr/>
+        <p:txBody>
+          <a:bodyPr>
+            <a:normAutofit/>
+          </a:bodyPr>
+          <a:lstStyle/>
+          <a:p>
+            <a:pPr marL="228611" indent="0">
+              <a:buNone/>
+            </a:pPr>
+            <a:r>
+              <a:rPr lang="en-US" dirty="0"/>
+              <a:t>“The applicant has done full-stack work ranging from cloud to front-end. Their implementation of agile, both at previous orgs and in their own startup (albeit a single-person org), shows they knows how to prioritize user needs during development. Seems like well-rounded individual contributor and a strong communicator.</a:t>
+            </a:r>
+          </a:p>
+          <a:p>
+            <a:pPr marL="228611" indent="0">
+              <a:buNone/>
+            </a:pPr>
+            <a:r>
+              <a:rPr lang="en-US" dirty="0"/>
+              <a:t>Minor concern: Knowledge on networking is on the weaker end.”</a:t>
+            </a:r>
+          </a:p>
+        </p:txBody>
+      </p:sp>
+    </p:spTree>
+    <p:extLst>
+      <p:ext uri="{BB962C8B-B14F-4D97-AF65-F5344CB8AC3E}">
+        <p14:creationId xmlns:p14="http://schemas.microsoft.com/office/powerpoint/2010/main" val="2158818839"/>
       </p:ext>
     </p:extLst>
   </p:cSld>
@@ -8700,7 +8411,7 @@
           <p:cNvPr id="2" name="Title 1">
             <a:extLst>
               <a:ext uri="{FF2B5EF4-FFF2-40B4-BE49-F238E27FC236}">
-                <a16:creationId xmlns:a16="http://schemas.microsoft.com/office/drawing/2014/main" id="{499D8981-1C90-1B42-8D01-C7AB82A1A3C2}"/>
+                <a16:creationId xmlns:a16="http://schemas.microsoft.com/office/drawing/2014/main" id="{B6628D00-F84F-B44E-B4E4-EDEACD125A1C}"/>
               </a:ext>
             </a:extLst>
           </p:cNvPr>
@@ -8711,21 +8422,18 @@
             <p:ph type="title"/>
           </p:nvPr>
         </p:nvSpPr>
-        <p:spPr/>
+        <p:spPr>
+          <a:prstGeom prst="rect">
+            <a:avLst/>
+          </a:prstGeom>
+        </p:spPr>
         <p:txBody>
           <a:bodyPr/>
           <a:lstStyle/>
           <a:p>
             <a:r>
               <a:rPr lang="en-US" dirty="0"/>
-              <a:t>AFTER THE INTERVIEW:</a:t>
-            </a:r>
-            <a:br>
-              <a:rPr lang="en-US" dirty="0"/>
-            </a:br>
-            <a:r>
-              <a:rPr lang="en-US" dirty="0"/>
-              <a:t>Writing your analysis</a:t>
+              <a:t>See an interview demo</a:t>
             </a:r>
           </a:p>
         </p:txBody>
@@ -8733,7 +8441,7 @@
     </p:spTree>
     <p:extLst>
       <p:ext uri="{BB962C8B-B14F-4D97-AF65-F5344CB8AC3E}">
-        <p14:creationId xmlns:p14="http://schemas.microsoft.com/office/powerpoint/2010/main" val="1467090001"/>
+        <p14:creationId xmlns:p14="http://schemas.microsoft.com/office/powerpoint/2010/main" val="687815027"/>
       </p:ext>
     </p:extLst>
   </p:cSld>
@@ -8787,122 +8495,6 @@
           <a:p>
             <a:r>
               <a:rPr lang="en-US" dirty="0"/>
-              <a:t>Example Interview Analysis</a:t>
-            </a:r>
-            <a:endParaRPr dirty="0">
-              <a:solidFill>
-                <a:srgbClr val="FF0000"/>
-              </a:solidFill>
-            </a:endParaRPr>
-          </a:p>
-        </p:txBody>
-      </p:sp>
-      <p:sp>
-        <p:nvSpPr>
-          <p:cNvPr id="2" name="Text Placeholder 1">
-            <a:extLst>
-              <a:ext uri="{FF2B5EF4-FFF2-40B4-BE49-F238E27FC236}">
-                <a16:creationId xmlns:a16="http://schemas.microsoft.com/office/drawing/2014/main" id="{0B6FBA02-17EB-9B44-9451-15D976348E1B}"/>
-              </a:ext>
-            </a:extLst>
-          </p:cNvPr>
-          <p:cNvSpPr>
-            <a:spLocks noGrp="1"/>
-          </p:cNvSpPr>
-          <p:nvPr>
-            <p:ph type="body" idx="1"/>
-          </p:nvPr>
-        </p:nvSpPr>
-        <p:spPr/>
-        <p:txBody>
-          <a:bodyPr>
-            <a:normAutofit/>
-          </a:bodyPr>
-          <a:lstStyle/>
-          <a:p>
-            <a:pPr marL="228611" indent="0">
-              <a:buNone/>
-            </a:pPr>
-            <a:r>
-              <a:rPr lang="en-US" dirty="0"/>
-              <a:t>“The applicant has done full-stack work ranging from cloud to front-end. Their implementation of agile, both at previous orgs and in their own startup (albeit a single-person org), shows they knows how to prioritize user needs during development. Seems like well-rounded individual contributor and a strong communicator.</a:t>
-            </a:r>
-          </a:p>
-          <a:p>
-            <a:pPr marL="228611" indent="0">
-              <a:buNone/>
-            </a:pPr>
-            <a:r>
-              <a:rPr lang="en-US" dirty="0"/>
-              <a:t>Minor concern: Knowledge on networking is on the weaker end.”</a:t>
-            </a:r>
-          </a:p>
-        </p:txBody>
-      </p:sp>
-    </p:spTree>
-    <p:extLst>
-      <p:ext uri="{BB962C8B-B14F-4D97-AF65-F5344CB8AC3E}">
-        <p14:creationId xmlns:p14="http://schemas.microsoft.com/office/powerpoint/2010/main" val="2158818839"/>
-      </p:ext>
-    </p:extLst>
-  </p:cSld>
-  <p:clrMapOvr>
-    <a:masterClrMapping/>
-  </p:clrMapOvr>
-</p:sld>
-</file>
-
-<file path=ppt/slides/slide22.xml><?xml version="1.0" encoding="utf-8"?>
-<p:sld xmlns:a="http://schemas.openxmlformats.org/drawingml/2006/main" xmlns:r="http://schemas.openxmlformats.org/officeDocument/2006/relationships" xmlns:p="http://schemas.openxmlformats.org/presentationml/2006/main">
-  <p:cSld>
-    <p:spTree>
-      <p:nvGrpSpPr>
-        <p:cNvPr id="1" name="Shape 242"/>
-        <p:cNvGrpSpPr/>
-        <p:nvPr/>
-      </p:nvGrpSpPr>
-      <p:grpSpPr>
-        <a:xfrm>
-          <a:off x="0" y="0"/>
-          <a:ext cx="0" cy="0"/>
-          <a:chOff x="0" y="0"/>
-          <a:chExt cx="0" cy="0"/>
-        </a:xfrm>
-      </p:grpSpPr>
-      <p:sp>
-        <p:nvSpPr>
-          <p:cNvPr id="243" name="Google Shape;243;p45"/>
-          <p:cNvSpPr txBox="1">
-            <a:spLocks noGrp="1"/>
-          </p:cNvSpPr>
-          <p:nvPr>
-            <p:ph type="title"/>
-          </p:nvPr>
-        </p:nvSpPr>
-        <p:spPr>
-          <a:prstGeom prst="rect">
-            <a:avLst/>
-          </a:prstGeom>
-          <a:noFill/>
-          <a:ln>
-            <a:noFill/>
-          </a:ln>
-        </p:spPr>
-        <p:txBody>
-          <a:bodyPr spcFirstLastPara="1" wrap="square" lIns="121904" tIns="60935" rIns="121904" bIns="60935" anchor="t" anchorCtr="0">
-            <a:noAutofit/>
-          </a:bodyPr>
-          <a:lstStyle/>
-          <a:p>
-            <a:r>
-              <a:rPr lang="en-US" dirty="0"/>
-              <a:t>AFTER THE INTERVIEW: </a:t>
-            </a:r>
-            <a:br>
-              <a:rPr lang="en-US" dirty="0"/>
-            </a:br>
-            <a:r>
-              <a:rPr lang="en-US" dirty="0"/>
               <a:t>Email your docs to:</a:t>
             </a:r>
             <a:br>
@@ -8933,7 +8525,7 @@
 </p:sld>
 </file>
 
-<file path=ppt/slides/slide23.xml><?xml version="1.0" encoding="utf-8"?>
+<file path=ppt/slides/slide22.xml><?xml version="1.0" encoding="utf-8"?>
 <p:sld xmlns:a="http://schemas.openxmlformats.org/drawingml/2006/main" xmlns:r="http://schemas.openxmlformats.org/officeDocument/2006/relationships" xmlns:p="http://schemas.openxmlformats.org/presentationml/2006/main">
   <p:cSld>
     <p:spTree>
@@ -9039,7 +8631,7 @@
 </p:sld>
 </file>
 
-<file path=ppt/slides/slide24.xml><?xml version="1.0" encoding="utf-8"?>
+<file path=ppt/slides/slide23.xml><?xml version="1.0" encoding="utf-8"?>
 <p:sld xmlns:a="http://schemas.openxmlformats.org/drawingml/2006/main" xmlns:r="http://schemas.openxmlformats.org/officeDocument/2006/relationships" xmlns:p="http://schemas.openxmlformats.org/presentationml/2006/main">
   <p:cSld>
     <p:spTree>
@@ -9143,7 +8735,7 @@
             </a:pPr>
             <a:r>
               <a:rPr lang="en-US" dirty="0"/>
-              <a:t>Make sure you block off the 4 time slots/day you provided to schedulers. </a:t>
+              <a:t>Make sure you block off the 4 timeslots/day you provided to schedulers. </a:t>
             </a:r>
           </a:p>
           <a:p>
@@ -9152,12 +8744,8 @@
               <a:buChar char="•"/>
             </a:pPr>
             <a:r>
-              <a:rPr lang="en-US"/>
-              <a:t>Schedule </a:t>
-            </a:r>
-            <a:r>
               <a:rPr lang="en-US" dirty="0"/>
-              <a:t>60 minutes per interview for yourself to set up/fill out/submit feedback that same day.</a:t>
+              <a:t>Schedule 30 minutes per interview for yourself to set up/fill out/submit feedback that same day.</a:t>
             </a:r>
           </a:p>
         </p:txBody>
@@ -9175,65 +8763,7 @@
 </p:sld>
 </file>
 
-<file path=ppt/slides/slide25.xml><?xml version="1.0" encoding="utf-8"?>
-<p:sld xmlns:a="http://schemas.openxmlformats.org/drawingml/2006/main" xmlns:r="http://schemas.openxmlformats.org/officeDocument/2006/relationships" xmlns:p="http://schemas.openxmlformats.org/presentationml/2006/main">
-  <p:cSld>
-    <p:spTree>
-      <p:nvGrpSpPr>
-        <p:cNvPr id="1" name=""/>
-        <p:cNvGrpSpPr/>
-        <p:nvPr/>
-      </p:nvGrpSpPr>
-      <p:grpSpPr>
-        <a:xfrm>
-          <a:off x="0" y="0"/>
-          <a:ext cx="0" cy="0"/>
-          <a:chOff x="0" y="0"/>
-          <a:chExt cx="0" cy="0"/>
-        </a:xfrm>
-      </p:grpSpPr>
-      <p:sp>
-        <p:nvSpPr>
-          <p:cNvPr id="2" name="Title 1">
-            <a:extLst>
-              <a:ext uri="{FF2B5EF4-FFF2-40B4-BE49-F238E27FC236}">
-                <a16:creationId xmlns:a16="http://schemas.microsoft.com/office/drawing/2014/main" id="{4D5CCF48-DC4B-DD49-88F7-241CFCA64AB0}"/>
-              </a:ext>
-            </a:extLst>
-          </p:cNvPr>
-          <p:cNvSpPr>
-            <a:spLocks noGrp="1"/>
-          </p:cNvSpPr>
-          <p:nvPr>
-            <p:ph type="title"/>
-          </p:nvPr>
-        </p:nvSpPr>
-        <p:spPr/>
-        <p:txBody>
-          <a:bodyPr/>
-          <a:lstStyle/>
-          <a:p>
-            <a:r>
-              <a:rPr lang="en-US" dirty="0"/>
-              <a:t>Submit interview guides within 1 business day. </a:t>
-            </a:r>
-          </a:p>
-        </p:txBody>
-      </p:sp>
-    </p:spTree>
-    <p:extLst>
-      <p:ext uri="{BB962C8B-B14F-4D97-AF65-F5344CB8AC3E}">
-        <p14:creationId xmlns:p14="http://schemas.microsoft.com/office/powerpoint/2010/main" val="3575110225"/>
-      </p:ext>
-    </p:extLst>
-  </p:cSld>
-  <p:clrMapOvr>
-    <a:masterClrMapping/>
-  </p:clrMapOvr>
-</p:sld>
-</file>
-
-<file path=ppt/slides/slide26.xml><?xml version="1.0" encoding="utf-8"?>
+<file path=ppt/slides/slide24.xml><?xml version="1.0" encoding="utf-8"?>
 <p:sld xmlns:a="http://schemas.openxmlformats.org/drawingml/2006/main" xmlns:r="http://schemas.openxmlformats.org/officeDocument/2006/relationships" xmlns:p="http://schemas.openxmlformats.org/presentationml/2006/main">
   <p:cSld>
     <p:spTree>
@@ -9352,26 +8882,22 @@
             <a:pPr lvl="1"/>
             <a:r>
               <a:rPr lang="en-US" dirty="0"/>
-              <a:t>Review interview guide</a:t>
+              <a:t>Review interview questions</a:t>
             </a:r>
           </a:p>
           <a:p>
             <a:pPr lvl="1"/>
             <a:r>
               <a:rPr lang="en-US" dirty="0"/>
-              <a:t>Conduct mock interview</a:t>
+              <a:t>Write transcripts and determine proficiency</a:t>
             </a:r>
           </a:p>
           <a:p>
             <a:pPr lvl="1"/>
             <a:r>
               <a:rPr lang="en-US" dirty="0"/>
-              <a:t>How to rate applicants</a:t>
-            </a:r>
-          </a:p>
-          <a:p>
-            <a:pPr lvl="1"/>
-            <a:endParaRPr lang="en-US" dirty="0"/>
+              <a:t>See a demo of a structured phone interview </a:t>
+            </a:r>
           </a:p>
         </p:txBody>
       </p:sp>
@@ -9607,7 +9133,7 @@
           <a:p>
             <a:r>
               <a:rPr lang="en-US" dirty="0"/>
-              <a:t>This is an examination. You are testing their knowledge of, and expertise in, the pre-defined competencies.</a:t>
+              <a:t>This is an examination. You are testing their knowledge of the pre-defined competencies.</a:t>
             </a:r>
           </a:p>
         </p:txBody>
@@ -9812,14 +9338,7 @@
           <a:p>
             <a:r>
               <a:rPr lang="en-US" dirty="0"/>
-              <a:t>OVERVIEW:</a:t>
-            </a:r>
-            <a:br>
-              <a:rPr lang="en-US" dirty="0"/>
-            </a:br>
-            <a:r>
-              <a:rPr lang="en-US" dirty="0"/>
-              <a:t>Briefly review the Interview Guide</a:t>
+              <a:t>Walk through the phone interview ratings template</a:t>
             </a:r>
           </a:p>
         </p:txBody>
@@ -9859,7 +9378,7 @@
           <p:cNvPr id="2" name="Title 1">
             <a:extLst>
               <a:ext uri="{FF2B5EF4-FFF2-40B4-BE49-F238E27FC236}">
-                <a16:creationId xmlns:a16="http://schemas.microsoft.com/office/drawing/2014/main" id="{A51D78B7-8582-3640-A7D1-3D4F1B885A1E}"/>
+                <a16:creationId xmlns:a16="http://schemas.microsoft.com/office/drawing/2014/main" id="{4D5CCF48-DC4B-DD49-88F7-241CFCA64AB0}"/>
               </a:ext>
             </a:extLst>
           </p:cNvPr>
@@ -9877,14 +9396,7 @@
           <a:p>
             <a:r>
               <a:rPr lang="en-US" dirty="0"/>
-              <a:t>ACTIVITY:</a:t>
-            </a:r>
-            <a:br>
-              <a:rPr lang="en-US" dirty="0"/>
-            </a:br>
-            <a:r>
-              <a:rPr lang="en-US" dirty="0"/>
-              <a:t>Group-based mock interview</a:t>
+              <a:t>The questions you ask have been defined in advance, but you can repeat and clarify questions if needed.</a:t>
             </a:r>
           </a:p>
         </p:txBody>
@@ -9892,7 +9404,7 @@
     </p:spTree>
     <p:extLst>
       <p:ext uri="{BB962C8B-B14F-4D97-AF65-F5344CB8AC3E}">
-        <p14:creationId xmlns:p14="http://schemas.microsoft.com/office/powerpoint/2010/main" val="2254419027"/>
+        <p14:creationId xmlns:p14="http://schemas.microsoft.com/office/powerpoint/2010/main" val="2642887974"/>
       </p:ext>
     </p:extLst>
   </p:cSld>
@@ -9965,41 +9477,18 @@
         </p:nvSpPr>
         <p:spPr/>
         <p:txBody>
-          <a:bodyPr>
-            <a:normAutofit/>
-          </a:bodyPr>
+          <a:bodyPr/>
           <a:lstStyle/>
           <a:p>
             <a:r>
               <a:rPr lang="en-US" dirty="0"/>
-              <a:t>Half the team read questions, the other half answers. Take turns</a:t>
+              <a:t>Read questions out loud as a team</a:t>
             </a:r>
           </a:p>
           <a:p>
             <a:r>
               <a:rPr lang="en-US" dirty="0"/>
-              <a:t>Get on the same page about:</a:t>
-            </a:r>
-          </a:p>
-          <a:p>
-            <a:pPr lvl="1"/>
-            <a:r>
-              <a:rPr lang="en-US" dirty="0"/>
-              <a:t>Questions and follow-ups</a:t>
-            </a:r>
-          </a:p>
-          <a:p>
-            <a:pPr lvl="1"/>
-            <a:r>
-              <a:rPr lang="en-US" dirty="0"/>
-              <a:t>Proficiency levels</a:t>
-            </a:r>
-          </a:p>
-          <a:p>
-            <a:pPr lvl="1"/>
-            <a:r>
-              <a:rPr lang="en-US" dirty="0"/>
-              <a:t>Sample responses</a:t>
+              <a:t>Clarify questions if needed</a:t>
             </a:r>
           </a:p>
         </p:txBody>

</xml_diff>

<commit_message>
interview training presso updates
</commit_message>
<xml_diff>
--- a/toolkit/phone-assessment-interviews/phone-interview-training-presentation.pptx
+++ b/toolkit/phone-assessment-interviews/phone-interview-training-presentation.pptx
@@ -1,6 +1,6 @@
 
 <file path=ppt/presentation.xml><?xml version="1.0" encoding="utf-8"?>
-<p:presentation xmlns:a="http://schemas.openxmlformats.org/drawingml/2006/main" xmlns:r="http://schemas.openxmlformats.org/officeDocument/2006/relationships" xmlns:p="http://schemas.openxmlformats.org/presentationml/2006/main" showSpecialPlsOnTitleSld="0" strictFirstAndLastChars="0" embedTrueTypeFonts="1" saveSubsetFonts="1" autoCompressPictures="0">
+<p:presentation xmlns:a="http://schemas.openxmlformats.org/drawingml/2006/main" xmlns:r="http://schemas.openxmlformats.org/officeDocument/2006/relationships" xmlns:p="http://schemas.openxmlformats.org/presentationml/2006/main" showSpecialPlsOnTitleSld="0" strictFirstAndLastChars="0" embedTrueTypeFonts="1" autoCompressPictures="0">
   <p:sldMasterIdLst>
     <p:sldMasterId id="2147483666" r:id="rId1"/>
   </p:sldMasterIdLst>
@@ -23,7 +23,7 @@
     <p:sldId id="298" r:id="rId11"/>
     <p:sldId id="370" r:id="rId12"/>
     <p:sldId id="349" r:id="rId13"/>
-    <p:sldId id="369" r:id="rId14"/>
+    <p:sldId id="388" r:id="rId14"/>
     <p:sldId id="371" r:id="rId15"/>
     <p:sldId id="372" r:id="rId16"/>
     <p:sldId id="373" r:id="rId17"/>
@@ -47,48 +47,48 @@
   <p:notesSz cx="6881813" cy="9296400"/>
   <p:embeddedFontLst>
     <p:embeddedFont>
-      <p:font typeface="Avenir" panose="020B0604020202020204" charset="0"/>
+      <p:font typeface="Avenir" panose="02000503020000020003" pitchFamily="2" charset="0"/>
       <p:regular r:id="rId35"/>
       <p:italic r:id="rId36"/>
     </p:embeddedFont>
     <p:embeddedFont>
-      <p:font typeface="Rockwell" panose="02060603020205020403" pitchFamily="18" charset="0"/>
+      <p:font typeface="Cambria" panose="02040503050406030204" pitchFamily="18" charset="0"/>
       <p:regular r:id="rId37"/>
       <p:bold r:id="rId38"/>
       <p:italic r:id="rId39"/>
       <p:boldItalic r:id="rId40"/>
     </p:embeddedFont>
     <p:embeddedFont>
-      <p:font typeface="Source Sans Pro" panose="020B0503030403020204" pitchFamily="34" charset="0"/>
+      <p:font typeface="Merriweather" pitchFamily="2" charset="77"/>
       <p:regular r:id="rId41"/>
       <p:bold r:id="rId42"/>
       <p:italic r:id="rId43"/>
       <p:boldItalic r:id="rId44"/>
     </p:embeddedFont>
     <p:embeddedFont>
-      <p:font typeface="Source Sans Pro SemiBold" panose="020B0603030403020204" pitchFamily="34" charset="0"/>
-      <p:bold r:id="rId45"/>
-      <p:boldItalic r:id="rId46"/>
+      <p:font typeface="Merriweather Sans" pitchFamily="2" charset="77"/>
+      <p:regular r:id="rId45"/>
+      <p:bold r:id="rId46"/>
+      <p:italic r:id="rId47"/>
+      <p:boldItalic r:id="rId48"/>
     </p:embeddedFont>
     <p:embeddedFont>
-      <p:font typeface="Cambria" panose="02040503050406030204" pitchFamily="18" charset="0"/>
-      <p:regular r:id="rId47"/>
-      <p:bold r:id="rId48"/>
-      <p:italic r:id="rId49"/>
-      <p:boldItalic r:id="rId50"/>
+      <p:font typeface="Rockwell" panose="02060603020205020403" pitchFamily="18" charset="77"/>
+      <p:regular r:id="rId49"/>
+      <p:bold r:id="rId50"/>
+      <p:italic r:id="rId51"/>
+      <p:boldItalic r:id="rId52"/>
     </p:embeddedFont>
     <p:embeddedFont>
-      <p:font typeface="Merriweather Sans" panose="020B0604020202020204" charset="0"/>
-      <p:regular r:id="rId51"/>
-      <p:bold r:id="rId52"/>
-      <p:italic r:id="rId53"/>
-      <p:boldItalic r:id="rId54"/>
+      <p:font typeface="Source Sans Pro" panose="020B0503030403020204" pitchFamily="34" charset="0"/>
+      <p:regular r:id="rId53"/>
+      <p:bold r:id="rId54"/>
+      <p:italic r:id="rId55"/>
+      <p:boldItalic r:id="rId56"/>
     </p:embeddedFont>
     <p:embeddedFont>
-      <p:font typeface="Merriweather" panose="00000500000000000000" pitchFamily="2" charset="0"/>
-      <p:regular r:id="rId55"/>
-      <p:bold r:id="rId56"/>
-      <p:italic r:id="rId57"/>
+      <p:font typeface="Source Sans Pro SemiBold" panose="020B0603030403020204" pitchFamily="34" charset="0"/>
+      <p:bold r:id="rId57"/>
       <p:boldItalic r:id="rId58"/>
     </p:embeddedFont>
   </p:embeddedFontLst>
@@ -449,7 +449,7 @@
           <a:p>
             <a:fld id="{5F1244B9-655E-9143-8F11-143B7EBD7CDE}" type="datetimeFigureOut">
               <a:rPr lang="en-US" smtClean="0"/>
-              <a:t>6/11/2020</a:t>
+              <a:t>6/19/20</a:t>
             </a:fld>
             <a:endParaRPr lang="en-US"/>
           </a:p>
@@ -1822,11 +1822,11 @@
           <a:lstStyle/>
           <a:p>
             <a:r>
-              <a:rPr lang="en-US" dirty="0" smtClean="0"/>
+              <a:rPr lang="en-US" dirty="0"/>
               <a:t>Need a generic slide about proficiency determinations record every proficiency determinate reflecting the competency levels –</a:t>
             </a:r>
             <a:r>
-              <a:rPr lang="en-US" baseline="0" dirty="0" smtClean="0"/>
+              <a:rPr lang="en-US" baseline="0" dirty="0"/>
               <a:t> make a slide here  - go the slide deck </a:t>
             </a:r>
             <a:endParaRPr lang="en-US" dirty="0"/>
@@ -2805,11 +2805,10 @@
               <a:rPr lang="en-US" baseline="0" dirty="0"/>
               <a:t>They can still qualify if you can assess the final competency with the information from the other questions - you still have an hour’s worth of information. You cannot give different amounts of time to each applicant. That would invalidate all the interview results. </a:t>
             </a:r>
-            <a:endParaRPr lang="en-US" baseline="0" dirty="0" smtClean="0"/>
           </a:p>
           <a:p>
             <a:pPr marL="0" indent="0" algn="l"/>
-            <a:endParaRPr lang="en-US" baseline="0" dirty="0" smtClean="0">
+            <a:endParaRPr lang="en-US" baseline="0" dirty="0">
               <a:solidFill>
                 <a:srgbClr val="FF0000"/>
               </a:solidFill>
@@ -2818,7 +2817,7 @@
           <a:p>
             <a:pPr marL="0" indent="0" algn="l"/>
             <a:r>
-              <a:rPr lang="en-US" baseline="0" dirty="0" smtClean="0">
+              <a:rPr lang="en-US" baseline="0" dirty="0">
                 <a:solidFill>
                   <a:srgbClr val="FF0000"/>
                 </a:solidFill>
@@ -3510,11 +3509,10 @@
               <a:rPr lang="en-US" baseline="0" dirty="0"/>
               <a:t> questions and follow up questions- if not already answered; probes are optional- you can keep repeating “can you tell me more about that” if you want. </a:t>
             </a:r>
-            <a:endParaRPr lang="en-US" baseline="0" dirty="0" smtClean="0"/>
-          </a:p>
-          <a:p>
-            <a:r>
-              <a:rPr lang="en-US" baseline="0" dirty="0" smtClean="0"/>
+          </a:p>
+          <a:p>
+            <a:r>
+              <a:rPr lang="en-US" baseline="0" dirty="0"/>
               <a:t>Organizer: replace with one of your questions to be used as an example. You can be more specific in this case. </a:t>
             </a:r>
             <a:endParaRPr lang="en-US" dirty="0"/>
@@ -3772,14 +3770,6 @@
           <a:bodyPr/>
           <a:lstStyle/>
           <a:p>
-            <a:r>
-              <a:rPr lang="en-US" dirty="0" smtClean="0"/>
-              <a:t>Did</a:t>
-            </a:r>
-            <a:r>
-              <a:rPr lang="en-US" baseline="0" dirty="0" smtClean="0"/>
-              <a:t> they read the required proficiency for each competency? </a:t>
-            </a:r>
             <a:endParaRPr lang="en-US" dirty="0"/>
           </a:p>
         </p:txBody>
@@ -3787,7 +3777,7 @@
     </p:spTree>
     <p:extLst>
       <p:ext uri="{BB962C8B-B14F-4D97-AF65-F5344CB8AC3E}">
-        <p14:creationId xmlns:p14="http://schemas.microsoft.com/office/powerpoint/2010/main" val="3642137064"/>
+        <p14:creationId xmlns:p14="http://schemas.microsoft.com/office/powerpoint/2010/main" val="1797249047"/>
       </p:ext>
     </p:extLst>
   </p:cSld>
@@ -5835,7 +5825,7 @@
             <a:fld id="{42D41BD8-F932-40AA-8DAC-647898DB09A3}" type="datetime1">
               <a:rPr lang="en-US" smtClean="0"/>
               <a:pPr/>
-              <a:t>6/11/2020</a:t>
+              <a:t>6/19/20</a:t>
             </a:fld>
             <a:endParaRPr lang="en-US" dirty="0"/>
           </a:p>
@@ -7459,19 +7449,7 @@
               <a:rPr lang="en-US" dirty="0">
                 <a:sym typeface="Cambria"/>
               </a:rPr>
-              <a:t>&lt;</a:t>
-            </a:r>
-            <a:r>
-              <a:rPr lang="en-US" dirty="0" smtClean="0">
-                <a:sym typeface="Cambria"/>
-              </a:rPr>
-              <a:t>Agency Name</a:t>
-            </a:r>
-            <a:r>
-              <a:rPr lang="en-US" dirty="0">
-                <a:sym typeface="Cambria"/>
-              </a:rPr>
-              <a:t>&gt;</a:t>
+              <a:t>&lt;Agency Name&gt;</a:t>
             </a:r>
             <a:br>
               <a:rPr lang="en-US" dirty="0">
@@ -7943,7 +7921,13 @@
       </p:grpSpPr>
       <p:sp>
         <p:nvSpPr>
-          <p:cNvPr id="2" name="Title 1"/>
+          <p:cNvPr id="2" name="Title 1">
+            <a:extLst>
+              <a:ext uri="{FF2B5EF4-FFF2-40B4-BE49-F238E27FC236}">
+                <a16:creationId xmlns:a16="http://schemas.microsoft.com/office/drawing/2014/main" id="{BF8031E5-EB57-9049-BE52-DBF1A846D494}"/>
+              </a:ext>
+            </a:extLst>
+          </p:cNvPr>
           <p:cNvSpPr>
             <a:spLocks noGrp="1"/>
           </p:cNvSpPr>
@@ -7951,12 +7935,7 @@
             <p:ph type="title"/>
           </p:nvPr>
         </p:nvSpPr>
-        <p:spPr>
-          <a:xfrm>
-            <a:off x="1732021" y="972036"/>
-            <a:ext cx="13953626" cy="1114342"/>
-          </a:xfrm>
-        </p:spPr>
+        <p:spPr/>
         <p:txBody>
           <a:bodyPr/>
           <a:lstStyle/>
@@ -7968,13 +7947,68 @@
             <a:br>
               <a:rPr lang="en-US" dirty="0"/>
             </a:br>
-            <a:endParaRPr lang="en-US" dirty="0"/>
+            <a:endParaRPr lang="en-US" dirty="0">
+              <a:solidFill>
+                <a:srgbClr val="FF0000"/>
+              </a:solidFill>
+            </a:endParaRPr>
           </a:p>
         </p:txBody>
       </p:sp>
       <p:sp>
         <p:nvSpPr>
-          <p:cNvPr id="3" name="Title 1"/>
+          <p:cNvPr id="3" name="Text Placeholder 2">
+            <a:extLst>
+              <a:ext uri="{FF2B5EF4-FFF2-40B4-BE49-F238E27FC236}">
+                <a16:creationId xmlns:a16="http://schemas.microsoft.com/office/drawing/2014/main" id="{FD03A124-FDED-5044-B367-5AD42873107B}"/>
+              </a:ext>
+            </a:extLst>
+          </p:cNvPr>
+          <p:cNvSpPr>
+            <a:spLocks noGrp="1"/>
+          </p:cNvSpPr>
+          <p:nvPr>
+            <p:ph type="body" idx="1"/>
+          </p:nvPr>
+        </p:nvSpPr>
+        <p:spPr>
+          <a:xfrm>
+            <a:off x="1192144" y="1841500"/>
+            <a:ext cx="5854116" cy="7131050"/>
+          </a:xfrm>
+        </p:spPr>
+        <p:txBody>
+          <a:bodyPr>
+            <a:normAutofit/>
+          </a:bodyPr>
+          <a:lstStyle/>
+          <a:p>
+            <a:pPr marL="171467" indent="0">
+              <a:buNone/>
+            </a:pPr>
+            <a:r>
+              <a:rPr lang="en-US" sz="4800" dirty="0"/>
+              <a:t>First Interview</a:t>
+            </a:r>
+            <a:endParaRPr lang="en-US" dirty="0"/>
+          </a:p>
+          <a:p>
+            <a:r>
+              <a:rPr lang="en-US" dirty="0"/>
+              <a:t>Which proficiency level is met for each of the competencies? </a:t>
+            </a:r>
+          </a:p>
+        </p:txBody>
+      </p:sp>
+      <p:sp>
+        <p:nvSpPr>
+          <p:cNvPr id="4" name="Text Placeholder 2">
+            <a:extLst>
+              <a:ext uri="{FF2B5EF4-FFF2-40B4-BE49-F238E27FC236}">
+                <a16:creationId xmlns:a16="http://schemas.microsoft.com/office/drawing/2014/main" id="{5C88F4D3-5E64-B049-A6CE-2DE84A0D948B}"/>
+              </a:ext>
+            </a:extLst>
+          </p:cNvPr>
           <p:cNvSpPr txBox="1">
             <a:spLocks/>
           </p:cNvSpPr>
@@ -7982,8 +8016,323 @@
         </p:nvSpPr>
         <p:spPr>
           <a:xfrm>
-            <a:off x="1732021" y="3043387"/>
-            <a:ext cx="5171054" cy="4954393"/>
+            <a:off x="9520356" y="1841500"/>
+            <a:ext cx="5854116" cy="7131050"/>
+          </a:xfrm>
+          <a:prstGeom prst="rect">
+            <a:avLst/>
+          </a:prstGeom>
+          <a:noFill/>
+          <a:ln>
+            <a:noFill/>
+          </a:ln>
+        </p:spPr>
+        <p:txBody>
+          <a:bodyPr spcFirstLastPara="1" wrap="square" lIns="0" tIns="0" rIns="0" bIns="0" anchor="t" anchorCtr="0">
+            <a:normAutofit/>
+          </a:bodyPr>
+          <a:lstStyle>
+            <a:defPPr marR="0" lvl="0" algn="l" rtl="0">
+              <a:lnSpc>
+                <a:spcPct val="100000"/>
+              </a:lnSpc>
+              <a:spcBef>
+                <a:spcPts val="0"/>
+              </a:spcBef>
+              <a:spcAft>
+                <a:spcPts val="0"/>
+              </a:spcAft>
+            </a:defPPr>
+            <a:lvl1pPr marL="457246" marR="0" lvl="0" indent="-285779" algn="l" rtl="0">
+              <a:lnSpc>
+                <a:spcPct val="100000"/>
+              </a:lnSpc>
+              <a:spcBef>
+                <a:spcPts val="4200"/>
+              </a:spcBef>
+              <a:spcAft>
+                <a:spcPts val="0"/>
+              </a:spcAft>
+              <a:buClr>
+                <a:schemeClr val="tx2"/>
+              </a:buClr>
+              <a:buSzPct val="112000"/>
+              <a:buFont typeface="Arial" panose="020B0604020202020204" pitchFamily="34" charset="0"/>
+              <a:buChar char="•"/>
+              <a:defRPr sz="3600" b="0" i="0" u="none" strike="noStrike" cap="none">
+                <a:solidFill>
+                  <a:schemeClr val="tx2"/>
+                </a:solidFill>
+                <a:latin typeface="+mn-lt"/>
+                <a:ea typeface="Source Sans Pro" panose="020B0503030403020204" pitchFamily="34" charset="0"/>
+                <a:cs typeface="Avenir"/>
+                <a:sym typeface="Avenir"/>
+              </a:defRPr>
+            </a:lvl1pPr>
+            <a:lvl2pPr marL="914492" marR="0" lvl="1" indent="-285779" algn="l" rtl="0">
+              <a:lnSpc>
+                <a:spcPct val="100000"/>
+              </a:lnSpc>
+              <a:spcBef>
+                <a:spcPts val="4200"/>
+              </a:spcBef>
+              <a:spcAft>
+                <a:spcPts val="0"/>
+              </a:spcAft>
+              <a:buClr>
+                <a:schemeClr val="tx2"/>
+              </a:buClr>
+              <a:buSzPct val="112000"/>
+              <a:buFont typeface="Arial" panose="020B0604020202020204" pitchFamily="34" charset="0"/>
+              <a:buChar char="•"/>
+              <a:defRPr sz="3600" b="0" i="0" u="none" strike="noStrike" cap="none">
+                <a:solidFill>
+                  <a:schemeClr val="tx2"/>
+                </a:solidFill>
+                <a:latin typeface="+mn-lt"/>
+                <a:ea typeface="Source Sans Pro" panose="020B0503030403020204" pitchFamily="34" charset="0"/>
+                <a:cs typeface="Avenir"/>
+                <a:sym typeface="Avenir"/>
+              </a:defRPr>
+            </a:lvl2pPr>
+            <a:lvl3pPr marL="1371737" marR="0" lvl="2" indent="-314357" algn="l" rtl="0">
+              <a:lnSpc>
+                <a:spcPct val="100000"/>
+              </a:lnSpc>
+              <a:spcBef>
+                <a:spcPts val="4200"/>
+              </a:spcBef>
+              <a:spcAft>
+                <a:spcPts val="0"/>
+              </a:spcAft>
+              <a:buClr>
+                <a:schemeClr val="tx2"/>
+              </a:buClr>
+              <a:buSzPct val="112000"/>
+              <a:buFont typeface="Arial" panose="020B0604020202020204" pitchFamily="34" charset="0"/>
+              <a:buChar char="•"/>
+              <a:defRPr sz="3600" b="0" i="0" u="none" strike="noStrike" cap="none">
+                <a:solidFill>
+                  <a:schemeClr val="tx2"/>
+                </a:solidFill>
+                <a:latin typeface="+mn-lt"/>
+                <a:ea typeface="Source Sans Pro" panose="020B0503030403020204" pitchFamily="34" charset="0"/>
+                <a:cs typeface="Avenir"/>
+                <a:sym typeface="Avenir"/>
+              </a:defRPr>
+            </a:lvl3pPr>
+            <a:lvl4pPr marL="1828984" marR="0" lvl="3" indent="-314357" algn="l" rtl="0">
+              <a:lnSpc>
+                <a:spcPct val="100000"/>
+              </a:lnSpc>
+              <a:spcBef>
+                <a:spcPts val="4200"/>
+              </a:spcBef>
+              <a:spcAft>
+                <a:spcPts val="0"/>
+              </a:spcAft>
+              <a:buClr>
+                <a:schemeClr val="tx2"/>
+              </a:buClr>
+              <a:buSzPct val="112000"/>
+              <a:buFont typeface="Arial" panose="020B0604020202020204" pitchFamily="34" charset="0"/>
+              <a:buChar char="•"/>
+              <a:defRPr sz="3600" b="0" i="0" u="none" strike="noStrike" cap="none">
+                <a:solidFill>
+                  <a:schemeClr val="tx2"/>
+                </a:solidFill>
+                <a:latin typeface="+mn-lt"/>
+                <a:ea typeface="Source Sans Pro" panose="020B0503030403020204" pitchFamily="34" charset="0"/>
+                <a:cs typeface="Avenir"/>
+                <a:sym typeface="Avenir"/>
+              </a:defRPr>
+            </a:lvl4pPr>
+            <a:lvl5pPr marL="2286228" marR="0" lvl="4" indent="-314357" algn="l" rtl="0">
+              <a:lnSpc>
+                <a:spcPct val="100000"/>
+              </a:lnSpc>
+              <a:spcBef>
+                <a:spcPts val="4200"/>
+              </a:spcBef>
+              <a:spcAft>
+                <a:spcPts val="0"/>
+              </a:spcAft>
+              <a:buClr>
+                <a:schemeClr val="tx2"/>
+              </a:buClr>
+              <a:buSzPct val="112000"/>
+              <a:buFont typeface="Arial" panose="020B0604020202020204" pitchFamily="34" charset="0"/>
+              <a:buChar char="•"/>
+              <a:defRPr sz="3600" b="0" i="0" u="none" strike="noStrike" cap="none">
+                <a:solidFill>
+                  <a:schemeClr val="tx2"/>
+                </a:solidFill>
+                <a:latin typeface="+mn-lt"/>
+                <a:ea typeface="Source Sans Pro" panose="020B0503030403020204" pitchFamily="34" charset="0"/>
+                <a:cs typeface="Avenir"/>
+                <a:sym typeface="Avenir"/>
+              </a:defRPr>
+            </a:lvl5pPr>
+            <a:lvl6pPr marL="2743475" marR="0" lvl="5" indent="-314357" algn="l" rtl="0">
+              <a:lnSpc>
+                <a:spcPct val="100000"/>
+              </a:lnSpc>
+              <a:spcBef>
+                <a:spcPts val="4200"/>
+              </a:spcBef>
+              <a:spcAft>
+                <a:spcPts val="0"/>
+              </a:spcAft>
+              <a:buClr>
+                <a:srgbClr val="000000"/>
+              </a:buClr>
+              <a:buSzPts val="1350"/>
+              <a:buFont typeface="Rockwell"/>
+              <a:buChar char="•"/>
+              <a:defRPr sz="3600" b="0" i="0" u="none" strike="noStrike" cap="none">
+                <a:solidFill>
+                  <a:srgbClr val="000000"/>
+                </a:solidFill>
+                <a:latin typeface="Rockwell"/>
+                <a:ea typeface="Rockwell"/>
+                <a:cs typeface="Rockwell"/>
+                <a:sym typeface="Rockwell"/>
+              </a:defRPr>
+            </a:lvl6pPr>
+            <a:lvl7pPr marL="3200720" marR="0" lvl="6" indent="-314357" algn="l" rtl="0">
+              <a:lnSpc>
+                <a:spcPct val="100000"/>
+              </a:lnSpc>
+              <a:spcBef>
+                <a:spcPts val="4200"/>
+              </a:spcBef>
+              <a:spcAft>
+                <a:spcPts val="0"/>
+              </a:spcAft>
+              <a:buClr>
+                <a:srgbClr val="000000"/>
+              </a:buClr>
+              <a:buSzPts val="1350"/>
+              <a:buFont typeface="Rockwell"/>
+              <a:buChar char="•"/>
+              <a:defRPr sz="3600" b="0" i="0" u="none" strike="noStrike" cap="none">
+                <a:solidFill>
+                  <a:srgbClr val="000000"/>
+                </a:solidFill>
+                <a:latin typeface="Rockwell"/>
+                <a:ea typeface="Rockwell"/>
+                <a:cs typeface="Rockwell"/>
+                <a:sym typeface="Rockwell"/>
+              </a:defRPr>
+            </a:lvl7pPr>
+            <a:lvl8pPr marL="3657966" marR="0" lvl="7" indent="-314357" algn="l" rtl="0">
+              <a:lnSpc>
+                <a:spcPct val="100000"/>
+              </a:lnSpc>
+              <a:spcBef>
+                <a:spcPts val="4200"/>
+              </a:spcBef>
+              <a:spcAft>
+                <a:spcPts val="0"/>
+              </a:spcAft>
+              <a:buClr>
+                <a:srgbClr val="000000"/>
+              </a:buClr>
+              <a:buSzPts val="1350"/>
+              <a:buFont typeface="Rockwell"/>
+              <a:buChar char="•"/>
+              <a:defRPr sz="3600" b="0" i="0" u="none" strike="noStrike" cap="none">
+                <a:solidFill>
+                  <a:srgbClr val="000000"/>
+                </a:solidFill>
+                <a:latin typeface="Rockwell"/>
+                <a:ea typeface="Rockwell"/>
+                <a:cs typeface="Rockwell"/>
+                <a:sym typeface="Rockwell"/>
+              </a:defRPr>
+            </a:lvl8pPr>
+            <a:lvl9pPr marL="4115212" marR="0" lvl="8" indent="-314357" algn="l" rtl="0">
+              <a:lnSpc>
+                <a:spcPct val="100000"/>
+              </a:lnSpc>
+              <a:spcBef>
+                <a:spcPts val="4200"/>
+              </a:spcBef>
+              <a:spcAft>
+                <a:spcPts val="0"/>
+              </a:spcAft>
+              <a:buClr>
+                <a:srgbClr val="000000"/>
+              </a:buClr>
+              <a:buSzPts val="1350"/>
+              <a:buFont typeface="Rockwell"/>
+              <a:buChar char="•"/>
+              <a:defRPr sz="3600" b="0" i="0" u="none" strike="noStrike" cap="none">
+                <a:solidFill>
+                  <a:srgbClr val="000000"/>
+                </a:solidFill>
+                <a:latin typeface="Rockwell"/>
+                <a:ea typeface="Rockwell"/>
+                <a:cs typeface="Rockwell"/>
+                <a:sym typeface="Rockwell"/>
+              </a:defRPr>
+            </a:lvl9pPr>
+          </a:lstStyle>
+          <a:p>
+            <a:pPr marL="171467" lvl="0" indent="0">
+              <a:buClr>
+                <a:srgbClr val="454545"/>
+              </a:buClr>
+              <a:buNone/>
+            </a:pPr>
+            <a:r>
+              <a:rPr lang="en-US" sz="4800" dirty="0">
+                <a:solidFill>
+                  <a:srgbClr val="454545"/>
+                </a:solidFill>
+              </a:rPr>
+              <a:t>Second Interview</a:t>
+            </a:r>
+          </a:p>
+          <a:p>
+            <a:r>
+              <a:rPr lang="en-US" dirty="0"/>
+              <a:t>Which proficiency level is met for each of the competencies? </a:t>
+            </a:r>
+          </a:p>
+          <a:p>
+            <a:pPr marL="171467" lvl="0" indent="0">
+              <a:buClr>
+                <a:srgbClr val="454545"/>
+              </a:buClr>
+              <a:buNone/>
+            </a:pPr>
+            <a:endParaRPr lang="en-US" sz="4800" dirty="0">
+              <a:solidFill>
+                <a:srgbClr val="454545"/>
+              </a:solidFill>
+            </a:endParaRPr>
+          </a:p>
+        </p:txBody>
+      </p:sp>
+      <p:sp>
+        <p:nvSpPr>
+          <p:cNvPr id="5" name="Title 1">
+            <a:extLst>
+              <a:ext uri="{FF2B5EF4-FFF2-40B4-BE49-F238E27FC236}">
+                <a16:creationId xmlns:a16="http://schemas.microsoft.com/office/drawing/2014/main" id="{48382B66-7FE4-D04C-A1F1-0C5115A2EFA7}"/>
+              </a:ext>
+            </a:extLst>
+          </p:cNvPr>
+          <p:cNvSpPr txBox="1">
+            <a:spLocks/>
+          </p:cNvSpPr>
+          <p:nvPr/>
+        </p:nvSpPr>
+        <p:spPr>
+          <a:xfrm>
+            <a:off x="949287" y="6938682"/>
+            <a:ext cx="15441768" cy="2521503"/>
           </a:xfrm>
           <a:prstGeom prst="rect">
             <a:avLst/>
@@ -8243,7 +8592,7 @@
             </a:lvl9pPr>
           </a:lstStyle>
           <a:p>
-            <a:pPr marL="0" marR="0" lvl="0" indent="0" algn="l" defTabSz="914400" rtl="0" eaLnBrk="1" fontAlgn="auto" latinLnBrk="0" hangingPunct="1">
+            <a:pPr marL="0" marR="0" lvl="0" indent="0" algn="ctr" defTabSz="914400" rtl="0" eaLnBrk="1" fontAlgn="auto" latinLnBrk="0" hangingPunct="1">
               <a:lnSpc>
                 <a:spcPct val="100000"/>
               </a:lnSpc>
@@ -8263,7 +8612,7 @@
               <a:defRPr/>
             </a:pPr>
             <a:r>
-              <a:rPr kumimoji="0" lang="en-US" sz="6000" b="0" i="0" u="none" strike="noStrike" kern="0" cap="none" spc="0" normalizeH="0" baseline="0" noProof="0" dirty="0">
+              <a:rPr kumimoji="0" lang="en-US" sz="4000" b="1" i="0" u="none" strike="noStrike" kern="0" cap="none" spc="0" normalizeH="0" baseline="0" noProof="0" dirty="0">
                 <a:ln>
                   <a:noFill/>
                 </a:ln>
@@ -8277,30 +8626,25 @@
                 <a:ea typeface="Source Sans Pro" panose="020B0503030403020204" pitchFamily="34" charset="0"/>
                 <a:sym typeface="Avenir"/>
               </a:rPr>
-              <a:t>First Interview</a:t>
-            </a:r>
-          </a:p>
-          <a:p>
-            <a:pPr marL="0" marR="0" lvl="0" indent="0" algn="l" defTabSz="914400" rtl="0" eaLnBrk="1" fontAlgn="auto" latinLnBrk="0" hangingPunct="1">
-              <a:lnSpc>
-                <a:spcPct val="100000"/>
-              </a:lnSpc>
-              <a:spcBef>
-                <a:spcPts val="0"/>
-              </a:spcBef>
-              <a:spcAft>
-                <a:spcPts val="0"/>
-              </a:spcAft>
-              <a:buClr>
-                <a:srgbClr val="000000"/>
-              </a:buClr>
-              <a:buSzPts val="1400"/>
-              <a:buFont typeface="Arial"/>
-              <a:buNone/>
-              <a:tabLst/>
-              <a:defRPr/>
-            </a:pPr>
-            <a:endParaRPr kumimoji="0" lang="en-US" sz="6000" b="0" i="0" u="none" strike="noStrike" kern="0" cap="none" spc="0" normalizeH="0" baseline="0" noProof="0" dirty="0">
+              <a:t>Make sure you are not the same reviewer for both interviews for the same applicant. </a:t>
+            </a:r>
+            <a:br>
+              <a:rPr kumimoji="0" lang="en-US" sz="4800" b="1" i="0" u="none" strike="noStrike" kern="0" cap="none" spc="0" normalizeH="0" baseline="0" noProof="0" dirty="0">
+                <a:ln>
+                  <a:noFill/>
+                </a:ln>
+                <a:solidFill>
+                  <a:srgbClr val="2C608A"/>
+                </a:solidFill>
+                <a:effectLst/>
+                <a:uLnTx/>
+                <a:uFillTx/>
+                <a:latin typeface="Arial"/>
+                <a:ea typeface="Source Sans Pro" panose="020B0503030403020204" pitchFamily="34" charset="0"/>
+                <a:sym typeface="Avenir"/>
+              </a:rPr>
+            </a:br>
+            <a:endParaRPr kumimoji="0" lang="en-US" sz="4800" b="1" i="0" u="none" strike="noStrike" kern="0" cap="none" spc="0" normalizeH="0" baseline="0" noProof="0" dirty="0">
               <a:ln>
                 <a:noFill/>
               </a:ln>
@@ -8315,917 +8659,68 @@
               <a:sym typeface="Avenir"/>
             </a:endParaRPr>
           </a:p>
-          <a:p>
-            <a:pPr marL="0" marR="0" lvl="0" indent="0" algn="l" defTabSz="914400" rtl="0" eaLnBrk="1" fontAlgn="auto" latinLnBrk="0" hangingPunct="1">
-              <a:lnSpc>
-                <a:spcPct val="100000"/>
-              </a:lnSpc>
-              <a:spcBef>
-                <a:spcPts val="0"/>
-              </a:spcBef>
-              <a:spcAft>
-                <a:spcPts val="0"/>
-              </a:spcAft>
-              <a:buClr>
-                <a:srgbClr val="000000"/>
-              </a:buClr>
-              <a:buSzPts val="1400"/>
-              <a:buFont typeface="Arial"/>
-              <a:buNone/>
-              <a:tabLst/>
-              <a:defRPr/>
-            </a:pPr>
-            <a:r>
-              <a:rPr kumimoji="0" lang="en-US" sz="3600" b="0" i="0" u="none" strike="noStrike" kern="0" cap="none" spc="0" normalizeH="0" baseline="0" noProof="0" dirty="0">
-                <a:ln>
-                  <a:noFill/>
-                </a:ln>
-                <a:solidFill>
-                  <a:srgbClr val="2C608A"/>
-                </a:solidFill>
-                <a:effectLst/>
-                <a:uLnTx/>
-                <a:uFillTx/>
-                <a:latin typeface="Arial"/>
-                <a:ea typeface="Source Sans Pro" panose="020B0503030403020204" pitchFamily="34" charset="0"/>
-                <a:sym typeface="Avenir"/>
-              </a:rPr>
-              <a:t>Did the applicant meet the required proficiency </a:t>
-            </a:r>
-            <a:r>
-              <a:rPr kumimoji="0" lang="en-US" sz="3600" b="0" i="0" u="none" strike="noStrike" kern="0" cap="none" spc="0" normalizeH="0" baseline="0" noProof="0" dirty="0" smtClean="0">
-                <a:ln>
-                  <a:noFill/>
-                </a:ln>
-                <a:solidFill>
-                  <a:srgbClr val="2C608A"/>
-                </a:solidFill>
-                <a:effectLst/>
-                <a:uLnTx/>
-                <a:uFillTx/>
-                <a:latin typeface="Arial"/>
-                <a:ea typeface="Source Sans Pro" panose="020B0503030403020204" pitchFamily="34" charset="0"/>
-                <a:sym typeface="Avenir"/>
-              </a:rPr>
-              <a:t>for </a:t>
-            </a:r>
-            <a:r>
-              <a:rPr kumimoji="0" lang="en-US" sz="3600" b="0" i="0" u="none" strike="noStrike" kern="0" cap="none" spc="0" normalizeH="0" baseline="0" noProof="0" dirty="0">
-                <a:ln>
-                  <a:noFill/>
-                </a:ln>
-                <a:solidFill>
-                  <a:srgbClr val="2C608A"/>
-                </a:solidFill>
-                <a:effectLst/>
-                <a:uLnTx/>
-                <a:uFillTx/>
-                <a:latin typeface="Arial"/>
-                <a:ea typeface="Source Sans Pro" panose="020B0503030403020204" pitchFamily="34" charset="0"/>
-                <a:sym typeface="Avenir"/>
-              </a:rPr>
-              <a:t>each competency?</a:t>
-            </a:r>
-            <a:br>
-              <a:rPr kumimoji="0" lang="en-US" sz="3600" b="0" i="0" u="none" strike="noStrike" kern="0" cap="none" spc="0" normalizeH="0" baseline="0" noProof="0" dirty="0">
-                <a:ln>
-                  <a:noFill/>
-                </a:ln>
-                <a:solidFill>
-                  <a:srgbClr val="2C608A"/>
-                </a:solidFill>
-                <a:effectLst/>
-                <a:uLnTx/>
-                <a:uFillTx/>
-                <a:latin typeface="Arial"/>
-                <a:ea typeface="Source Sans Pro" panose="020B0503030403020204" pitchFamily="34" charset="0"/>
-                <a:sym typeface="Avenir"/>
-              </a:rPr>
-            </a:br>
-            <a:endParaRPr kumimoji="0" lang="en-US" sz="3600" b="0" i="0" u="none" strike="noStrike" kern="0" cap="none" spc="0" normalizeH="0" baseline="0" noProof="0" dirty="0">
-              <a:ln>
-                <a:noFill/>
-              </a:ln>
-              <a:solidFill>
-                <a:srgbClr val="2C608A"/>
-              </a:solidFill>
-              <a:effectLst/>
-              <a:uLnTx/>
-              <a:uFillTx/>
-              <a:latin typeface="Arial"/>
-              <a:ea typeface="Source Sans Pro" panose="020B0503030403020204" pitchFamily="34" charset="0"/>
-              <a:sym typeface="Avenir"/>
-            </a:endParaRPr>
-          </a:p>
         </p:txBody>
       </p:sp>
       <p:sp>
         <p:nvSpPr>
-          <p:cNvPr id="4" name="Title 1"/>
-          <p:cNvSpPr txBox="1">
-            <a:spLocks/>
-          </p:cNvSpPr>
+          <p:cNvPr id="6" name="Rectangle 5">
+            <a:extLst>
+              <a:ext uri="{FF2B5EF4-FFF2-40B4-BE49-F238E27FC236}">
+                <a16:creationId xmlns:a16="http://schemas.microsoft.com/office/drawing/2014/main" id="{6924DB25-BD8E-E749-B886-0DD85B0DFFAC}"/>
+              </a:ext>
+            </a:extLst>
+          </p:cNvPr>
+          <p:cNvSpPr/>
           <p:nvPr/>
         </p:nvSpPr>
         <p:spPr>
           <a:xfrm>
-            <a:off x="8528529" y="3043386"/>
-            <a:ext cx="7441274" cy="4954393"/>
+            <a:off x="7765822" y="438210"/>
+            <a:ext cx="8382378" cy="1831310"/>
           </a:xfrm>
           <a:prstGeom prst="rect">
             <a:avLst/>
           </a:prstGeom>
-          <a:noFill/>
-          <a:ln>
-            <a:noFill/>
-          </a:ln>
+          <a:solidFill>
+            <a:srgbClr val="FFFF00"/>
+          </a:solidFill>
         </p:spPr>
+        <p:style>
+          <a:lnRef idx="2">
+            <a:schemeClr val="accent1">
+              <a:shade val="50000"/>
+            </a:schemeClr>
+          </a:lnRef>
+          <a:fillRef idx="1">
+            <a:schemeClr val="accent1"/>
+          </a:fillRef>
+          <a:effectRef idx="0">
+            <a:schemeClr val="accent1"/>
+          </a:effectRef>
+          <a:fontRef idx="minor">
+            <a:schemeClr val="lt1"/>
+          </a:fontRef>
+        </p:style>
         <p:txBody>
-          <a:bodyPr spcFirstLastPara="1" wrap="square" lIns="91425" tIns="45700" rIns="91425" bIns="45700" anchor="t" anchorCtr="0"/>
-          <a:lstStyle>
-            <a:defPPr marR="0" lvl="0" algn="l" rtl="0">
-              <a:lnSpc>
-                <a:spcPct val="100000"/>
-              </a:lnSpc>
-              <a:spcBef>
-                <a:spcPts val="0"/>
-              </a:spcBef>
-              <a:spcAft>
-                <a:spcPts val="0"/>
-              </a:spcAft>
-            </a:defPPr>
-            <a:lvl1pPr marR="0" lvl="0" algn="l" rtl="0">
-              <a:lnSpc>
-                <a:spcPct val="100000"/>
-              </a:lnSpc>
-              <a:spcBef>
-                <a:spcPts val="0"/>
-              </a:spcBef>
-              <a:spcAft>
-                <a:spcPts val="0"/>
-              </a:spcAft>
-              <a:buClr>
-                <a:srgbClr val="000000"/>
-              </a:buClr>
-              <a:buSzPts val="1400"/>
-              <a:buFont typeface="Arial"/>
-              <a:buNone/>
-              <a:defRPr sz="6000" b="0" i="0" u="none" strike="noStrike" cap="none">
-                <a:solidFill>
-                  <a:schemeClr val="tx1"/>
-                </a:solidFill>
-                <a:latin typeface="+mj-lt"/>
-                <a:ea typeface="Source Sans Pro" panose="020B0503030403020204" pitchFamily="34" charset="0"/>
-                <a:cs typeface="Merriweather" pitchFamily="2" charset="77"/>
-                <a:sym typeface="Avenir"/>
-              </a:defRPr>
-            </a:lvl1pPr>
-            <a:lvl2pPr marR="0" lvl="1" algn="ctr" rtl="0">
-              <a:lnSpc>
-                <a:spcPct val="100000"/>
-              </a:lnSpc>
-              <a:spcBef>
-                <a:spcPts val="0"/>
-              </a:spcBef>
-              <a:spcAft>
-                <a:spcPts val="0"/>
-              </a:spcAft>
-              <a:buClr>
-                <a:srgbClr val="000000"/>
-              </a:buClr>
-              <a:buSzPts val="1400"/>
-              <a:buFont typeface="Arial"/>
-              <a:buNone/>
-              <a:defRPr sz="8000" b="0" i="0" u="none" strike="noStrike" cap="none">
-                <a:solidFill>
-                  <a:srgbClr val="000000"/>
-                </a:solidFill>
-                <a:latin typeface="Rockwell"/>
-                <a:ea typeface="Rockwell"/>
-                <a:cs typeface="Rockwell"/>
-                <a:sym typeface="Rockwell"/>
-              </a:defRPr>
-            </a:lvl2pPr>
-            <a:lvl3pPr marR="0" lvl="2" algn="ctr" rtl="0">
-              <a:lnSpc>
-                <a:spcPct val="100000"/>
-              </a:lnSpc>
-              <a:spcBef>
-                <a:spcPts val="0"/>
-              </a:spcBef>
-              <a:spcAft>
-                <a:spcPts val="0"/>
-              </a:spcAft>
-              <a:buClr>
-                <a:srgbClr val="000000"/>
-              </a:buClr>
-              <a:buSzPts val="1400"/>
-              <a:buFont typeface="Arial"/>
-              <a:buNone/>
-              <a:defRPr sz="8000" b="0" i="0" u="none" strike="noStrike" cap="none">
-                <a:solidFill>
-                  <a:srgbClr val="000000"/>
-                </a:solidFill>
-                <a:latin typeface="Rockwell"/>
-                <a:ea typeface="Rockwell"/>
-                <a:cs typeface="Rockwell"/>
-                <a:sym typeface="Rockwell"/>
-              </a:defRPr>
-            </a:lvl3pPr>
-            <a:lvl4pPr marR="0" lvl="3" algn="ctr" rtl="0">
-              <a:lnSpc>
-                <a:spcPct val="100000"/>
-              </a:lnSpc>
-              <a:spcBef>
-                <a:spcPts val="0"/>
-              </a:spcBef>
-              <a:spcAft>
-                <a:spcPts val="0"/>
-              </a:spcAft>
-              <a:buClr>
-                <a:srgbClr val="000000"/>
-              </a:buClr>
-              <a:buSzPts val="1400"/>
-              <a:buFont typeface="Arial"/>
-              <a:buNone/>
-              <a:defRPr sz="8000" b="0" i="0" u="none" strike="noStrike" cap="none">
-                <a:solidFill>
-                  <a:srgbClr val="000000"/>
-                </a:solidFill>
-                <a:latin typeface="Rockwell"/>
-                <a:ea typeface="Rockwell"/>
-                <a:cs typeface="Rockwell"/>
-                <a:sym typeface="Rockwell"/>
-              </a:defRPr>
-            </a:lvl4pPr>
-            <a:lvl5pPr marR="0" lvl="4" algn="ctr" rtl="0">
-              <a:lnSpc>
-                <a:spcPct val="100000"/>
-              </a:lnSpc>
-              <a:spcBef>
-                <a:spcPts val="0"/>
-              </a:spcBef>
-              <a:spcAft>
-                <a:spcPts val="0"/>
-              </a:spcAft>
-              <a:buClr>
-                <a:srgbClr val="000000"/>
-              </a:buClr>
-              <a:buSzPts val="1400"/>
-              <a:buFont typeface="Arial"/>
-              <a:buNone/>
-              <a:defRPr sz="8000" b="0" i="0" u="none" strike="noStrike" cap="none">
-                <a:solidFill>
-                  <a:srgbClr val="000000"/>
-                </a:solidFill>
-                <a:latin typeface="Rockwell"/>
-                <a:ea typeface="Rockwell"/>
-                <a:cs typeface="Rockwell"/>
-                <a:sym typeface="Rockwell"/>
-              </a:defRPr>
-            </a:lvl5pPr>
-            <a:lvl6pPr marR="0" lvl="5" algn="ctr" rtl="0">
-              <a:lnSpc>
-                <a:spcPct val="100000"/>
-              </a:lnSpc>
-              <a:spcBef>
-                <a:spcPts val="0"/>
-              </a:spcBef>
-              <a:spcAft>
-                <a:spcPts val="0"/>
-              </a:spcAft>
-              <a:buClr>
-                <a:srgbClr val="000000"/>
-              </a:buClr>
-              <a:buSzPts val="1400"/>
-              <a:buFont typeface="Arial"/>
-              <a:buNone/>
-              <a:defRPr sz="8000" b="0" i="0" u="none" strike="noStrike" cap="none">
-                <a:solidFill>
-                  <a:srgbClr val="000000"/>
-                </a:solidFill>
-                <a:latin typeface="Rockwell"/>
-                <a:ea typeface="Rockwell"/>
-                <a:cs typeface="Rockwell"/>
-                <a:sym typeface="Rockwell"/>
-              </a:defRPr>
-            </a:lvl6pPr>
-            <a:lvl7pPr marR="0" lvl="6" algn="ctr" rtl="0">
-              <a:lnSpc>
-                <a:spcPct val="100000"/>
-              </a:lnSpc>
-              <a:spcBef>
-                <a:spcPts val="0"/>
-              </a:spcBef>
-              <a:spcAft>
-                <a:spcPts val="0"/>
-              </a:spcAft>
-              <a:buClr>
-                <a:srgbClr val="000000"/>
-              </a:buClr>
-              <a:buSzPts val="1400"/>
-              <a:buFont typeface="Arial"/>
-              <a:buNone/>
-              <a:defRPr sz="8000" b="0" i="0" u="none" strike="noStrike" cap="none">
-                <a:solidFill>
-                  <a:srgbClr val="000000"/>
-                </a:solidFill>
-                <a:latin typeface="Rockwell"/>
-                <a:ea typeface="Rockwell"/>
-                <a:cs typeface="Rockwell"/>
-                <a:sym typeface="Rockwell"/>
-              </a:defRPr>
-            </a:lvl7pPr>
-            <a:lvl8pPr marR="0" lvl="7" algn="ctr" rtl="0">
-              <a:lnSpc>
-                <a:spcPct val="100000"/>
-              </a:lnSpc>
-              <a:spcBef>
-                <a:spcPts val="0"/>
-              </a:spcBef>
-              <a:spcAft>
-                <a:spcPts val="0"/>
-              </a:spcAft>
-              <a:buClr>
-                <a:srgbClr val="000000"/>
-              </a:buClr>
-              <a:buSzPts val="1400"/>
-              <a:buFont typeface="Arial"/>
-              <a:buNone/>
-              <a:defRPr sz="8000" b="0" i="0" u="none" strike="noStrike" cap="none">
-                <a:solidFill>
-                  <a:srgbClr val="000000"/>
-                </a:solidFill>
-                <a:latin typeface="Rockwell"/>
-                <a:ea typeface="Rockwell"/>
-                <a:cs typeface="Rockwell"/>
-                <a:sym typeface="Rockwell"/>
-              </a:defRPr>
-            </a:lvl8pPr>
-            <a:lvl9pPr marR="0" lvl="8" algn="ctr" rtl="0">
-              <a:lnSpc>
-                <a:spcPct val="100000"/>
-              </a:lnSpc>
-              <a:spcBef>
-                <a:spcPts val="0"/>
-              </a:spcBef>
-              <a:spcAft>
-                <a:spcPts val="0"/>
-              </a:spcAft>
-              <a:buClr>
-                <a:srgbClr val="000000"/>
-              </a:buClr>
-              <a:buSzPts val="1400"/>
-              <a:buFont typeface="Arial"/>
-              <a:buNone/>
-              <a:defRPr sz="8000" b="0" i="0" u="none" strike="noStrike" cap="none">
-                <a:solidFill>
-                  <a:srgbClr val="000000"/>
-                </a:solidFill>
-                <a:latin typeface="Rockwell"/>
-                <a:ea typeface="Rockwell"/>
-                <a:cs typeface="Rockwell"/>
-                <a:sym typeface="Rockwell"/>
-              </a:defRPr>
-            </a:lvl9pPr>
-          </a:lstStyle>
-          <a:p>
-            <a:pPr marL="0" marR="0" lvl="0" indent="0" algn="l" defTabSz="914400" rtl="0" eaLnBrk="1" fontAlgn="auto" latinLnBrk="0" hangingPunct="1">
-              <a:lnSpc>
-                <a:spcPct val="100000"/>
-              </a:lnSpc>
-              <a:spcBef>
-                <a:spcPts val="0"/>
-              </a:spcBef>
-              <a:spcAft>
-                <a:spcPts val="0"/>
-              </a:spcAft>
-              <a:buClr>
-                <a:srgbClr val="000000"/>
-              </a:buClr>
-              <a:buSzPts val="1400"/>
-              <a:buFont typeface="Arial"/>
-              <a:buNone/>
-              <a:tabLst/>
-              <a:defRPr/>
-            </a:pPr>
-            <a:r>
-              <a:rPr kumimoji="0" lang="en-US" sz="6000" b="0" i="0" u="none" strike="noStrike" kern="0" cap="none" spc="0" normalizeH="0" baseline="0" noProof="0" dirty="0">
-                <a:ln>
-                  <a:noFill/>
-                </a:ln>
-                <a:solidFill>
-                  <a:srgbClr val="2C608A"/>
-                </a:solidFill>
-                <a:effectLst/>
-                <a:uLnTx/>
-                <a:uFillTx/>
-                <a:latin typeface="Arial"/>
-                <a:ea typeface="Source Sans Pro" panose="020B0503030403020204" pitchFamily="34" charset="0"/>
-                <a:sym typeface="Avenir"/>
+          <a:bodyPr rtlCol="0" anchor="ctr"/>
+          <a:lstStyle/>
+          <a:p>
+            <a:pPr algn="ctr"/>
+            <a:r>
+              <a:rPr lang="en-US" sz="3600" dirty="0">
+                <a:solidFill>
+                  <a:schemeClr val="tx2"/>
+                </a:solidFill>
               </a:rPr>
-              <a:t>Second Interview</a:t>
-            </a:r>
-          </a:p>
-          <a:p>
-            <a:pPr marL="0" marR="0" lvl="0" indent="0" algn="l" defTabSz="914400" rtl="0" eaLnBrk="1" fontAlgn="auto" latinLnBrk="0" hangingPunct="1">
-              <a:lnSpc>
-                <a:spcPct val="100000"/>
-              </a:lnSpc>
-              <a:spcBef>
-                <a:spcPts val="0"/>
-              </a:spcBef>
-              <a:spcAft>
-                <a:spcPts val="0"/>
-              </a:spcAft>
-              <a:buClr>
-                <a:srgbClr val="000000"/>
-              </a:buClr>
-              <a:buSzPts val="1400"/>
-              <a:buFont typeface="Arial"/>
-              <a:buNone/>
-              <a:tabLst/>
-              <a:defRPr/>
-            </a:pPr>
-            <a:r>
-              <a:rPr kumimoji="0" lang="en-US" sz="6000" b="0" i="0" u="none" strike="noStrike" kern="0" cap="none" spc="0" normalizeH="0" baseline="0" noProof="0" dirty="0">
-                <a:ln>
-                  <a:noFill/>
-                </a:ln>
-                <a:solidFill>
-                  <a:srgbClr val="2C608A"/>
-                </a:solidFill>
-                <a:effectLst/>
-                <a:uLnTx/>
-                <a:uFillTx/>
-                <a:latin typeface="Arial"/>
-                <a:ea typeface="Source Sans Pro" panose="020B0503030403020204" pitchFamily="34" charset="0"/>
-                <a:sym typeface="Avenir"/>
-              </a:rPr>
-              <a:t/>
-            </a:r>
-            <a:br>
-              <a:rPr kumimoji="0" lang="en-US" sz="6000" b="0" i="0" u="none" strike="noStrike" kern="0" cap="none" spc="0" normalizeH="0" baseline="0" noProof="0" dirty="0">
-                <a:ln>
-                  <a:noFill/>
-                </a:ln>
-                <a:solidFill>
-                  <a:srgbClr val="2C608A"/>
-                </a:solidFill>
-                <a:effectLst/>
-                <a:uLnTx/>
-                <a:uFillTx/>
-                <a:latin typeface="Arial"/>
-                <a:ea typeface="Source Sans Pro" panose="020B0503030403020204" pitchFamily="34" charset="0"/>
-                <a:sym typeface="Avenir"/>
-              </a:rPr>
-            </a:br>
-            <a:r>
-              <a:rPr kumimoji="0" lang="en-US" sz="3600" b="0" i="0" u="none" strike="noStrike" kern="0" cap="none" spc="0" normalizeH="0" baseline="0" noProof="0" dirty="0">
-                <a:ln>
-                  <a:noFill/>
-                </a:ln>
-                <a:solidFill>
-                  <a:srgbClr val="2C608A"/>
-                </a:solidFill>
-                <a:effectLst/>
-                <a:uLnTx/>
-                <a:uFillTx/>
-                <a:latin typeface="Arial"/>
-                <a:ea typeface="Source Sans Pro" panose="020B0503030403020204" pitchFamily="34" charset="0"/>
-                <a:sym typeface="Avenir"/>
-              </a:rPr>
-              <a:t>Which proficiency level is met for each of the competencies? </a:t>
-            </a:r>
-            <a:r>
-              <a:rPr kumimoji="0" lang="en-US" sz="3600" b="0" i="0" u="none" strike="noStrike" kern="0" cap="none" spc="0" normalizeH="0" baseline="0" noProof="0" dirty="0" smtClean="0">
-                <a:ln>
-                  <a:noFill/>
-                </a:ln>
-                <a:solidFill>
-                  <a:srgbClr val="2C608A"/>
-                </a:solidFill>
-                <a:effectLst/>
-                <a:uLnTx/>
-                <a:uFillTx/>
-                <a:latin typeface="Arial"/>
-                <a:ea typeface="Source Sans Pro" panose="020B0503030403020204" pitchFamily="34" charset="0"/>
-                <a:sym typeface="Avenir"/>
-              </a:rPr>
-              <a:t>Are they minimally </a:t>
-            </a:r>
-            <a:r>
-              <a:rPr kumimoji="0" lang="en-US" sz="3600" b="0" i="0" u="none" strike="noStrike" kern="0" cap="none" spc="0" normalizeH="0" baseline="0" noProof="0" dirty="0">
-                <a:ln>
-                  <a:noFill/>
-                </a:ln>
-                <a:solidFill>
-                  <a:srgbClr val="2C608A"/>
-                </a:solidFill>
-                <a:effectLst/>
-                <a:uLnTx/>
-                <a:uFillTx/>
-                <a:latin typeface="Arial"/>
-                <a:ea typeface="Source Sans Pro" panose="020B0503030403020204" pitchFamily="34" charset="0"/>
-                <a:sym typeface="Avenir"/>
-              </a:rPr>
-              <a:t>qualified or best </a:t>
-            </a:r>
-            <a:r>
-              <a:rPr kumimoji="0" lang="en-US" sz="3600" b="0" i="0" u="none" strike="noStrike" kern="0" cap="none" spc="0" normalizeH="0" baseline="0" noProof="0" dirty="0" smtClean="0">
-                <a:ln>
-                  <a:noFill/>
-                </a:ln>
-                <a:solidFill>
-                  <a:srgbClr val="2C608A"/>
-                </a:solidFill>
-                <a:effectLst/>
-                <a:uLnTx/>
-                <a:uFillTx/>
-                <a:latin typeface="Arial"/>
-                <a:ea typeface="Source Sans Pro" panose="020B0503030403020204" pitchFamily="34" charset="0"/>
-                <a:sym typeface="Avenir"/>
-              </a:rPr>
-              <a:t>qualified?</a:t>
-            </a:r>
-            <a:endParaRPr kumimoji="0" lang="en-US" sz="3600" b="0" i="0" u="none" strike="noStrike" kern="0" cap="none" spc="0" normalizeH="0" baseline="0" noProof="0" dirty="0">
-              <a:ln>
-                <a:noFill/>
-              </a:ln>
-              <a:solidFill>
-                <a:srgbClr val="2C608A"/>
-              </a:solidFill>
-              <a:effectLst/>
-              <a:uLnTx/>
-              <a:uFillTx/>
-              <a:latin typeface="Arial"/>
-              <a:ea typeface="Source Sans Pro" panose="020B0503030403020204" pitchFamily="34" charset="0"/>
-              <a:sym typeface="Avenir"/>
-            </a:endParaRPr>
-          </a:p>
-        </p:txBody>
-      </p:sp>
-      <p:sp>
-        <p:nvSpPr>
-          <p:cNvPr id="5" name="Title 1"/>
-          <p:cNvSpPr txBox="1">
-            <a:spLocks/>
-          </p:cNvSpPr>
-          <p:nvPr/>
-        </p:nvSpPr>
-        <p:spPr>
-          <a:xfrm>
-            <a:off x="1513080" y="8476283"/>
-            <a:ext cx="15441768" cy="957008"/>
-          </a:xfrm>
-          <a:prstGeom prst="rect">
-            <a:avLst/>
-          </a:prstGeom>
-          <a:noFill/>
-          <a:ln>
-            <a:noFill/>
-          </a:ln>
-        </p:spPr>
-        <p:txBody>
-          <a:bodyPr spcFirstLastPara="1" wrap="square" lIns="91425" tIns="45700" rIns="91425" bIns="45700" anchor="t" anchorCtr="0"/>
-          <a:lstStyle>
-            <a:defPPr marR="0" lvl="0" algn="l" rtl="0">
-              <a:lnSpc>
-                <a:spcPct val="100000"/>
-              </a:lnSpc>
-              <a:spcBef>
-                <a:spcPts val="0"/>
-              </a:spcBef>
-              <a:spcAft>
-                <a:spcPts val="0"/>
-              </a:spcAft>
-            </a:defPPr>
-            <a:lvl1pPr marR="0" lvl="0" algn="l" rtl="0">
-              <a:lnSpc>
-                <a:spcPct val="100000"/>
-              </a:lnSpc>
-              <a:spcBef>
-                <a:spcPts val="0"/>
-              </a:spcBef>
-              <a:spcAft>
-                <a:spcPts val="0"/>
-              </a:spcAft>
-              <a:buClr>
-                <a:srgbClr val="000000"/>
-              </a:buClr>
-              <a:buSzPts val="1400"/>
-              <a:buFont typeface="Arial"/>
-              <a:buNone/>
-              <a:defRPr sz="6000" b="0" i="0" u="none" strike="noStrike" cap="none">
-                <a:solidFill>
-                  <a:schemeClr val="tx1"/>
-                </a:solidFill>
-                <a:latin typeface="+mj-lt"/>
-                <a:ea typeface="Source Sans Pro" panose="020B0503030403020204" pitchFamily="34" charset="0"/>
-                <a:cs typeface="Merriweather" pitchFamily="2" charset="77"/>
-                <a:sym typeface="Avenir"/>
-              </a:defRPr>
-            </a:lvl1pPr>
-            <a:lvl2pPr marR="0" lvl="1" algn="ctr" rtl="0">
-              <a:lnSpc>
-                <a:spcPct val="100000"/>
-              </a:lnSpc>
-              <a:spcBef>
-                <a:spcPts val="0"/>
-              </a:spcBef>
-              <a:spcAft>
-                <a:spcPts val="0"/>
-              </a:spcAft>
-              <a:buClr>
-                <a:srgbClr val="000000"/>
-              </a:buClr>
-              <a:buSzPts val="1400"/>
-              <a:buFont typeface="Arial"/>
-              <a:buNone/>
-              <a:defRPr sz="8000" b="0" i="0" u="none" strike="noStrike" cap="none">
-                <a:solidFill>
-                  <a:srgbClr val="000000"/>
-                </a:solidFill>
-                <a:latin typeface="Rockwell"/>
-                <a:ea typeface="Rockwell"/>
-                <a:cs typeface="Rockwell"/>
-                <a:sym typeface="Rockwell"/>
-              </a:defRPr>
-            </a:lvl2pPr>
-            <a:lvl3pPr marR="0" lvl="2" algn="ctr" rtl="0">
-              <a:lnSpc>
-                <a:spcPct val="100000"/>
-              </a:lnSpc>
-              <a:spcBef>
-                <a:spcPts val="0"/>
-              </a:spcBef>
-              <a:spcAft>
-                <a:spcPts val="0"/>
-              </a:spcAft>
-              <a:buClr>
-                <a:srgbClr val="000000"/>
-              </a:buClr>
-              <a:buSzPts val="1400"/>
-              <a:buFont typeface="Arial"/>
-              <a:buNone/>
-              <a:defRPr sz="8000" b="0" i="0" u="none" strike="noStrike" cap="none">
-                <a:solidFill>
-                  <a:srgbClr val="000000"/>
-                </a:solidFill>
-                <a:latin typeface="Rockwell"/>
-                <a:ea typeface="Rockwell"/>
-                <a:cs typeface="Rockwell"/>
-                <a:sym typeface="Rockwell"/>
-              </a:defRPr>
-            </a:lvl3pPr>
-            <a:lvl4pPr marR="0" lvl="3" algn="ctr" rtl="0">
-              <a:lnSpc>
-                <a:spcPct val="100000"/>
-              </a:lnSpc>
-              <a:spcBef>
-                <a:spcPts val="0"/>
-              </a:spcBef>
-              <a:spcAft>
-                <a:spcPts val="0"/>
-              </a:spcAft>
-              <a:buClr>
-                <a:srgbClr val="000000"/>
-              </a:buClr>
-              <a:buSzPts val="1400"/>
-              <a:buFont typeface="Arial"/>
-              <a:buNone/>
-              <a:defRPr sz="8000" b="0" i="0" u="none" strike="noStrike" cap="none">
-                <a:solidFill>
-                  <a:srgbClr val="000000"/>
-                </a:solidFill>
-                <a:latin typeface="Rockwell"/>
-                <a:ea typeface="Rockwell"/>
-                <a:cs typeface="Rockwell"/>
-                <a:sym typeface="Rockwell"/>
-              </a:defRPr>
-            </a:lvl4pPr>
-            <a:lvl5pPr marR="0" lvl="4" algn="ctr" rtl="0">
-              <a:lnSpc>
-                <a:spcPct val="100000"/>
-              </a:lnSpc>
-              <a:spcBef>
-                <a:spcPts val="0"/>
-              </a:spcBef>
-              <a:spcAft>
-                <a:spcPts val="0"/>
-              </a:spcAft>
-              <a:buClr>
-                <a:srgbClr val="000000"/>
-              </a:buClr>
-              <a:buSzPts val="1400"/>
-              <a:buFont typeface="Arial"/>
-              <a:buNone/>
-              <a:defRPr sz="8000" b="0" i="0" u="none" strike="noStrike" cap="none">
-                <a:solidFill>
-                  <a:srgbClr val="000000"/>
-                </a:solidFill>
-                <a:latin typeface="Rockwell"/>
-                <a:ea typeface="Rockwell"/>
-                <a:cs typeface="Rockwell"/>
-                <a:sym typeface="Rockwell"/>
-              </a:defRPr>
-            </a:lvl5pPr>
-            <a:lvl6pPr marR="0" lvl="5" algn="ctr" rtl="0">
-              <a:lnSpc>
-                <a:spcPct val="100000"/>
-              </a:lnSpc>
-              <a:spcBef>
-                <a:spcPts val="0"/>
-              </a:spcBef>
-              <a:spcAft>
-                <a:spcPts val="0"/>
-              </a:spcAft>
-              <a:buClr>
-                <a:srgbClr val="000000"/>
-              </a:buClr>
-              <a:buSzPts val="1400"/>
-              <a:buFont typeface="Arial"/>
-              <a:buNone/>
-              <a:defRPr sz="8000" b="0" i="0" u="none" strike="noStrike" cap="none">
-                <a:solidFill>
-                  <a:srgbClr val="000000"/>
-                </a:solidFill>
-                <a:latin typeface="Rockwell"/>
-                <a:ea typeface="Rockwell"/>
-                <a:cs typeface="Rockwell"/>
-                <a:sym typeface="Rockwell"/>
-              </a:defRPr>
-            </a:lvl6pPr>
-            <a:lvl7pPr marR="0" lvl="6" algn="ctr" rtl="0">
-              <a:lnSpc>
-                <a:spcPct val="100000"/>
-              </a:lnSpc>
-              <a:spcBef>
-                <a:spcPts val="0"/>
-              </a:spcBef>
-              <a:spcAft>
-                <a:spcPts val="0"/>
-              </a:spcAft>
-              <a:buClr>
-                <a:srgbClr val="000000"/>
-              </a:buClr>
-              <a:buSzPts val="1400"/>
-              <a:buFont typeface="Arial"/>
-              <a:buNone/>
-              <a:defRPr sz="8000" b="0" i="0" u="none" strike="noStrike" cap="none">
-                <a:solidFill>
-                  <a:srgbClr val="000000"/>
-                </a:solidFill>
-                <a:latin typeface="Rockwell"/>
-                <a:ea typeface="Rockwell"/>
-                <a:cs typeface="Rockwell"/>
-                <a:sym typeface="Rockwell"/>
-              </a:defRPr>
-            </a:lvl7pPr>
-            <a:lvl8pPr marR="0" lvl="7" algn="ctr" rtl="0">
-              <a:lnSpc>
-                <a:spcPct val="100000"/>
-              </a:lnSpc>
-              <a:spcBef>
-                <a:spcPts val="0"/>
-              </a:spcBef>
-              <a:spcAft>
-                <a:spcPts val="0"/>
-              </a:spcAft>
-              <a:buClr>
-                <a:srgbClr val="000000"/>
-              </a:buClr>
-              <a:buSzPts val="1400"/>
-              <a:buFont typeface="Arial"/>
-              <a:buNone/>
-              <a:defRPr sz="8000" b="0" i="0" u="none" strike="noStrike" cap="none">
-                <a:solidFill>
-                  <a:srgbClr val="000000"/>
-                </a:solidFill>
-                <a:latin typeface="Rockwell"/>
-                <a:ea typeface="Rockwell"/>
-                <a:cs typeface="Rockwell"/>
-                <a:sym typeface="Rockwell"/>
-              </a:defRPr>
-            </a:lvl8pPr>
-            <a:lvl9pPr marR="0" lvl="8" algn="ctr" rtl="0">
-              <a:lnSpc>
-                <a:spcPct val="100000"/>
-              </a:lnSpc>
-              <a:spcBef>
-                <a:spcPts val="0"/>
-              </a:spcBef>
-              <a:spcAft>
-                <a:spcPts val="0"/>
-              </a:spcAft>
-              <a:buClr>
-                <a:srgbClr val="000000"/>
-              </a:buClr>
-              <a:buSzPts val="1400"/>
-              <a:buFont typeface="Arial"/>
-              <a:buNone/>
-              <a:defRPr sz="8000" b="0" i="0" u="none" strike="noStrike" cap="none">
-                <a:solidFill>
-                  <a:srgbClr val="000000"/>
-                </a:solidFill>
-                <a:latin typeface="Rockwell"/>
-                <a:ea typeface="Rockwell"/>
-                <a:cs typeface="Rockwell"/>
-                <a:sym typeface="Rockwell"/>
-              </a:defRPr>
-            </a:lvl9pPr>
-          </a:lstStyle>
-          <a:p>
-            <a:pPr marL="0" marR="0" lvl="0" indent="0" algn="l" defTabSz="914400" rtl="0" eaLnBrk="1" fontAlgn="auto" latinLnBrk="0" hangingPunct="1">
-              <a:lnSpc>
-                <a:spcPct val="100000"/>
-              </a:lnSpc>
-              <a:spcBef>
-                <a:spcPts val="0"/>
-              </a:spcBef>
-              <a:spcAft>
-                <a:spcPts val="0"/>
-              </a:spcAft>
-              <a:buClr>
-                <a:srgbClr val="000000"/>
-              </a:buClr>
-              <a:buSzPts val="1400"/>
-              <a:buFont typeface="Arial"/>
-              <a:buNone/>
-              <a:tabLst/>
-              <a:defRPr/>
-            </a:pPr>
-            <a:r>
-              <a:rPr kumimoji="0" lang="en-US" sz="2800" b="1" i="0" u="none" strike="noStrike" kern="0" cap="none" spc="0" normalizeH="0" baseline="0" noProof="0" dirty="0">
-                <a:ln>
-                  <a:noFill/>
-                </a:ln>
-                <a:solidFill>
-                  <a:srgbClr val="2C608A"/>
-                </a:solidFill>
-                <a:effectLst/>
-                <a:uLnTx/>
-                <a:uFillTx/>
-                <a:latin typeface="Arial"/>
-                <a:ea typeface="Source Sans Pro" panose="020B0503030403020204" pitchFamily="34" charset="0"/>
-                <a:sym typeface="Avenir"/>
-              </a:rPr>
-              <a:t>Make sure you are not the same reviewer for both interviews for the same applicant. </a:t>
-            </a:r>
-            <a:r>
-              <a:rPr kumimoji="0" lang="en-US" sz="3600" b="1" i="0" u="none" strike="noStrike" kern="0" cap="none" spc="0" normalizeH="0" baseline="0" noProof="0" dirty="0">
-                <a:ln>
-                  <a:noFill/>
-                </a:ln>
-                <a:solidFill>
-                  <a:srgbClr val="2C608A"/>
-                </a:solidFill>
-                <a:effectLst/>
-                <a:uLnTx/>
-                <a:uFillTx/>
-                <a:latin typeface="Arial"/>
-                <a:ea typeface="Source Sans Pro" panose="020B0503030403020204" pitchFamily="34" charset="0"/>
-                <a:sym typeface="Avenir"/>
-              </a:rPr>
-              <a:t/>
-            </a:r>
-            <a:br>
-              <a:rPr kumimoji="0" lang="en-US" sz="3600" b="1" i="0" u="none" strike="noStrike" kern="0" cap="none" spc="0" normalizeH="0" baseline="0" noProof="0" dirty="0">
-                <a:ln>
-                  <a:noFill/>
-                </a:ln>
-                <a:solidFill>
-                  <a:srgbClr val="2C608A"/>
-                </a:solidFill>
-                <a:effectLst/>
-                <a:uLnTx/>
-                <a:uFillTx/>
-                <a:latin typeface="Arial"/>
-                <a:ea typeface="Source Sans Pro" panose="020B0503030403020204" pitchFamily="34" charset="0"/>
-                <a:sym typeface="Avenir"/>
-              </a:rPr>
-            </a:br>
-            <a:endParaRPr kumimoji="0" lang="en-US" sz="3600" b="1" i="0" u="none" strike="noStrike" kern="0" cap="none" spc="0" normalizeH="0" baseline="0" noProof="0" dirty="0">
-              <a:ln>
-                <a:noFill/>
-              </a:ln>
-              <a:solidFill>
-                <a:srgbClr val="2C608A"/>
-              </a:solidFill>
-              <a:effectLst/>
-              <a:uLnTx/>
-              <a:uFillTx/>
-              <a:latin typeface="Arial"/>
-              <a:ea typeface="Source Sans Pro" panose="020B0503030403020204" pitchFamily="34" charset="0"/>
-              <a:sym typeface="Avenir"/>
-            </a:endParaRPr>
+              <a:t>Update if doing one interview only, or if interviews are fundamentally different</a:t>
+            </a:r>
           </a:p>
         </p:txBody>
       </p:sp>
     </p:spTree>
     <p:extLst>
       <p:ext uri="{BB962C8B-B14F-4D97-AF65-F5344CB8AC3E}">
-        <p14:creationId xmlns:p14="http://schemas.microsoft.com/office/powerpoint/2010/main" val="3826011075"/>
+        <p14:creationId xmlns:p14="http://schemas.microsoft.com/office/powerpoint/2010/main" val="3292707094"/>
       </p:ext>
     </p:extLst>
   </p:cSld>
@@ -9778,10 +9273,6 @@
             <a:br>
               <a:rPr lang="en-US" dirty="0"/>
             </a:br>
-            <a:r>
-              <a:rPr lang="en-US" dirty="0"/>
-              <a:t/>
-            </a:r>
             <a:br>
               <a:rPr lang="en-US" dirty="0"/>
             </a:br>
@@ -10112,48 +9603,20 @@
           <a:bodyPr/>
           <a:lstStyle/>
           <a:p>
-            <a:r>
-              <a:rPr lang="en-US" dirty="0"/>
-              <a:t/>
-            </a:r>
             <a:br>
               <a:rPr lang="en-US" dirty="0"/>
             </a:br>
             <a:r>
-              <a:rPr lang="en-US" dirty="0" smtClean="0"/>
+              <a:rPr lang="en-US" dirty="0"/>
               <a:t>Record every </a:t>
             </a:r>
             <a:r>
-              <a:rPr lang="en-US" dirty="0" smtClean="0">
+              <a:rPr lang="en-US" dirty="0">
                 <a:solidFill>
                   <a:srgbClr val="2C608A"/>
                 </a:solidFill>
               </a:rPr>
-              <a:t>proficiency </a:t>
-            </a:r>
-            <a:r>
-              <a:rPr lang="en-US" dirty="0">
-                <a:solidFill>
-                  <a:srgbClr val="2C608A"/>
-                </a:solidFill>
-              </a:rPr>
-              <a:t>level </a:t>
-            </a:r>
-            <a:r>
-              <a:rPr lang="en-US" dirty="0" smtClean="0">
-                <a:solidFill>
-                  <a:srgbClr val="2C608A"/>
-                </a:solidFill>
-              </a:rPr>
-              <a:t>reflecting competencies to determine their qualifications. </a:t>
-            </a:r>
-            <a:r>
-              <a:rPr lang="en-US" dirty="0">
-                <a:solidFill>
-                  <a:srgbClr val="2C608A"/>
-                </a:solidFill>
-              </a:rPr>
-              <a:t/>
+              <a:t>proficiency level reflecting competencies to determine their qualifications. </a:t>
             </a:r>
             <a:br>
               <a:rPr lang="en-US" dirty="0">
@@ -10279,11 +9742,7 @@
             </a:pPr>
             <a:r>
               <a:rPr lang="en-US" dirty="0"/>
-              <a:t>Optional: copies of SME Background Info Sheet if they haven’t all submitted them </a:t>
-            </a:r>
-            <a:r>
-              <a:rPr lang="en-US" dirty="0" smtClean="0"/>
-              <a:t>already</a:t>
+              <a:t>Optional: copies of SME Background Info Sheet if they haven’t all submitted them already</a:t>
             </a:r>
           </a:p>
           <a:p>
@@ -10521,25 +9980,16 @@
             <a:br>
               <a:rPr lang="en-US" dirty="0"/>
             </a:br>
-            <a:r>
-              <a:rPr lang="en-US" dirty="0"/>
-              <a:t>(Send practice transcripts + rating to </a:t>
-            </a:r>
-            <a:r>
-              <a:rPr lang="en-US" dirty="0" smtClean="0"/>
-              <a:t>name of POC)</a:t>
-            </a:r>
-            <a:r>
-              <a:rPr lang="en-US" dirty="0"/>
-              <a:t/>
-            </a:r>
             <a:br>
               <a:rPr lang="en-US" dirty="0"/>
             </a:br>
             <a:r>
-              <a:rPr lang="en-US" b="0" dirty="0"/>
-              <a:t/>
-            </a:r>
+              <a:rPr lang="en-US" sz="4900" dirty="0"/>
+              <a:t>(Send practice transcripts + rating to {insert name of trainer/HR specialist})</a:t>
+            </a:r>
+            <a:br>
+              <a:rPr lang="en-US" dirty="0"/>
+            </a:br>
             <a:br>
               <a:rPr lang="en-US" b="0" dirty="0"/>
             </a:br>
@@ -10550,17 +10000,9 @@
             <a:br>
               <a:rPr lang="en-US" sz="9602" dirty="0"/>
             </a:br>
-            <a:r>
-              <a:rPr lang="en-US" sz="9602" dirty="0"/>
-              <a:t/>
-            </a:r>
             <a:br>
               <a:rPr lang="en-US" sz="9602" dirty="0"/>
             </a:br>
-            <a:r>
-              <a:rPr lang="en-US" dirty="0"/>
-              <a:t/>
-            </a:r>
             <a:br>
               <a:rPr lang="en-US" dirty="0"/>
             </a:br>
@@ -10901,7 +10343,7 @@
             </a:pPr>
             <a:r>
               <a:rPr lang="en-US" dirty="0"/>
-              <a:t>This was a very string interview; thanks for your time!</a:t>
+              <a:t>This was a very strong interview; thanks for your time!</a:t>
             </a:r>
           </a:p>
           <a:p>
@@ -11377,7 +10819,7 @@
                 <a:cs typeface="Arial"/>
                 <a:sym typeface="Arial"/>
               </a:rPr>
-              <a:t>It is now the end of the allotted time for the interview. The applicant took a lot of time answering the first several questions that you run out of time for the last one.</a:t>
+              <a:t>It is now the end of the allotted time for the interview. The applicant took a lot of time answering the first several questions, such that you run out of time for the last one.</a:t>
             </a:r>
           </a:p>
         </p:txBody>
@@ -11512,23 +10954,7 @@
                   <a:srgbClr val="FF0000"/>
                 </a:solidFill>
               </a:rPr>
-              <a:t>Emphasis: giving a single applicant extra time threatens the entire selection process. Do </a:t>
-            </a:r>
-            <a:r>
-              <a:rPr lang="en-US" sz="4800" dirty="0" smtClean="0">
-                <a:solidFill>
-                  <a:srgbClr val="FF0000"/>
-                </a:solidFill>
-              </a:rPr>
-              <a:t>not </a:t>
-            </a:r>
-            <a:r>
-              <a:rPr lang="en-US" sz="4800" dirty="0">
-                <a:solidFill>
-                  <a:srgbClr val="FF0000"/>
-                </a:solidFill>
-              </a:rPr>
-              <a:t>do this.</a:t>
+              <a:t>Emphasis: giving a single applicant extra time threatens the entire selection process. Do not do this.</a:t>
             </a:r>
           </a:p>
         </p:txBody>
@@ -11560,41 +10986,16 @@
           </a:bodyPr>
           <a:lstStyle/>
           <a:p>
-            <a:pPr marL="22225" marR="0" lvl="0" indent="0" algn="l" defTabSz="914400" rtl="0" eaLnBrk="1" fontAlgn="auto" latinLnBrk="0" hangingPunct="1">
-              <a:lnSpc>
-                <a:spcPct val="100000"/>
-              </a:lnSpc>
-              <a:spcBef>
-                <a:spcPts val="0"/>
-              </a:spcBef>
-              <a:spcAft>
-                <a:spcPts val="0"/>
-              </a:spcAft>
-              <a:buClr>
-                <a:srgbClr val="000000"/>
-              </a:buClr>
-              <a:buSzTx/>
-              <a:buFont typeface="Arial"/>
-              <a:buNone/>
-              <a:tabLst/>
+            <a:pPr marL="22225" lvl="0">
               <a:defRPr/>
             </a:pPr>
             <a:r>
-              <a:rPr kumimoji="0" lang="en-US" sz="3600" b="0" i="0" u="none" strike="noStrike" kern="0" cap="none" spc="0" normalizeH="0" baseline="0" noProof="0" dirty="0">
-                <a:ln>
-                  <a:noFill/>
-                </a:ln>
+              <a:rPr lang="en-US" sz="3600" dirty="0">
                 <a:solidFill>
                   <a:srgbClr val="454545"/>
                 </a:solidFill>
-                <a:effectLst/>
-                <a:uLnTx/>
-                <a:uFillTx/>
-                <a:latin typeface="Arial"/>
-                <a:cs typeface="Arial"/>
-                <a:sym typeface="Arial"/>
               </a:rPr>
-              <a:t>It is now the end of the allotted time for the interview. The applicant took a lot of time answering the first several questions that you run out of time for the last one.</a:t>
+              <a:t>It is now the end of the allotted time for the interview. The applicant took a lot of time answering the first several questions, such that you run out of time for the last one.</a:t>
             </a:r>
           </a:p>
         </p:txBody>
@@ -11656,20 +11057,9 @@
           <a:p>
             <a:r>
               <a:rPr lang="en-US" dirty="0"/>
-              <a:t>Email your docs to:</a:t>
-            </a:r>
-            <a:br>
-              <a:rPr lang="en-US" dirty="0"/>
-            </a:br>
-            <a:r>
-              <a:rPr lang="en-US" dirty="0" smtClean="0"/>
-              <a:t>[</a:t>
-            </a:r>
-            <a:r>
-              <a:rPr lang="en-US" u="sng" dirty="0" smtClean="0"/>
-              <a:t>Name of POC email]</a:t>
-            </a:r>
-            <a:endParaRPr u="sng" dirty="0">
+              <a:t>E-mail your transcripts to: {Name of HR specialist}</a:t>
+            </a:r>
+            <a:endParaRPr dirty="0">
               <a:solidFill>
                 <a:schemeClr val="bg1"/>
               </a:solidFill>
@@ -11762,25 +11152,23 @@
           <a:p>
             <a:pPr lvl="1"/>
             <a:r>
-              <a:rPr lang="en-US" dirty="0" smtClean="0"/>
+              <a:rPr lang="en-US" dirty="0"/>
               <a:t>Practice the interview transcripts</a:t>
             </a:r>
-            <a:endParaRPr lang="en-US" dirty="0"/>
           </a:p>
           <a:p>
             <a:pPr lvl="1"/>
             <a:r>
-              <a:rPr lang="en-US" dirty="0" smtClean="0"/>
+              <a:rPr lang="en-US" dirty="0"/>
               <a:t>Tips </a:t>
             </a:r>
           </a:p>
           <a:p>
             <a:pPr lvl="1"/>
             <a:r>
-              <a:rPr lang="en-US" dirty="0" smtClean="0"/>
+              <a:rPr lang="en-US" dirty="0"/>
               <a:t>Wrap up discussion</a:t>
             </a:r>
-            <a:endParaRPr lang="en-US" dirty="0"/>
           </a:p>
         </p:txBody>
       </p:sp>
@@ -11831,10 +11219,9 @@
           <a:lstStyle/>
           <a:p>
             <a:r>
-              <a:rPr lang="en-US" dirty="0" smtClean="0"/>
+              <a:rPr lang="en-US" dirty="0"/>
               <a:t>What’s next</a:t>
             </a:r>
-            <a:endParaRPr lang="en-US" dirty="0"/>
           </a:p>
         </p:txBody>
       </p:sp>
@@ -11885,7 +11272,7 @@
               <a:defRPr/>
             </a:pPr>
             <a:r>
-              <a:rPr kumimoji="0" lang="en-US" sz="3600" b="0" i="0" u="none" strike="noStrike" kern="0" cap="none" spc="0" normalizeH="0" baseline="0" noProof="0" dirty="0" smtClean="0">
+              <a:rPr kumimoji="0" lang="en-US" sz="3600" b="0" i="0" u="none" strike="noStrike" kern="0" cap="none" spc="0" normalizeH="0" baseline="0" noProof="0" dirty="0">
                 <a:ln>
                   <a:noFill/>
                 </a:ln>
@@ -11922,7 +11309,7 @@
               <a:tabLst/>
               <a:defRPr/>
             </a:pPr>
-            <a:endParaRPr kumimoji="0" lang="en-US" sz="3600" b="0" i="0" u="none" strike="noStrike" kern="0" cap="none" spc="0" normalizeH="0" baseline="0" noProof="0" dirty="0" smtClean="0">
+            <a:endParaRPr kumimoji="0" lang="en-US" sz="3600" b="0" i="0" u="none" strike="noStrike" kern="0" cap="none" spc="0" normalizeH="0" baseline="0" noProof="0" dirty="0">
               <a:ln>
                 <a:noFill/>
               </a:ln>
@@ -11958,7 +11345,7 @@
               <a:defRPr/>
             </a:pPr>
             <a:r>
-              <a:rPr kumimoji="0" lang="en-US" sz="3600" b="0" i="0" u="none" strike="noStrike" kern="0" cap="none" spc="0" normalizeH="0" baseline="0" noProof="0" dirty="0" smtClean="0">
+              <a:rPr kumimoji="0" lang="en-US" sz="3600" b="0" i="0" u="none" strike="noStrike" kern="0" cap="none" spc="0" normalizeH="0" baseline="0" noProof="0" dirty="0">
                 <a:ln>
                   <a:noFill/>
                 </a:ln>
@@ -11995,7 +11382,7 @@
               <a:tabLst/>
               <a:defRPr/>
             </a:pPr>
-            <a:endParaRPr kumimoji="0" lang="en-US" sz="3600" b="0" i="0" u="none" strike="noStrike" kern="0" cap="none" spc="0" normalizeH="0" baseline="0" noProof="0" dirty="0" smtClean="0">
+            <a:endParaRPr kumimoji="0" lang="en-US" sz="3600" b="0" i="0" u="none" strike="noStrike" kern="0" cap="none" spc="0" normalizeH="0" baseline="0" noProof="0" dirty="0">
               <a:ln>
                 <a:noFill/>
               </a:ln>
@@ -12031,7 +11418,7 @@
               <a:defRPr/>
             </a:pPr>
             <a:r>
-              <a:rPr lang="en-US" sz="3600" dirty="0" smtClean="0">
+              <a:rPr lang="en-US" sz="3600" dirty="0">
                 <a:solidFill>
                   <a:srgbClr val="454545"/>
                 </a:solidFill>
@@ -12039,7 +11426,7 @@
               <a:t>[POC] </a:t>
             </a:r>
             <a:r>
-              <a:rPr kumimoji="0" lang="en-US" sz="3600" b="0" i="0" u="none" strike="noStrike" kern="0" cap="none" spc="0" normalizeH="0" baseline="0" noProof="0" dirty="0" smtClean="0">
+              <a:rPr kumimoji="0" lang="en-US" sz="3600" b="0" i="0" u="none" strike="noStrike" kern="0" cap="none" spc="0" normalizeH="0" baseline="0" noProof="0" dirty="0">
                 <a:ln>
                   <a:noFill/>
                 </a:ln>
@@ -12076,7 +11463,7 @@
               <a:tabLst/>
               <a:defRPr/>
             </a:pPr>
-            <a:endParaRPr kumimoji="0" lang="en-US" sz="3600" b="0" i="0" u="none" strike="noStrike" kern="0" cap="none" spc="0" normalizeH="0" baseline="0" noProof="0" dirty="0" smtClean="0">
+            <a:endParaRPr kumimoji="0" lang="en-US" sz="3600" b="0" i="0" u="none" strike="noStrike" kern="0" cap="none" spc="0" normalizeH="0" baseline="0" noProof="0" dirty="0">
               <a:ln>
                 <a:noFill/>
               </a:ln>
@@ -12112,7 +11499,7 @@
               <a:defRPr/>
             </a:pPr>
             <a:r>
-              <a:rPr kumimoji="0" lang="en-US" sz="3600" b="0" i="0" u="none" strike="noStrike" kern="0" cap="none" spc="0" normalizeH="0" baseline="0" noProof="0" dirty="0" smtClean="0">
+              <a:rPr kumimoji="0" lang="en-US" sz="3600" b="0" i="0" u="none" strike="noStrike" kern="0" cap="none" spc="0" normalizeH="0" baseline="0" noProof="0" dirty="0">
                 <a:ln>
                   <a:noFill/>
                 </a:ln>
@@ -12149,7 +11536,7 @@
               <a:tabLst/>
               <a:defRPr/>
             </a:pPr>
-            <a:endParaRPr kumimoji="0" lang="en-US" sz="3600" b="0" i="0" u="none" strike="noStrike" kern="0" cap="none" spc="0" normalizeH="0" baseline="0" noProof="0" dirty="0" smtClean="0">
+            <a:endParaRPr kumimoji="0" lang="en-US" sz="3600" b="0" i="0" u="none" strike="noStrike" kern="0" cap="none" spc="0" normalizeH="0" baseline="0" noProof="0" dirty="0">
               <a:ln>
                 <a:noFill/>
               </a:ln>
@@ -12185,7 +11572,7 @@
               <a:defRPr/>
             </a:pPr>
             <a:r>
-              <a:rPr kumimoji="0" lang="en-US" sz="3600" b="0" i="0" u="none" strike="noStrike" kern="0" cap="none" spc="0" normalizeH="0" baseline="0" noProof="0" dirty="0" smtClean="0">
+              <a:rPr kumimoji="0" lang="en-US" sz="3600" b="0" i="0" u="none" strike="noStrike" kern="0" cap="none" spc="0" normalizeH="0" baseline="0" noProof="0" dirty="0">
                 <a:ln>
                   <a:noFill/>
                 </a:ln>
@@ -12211,20 +11598,12 @@
           </a:p>
           <a:p>
             <a:r>
-              <a:rPr lang="en-US" sz="3600" dirty="0" smtClean="0">
+              <a:rPr lang="en-US" sz="3600" dirty="0">
                 <a:solidFill>
                   <a:srgbClr val="FF0000"/>
                 </a:solidFill>
               </a:rPr>
-              <a:t>Customize information </a:t>
-            </a:r>
-            <a:r>
-              <a:rPr lang="en-US" sz="3600" dirty="0">
-                <a:solidFill>
-                  <a:srgbClr val="FF0000"/>
-                </a:solidFill>
-              </a:rPr>
-              <a:t>based on your logistics </a:t>
+              <a:t>Customize information based on your logistics </a:t>
             </a:r>
           </a:p>
           <a:p>
@@ -12316,10 +11695,9 @@
           <a:lstStyle/>
           <a:p>
             <a:r>
-              <a:rPr lang="en-US" dirty="0" smtClean="0"/>
+              <a:rPr lang="en-US" dirty="0"/>
               <a:t>Questions?</a:t>
             </a:r>
-            <a:endParaRPr lang="en-US" dirty="0"/>
           </a:p>
         </p:txBody>
       </p:sp>
@@ -12734,25 +12112,7 @@
                 <a:cs typeface="+mn-cs"/>
                 <a:sym typeface="Arial"/>
               </a:rPr>
-              <a:t>~</a:t>
-            </a:r>
-            <a:r>
-              <a:rPr kumimoji="0" lang="en-US" sz="2800" b="0" i="0" u="none" strike="noStrike" kern="0" cap="none" spc="0" normalizeH="0" baseline="0" noProof="0" dirty="0" smtClean="0">
-                <a:ln>
-                  <a:noFill/>
-                </a:ln>
-                <a:solidFill>
-                  <a:srgbClr val="454545"/>
-                </a:solidFill>
-                <a:effectLst/>
-                <a:uLnTx/>
-                <a:uFillTx/>
-                <a:latin typeface="Arial"/>
-                <a:ea typeface="+mn-ea"/>
-                <a:cs typeface="+mn-cs"/>
-                <a:sym typeface="Arial"/>
-              </a:rPr>
-              <a:t>120</a:t>
+              <a:t>~120</a:t>
             </a:r>
             <a:endParaRPr kumimoji="0" lang="en-US" sz="1600" b="0" i="0" u="none" strike="noStrike" kern="0" cap="none" spc="0" normalizeH="0" baseline="0" noProof="0" dirty="0">
               <a:ln>
@@ -13169,20 +12529,12 @@
               <a:buChar char="•"/>
             </a:pPr>
             <a:r>
-              <a:rPr lang="en-US" dirty="0" smtClean="0">
+              <a:rPr lang="en-US" dirty="0">
                 <a:solidFill>
                   <a:srgbClr val="454545"/>
                 </a:solidFill>
               </a:rPr>
-              <a:t>Commit </a:t>
-            </a:r>
-            <a:r>
-              <a:rPr lang="en-US" dirty="0">
-                <a:solidFill>
-                  <a:srgbClr val="454545"/>
-                </a:solidFill>
-              </a:rPr>
-              <a:t>to {NUMBER of hours}/{NUMBER} interviews each for round one.</a:t>
+              <a:t>Commit to {NUMBER of hours}/{NUMBER} interviews each for round one.</a:t>
             </a:r>
           </a:p>
           <a:p>
@@ -13212,31 +12564,15 @@
                   <a:srgbClr val="454545"/>
                 </a:solidFill>
               </a:rPr>
-              <a:t>, second interviews </a:t>
-            </a:r>
-            <a:r>
-              <a:rPr lang="en-US" dirty="0" smtClean="0">
+              <a:t>, second interviews {X}</a:t>
+            </a:r>
+            <a:r>
+              <a:rPr lang="en-US" b="1" dirty="0">
                 <a:solidFill>
                   <a:srgbClr val="454545"/>
                 </a:solidFill>
               </a:rPr>
-              <a:t>{X}</a:t>
-            </a:r>
-            <a:r>
-              <a:rPr lang="en-US" b="1" dirty="0" smtClean="0">
-                <a:solidFill>
-                  <a:srgbClr val="454545"/>
-                </a:solidFill>
-              </a:rPr>
-              <a:t> </a:t>
-            </a:r>
-            <a:r>
-              <a:rPr lang="en-US" b="1" dirty="0">
-                <a:solidFill>
-                  <a:srgbClr val="454545"/>
-                </a:solidFill>
-              </a:rPr>
-              <a:t>minutes</a:t>
+              <a:t> minutes</a:t>
             </a:r>
             <a:r>
               <a:rPr lang="en-US" dirty="0">
@@ -13267,7 +12603,7 @@
               <a:buChar char="•"/>
             </a:pPr>
             <a:r>
-              <a:rPr lang="en-US" dirty="0" smtClean="0"/>
+              <a:rPr lang="en-US" dirty="0"/>
               <a:t>Plan </a:t>
             </a:r>
             <a:r>
@@ -13467,7 +12803,7 @@
               <a:defRPr/>
             </a:pPr>
             <a:r>
-              <a:rPr kumimoji="0" lang="en-US" sz="3600" b="0" i="0" u="none" strike="noStrike" kern="0" cap="none" spc="0" normalizeH="0" baseline="0" noProof="0" dirty="0" smtClean="0">
+              <a:rPr kumimoji="0" lang="en-US" sz="3600" b="0" i="0" u="none" strike="noStrike" kern="0" cap="none" spc="0" normalizeH="0" baseline="0" noProof="0" dirty="0">
                 <a:ln>
                   <a:noFill/>
                 </a:ln>
@@ -13484,7 +12820,7 @@
               <a:t>Make</a:t>
             </a:r>
             <a:r>
-              <a:rPr kumimoji="0" lang="en-US" sz="3600" b="0" i="0" u="none" strike="noStrike" kern="0" cap="none" spc="0" normalizeH="0" noProof="0" dirty="0" smtClean="0">
+              <a:rPr kumimoji="0" lang="en-US" sz="3600" b="0" i="0" u="none" strike="noStrike" kern="0" cap="none" spc="0" normalizeH="0" noProof="0" dirty="0">
                 <a:ln>
                   <a:noFill/>
                 </a:ln>
@@ -13571,7 +12907,7 @@
               <a:defRPr/>
             </a:pPr>
             <a:r>
-              <a:rPr kumimoji="0" lang="en-US" sz="3600" b="0" i="0" u="none" strike="noStrike" kern="0" cap="none" spc="0" normalizeH="0" baseline="0" noProof="0" dirty="0" smtClean="0">
+              <a:rPr kumimoji="0" lang="en-US" sz="3600" b="0" i="0" u="none" strike="noStrike" kern="0" cap="none" spc="0" normalizeH="0" baseline="0" noProof="0" dirty="0">
                 <a:ln>
                   <a:noFill/>
                 </a:ln>
@@ -13585,58 +12921,7 @@
                 <a:cs typeface="Arial"/>
                 <a:sym typeface="Arial"/>
               </a:rPr>
-              <a:t>[Name of POC] </a:t>
-            </a:r>
-            <a:r>
-              <a:rPr kumimoji="0" lang="en-US" sz="3600" b="0" i="0" u="none" strike="noStrike" kern="0" cap="none" spc="0" normalizeH="0" baseline="0" noProof="0" dirty="0">
-                <a:ln>
-                  <a:noFill/>
-                </a:ln>
-                <a:solidFill>
-                  <a:srgbClr val="454545"/>
-                </a:solidFill>
-                <a:effectLst/>
-                <a:uLnTx/>
-                <a:uFillTx/>
-                <a:latin typeface="Arial"/>
-                <a:cs typeface="Arial"/>
-                <a:sym typeface="Arial"/>
-              </a:rPr>
-              <a:t>will mark your calendar with the confirmed interview. Once all interviews been </a:t>
-            </a:r>
-            <a:r>
-              <a:rPr kumimoji="0" lang="en-US" sz="3600" b="0" i="0" u="none" strike="noStrike" kern="0" cap="none" spc="0" normalizeH="0" baseline="0" noProof="0" dirty="0" smtClean="0">
-                <a:ln>
-                  <a:noFill/>
-                </a:ln>
-                <a:solidFill>
-                  <a:srgbClr val="454545"/>
-                </a:solidFill>
-                <a:effectLst/>
-                <a:uLnTx/>
-                <a:uFillTx/>
-                <a:latin typeface="Arial"/>
-                <a:cs typeface="Arial"/>
-                <a:sym typeface="Arial"/>
-              </a:rPr>
-              <a:t>scheduled with ‘interview 1’  or ‘interview 2’, </a:t>
-            </a:r>
-            <a:r>
-              <a:rPr kumimoji="0" lang="en-US" sz="3600" b="0" i="0" u="none" strike="noStrike" kern="0" cap="none" spc="0" normalizeH="0" baseline="0" noProof="0" dirty="0">
-                <a:ln>
-                  <a:noFill/>
-                </a:ln>
-                <a:solidFill>
-                  <a:srgbClr val="454545"/>
-                </a:solidFill>
-                <a:effectLst/>
-                <a:uLnTx/>
-                <a:uFillTx/>
-                <a:latin typeface="Arial"/>
-                <a:cs typeface="Arial"/>
-                <a:sym typeface="Arial"/>
-              </a:rPr>
-              <a:t>you can release the rest of your calendar holds. </a:t>
+              <a:t>[Name of POC] will mark your calendar with the confirmed interview. Once all interviews been scheduled with ‘interview 1’  or ‘interview 2’, you can release the rest of your calendar holds. </a:t>
             </a:r>
           </a:p>
         </p:txBody>
@@ -13694,27 +12979,18 @@
           <a:p>
             <a:r>
               <a:rPr lang="en-US" dirty="0"/>
-              <a:t>This is an examination. You are testing their knowledge of the pre-defined competencies</a:t>
-            </a:r>
-            <a:r>
-              <a:rPr lang="en-US" dirty="0" smtClean="0"/>
-              <a:t>.</a:t>
-            </a:r>
-            <a:br>
-              <a:rPr lang="en-US" dirty="0" smtClean="0"/>
-            </a:br>
-            <a:r>
-              <a:rPr lang="en-US" dirty="0"/>
-              <a:t/>
+              <a:t>This is an examination. You are testing their knowledge of the pre-defined competencies.</a:t>
             </a:r>
             <a:br>
               <a:rPr lang="en-US" dirty="0"/>
             </a:br>
-            <a:r>
-              <a:rPr lang="en-US" dirty="0" smtClean="0"/>
+            <a:br>
+              <a:rPr lang="en-US" dirty="0"/>
+            </a:br>
+            <a:r>
+              <a:rPr lang="en-US" dirty="0"/>
               <a:t>Everyone must get the same script and the same time. </a:t>
             </a:r>
-            <a:endParaRPr lang="en-US" dirty="0"/>
           </a:p>
         </p:txBody>
       </p:sp>
@@ -13835,29 +13111,7 @@
                 <a:ea typeface="Source Sans Pro SemiBold" panose="020B0503030403020204" pitchFamily="34" charset="0"/>
                 <a:cs typeface="Arial" panose="020B0604020202020204" pitchFamily="34" charset="0"/>
               </a:rPr>
-              <a:t>Follow-Up vs Probe </a:t>
-            </a:r>
-            <a:r>
-              <a:rPr lang="en-US" sz="3600" b="1" cap="all" dirty="0" smtClean="0">
-                <a:solidFill>
-                  <a:schemeClr val="tx2"/>
-                </a:solidFill>
-                <a:latin typeface="Arial" panose="020B0604020202020204" pitchFamily="34" charset="0"/>
-                <a:ea typeface="Source Sans Pro SemiBold" panose="020B0503030403020204" pitchFamily="34" charset="0"/>
-                <a:cs typeface="Arial" panose="020B0604020202020204" pitchFamily="34" charset="0"/>
-              </a:rPr>
-              <a:t>Question</a:t>
-            </a:r>
-            <a:r>
-              <a:rPr lang="en-US" sz="3600" b="1" cap="all" dirty="0">
-                <a:solidFill>
-                  <a:schemeClr val="tx2"/>
-                </a:solidFill>
-                <a:latin typeface="Arial" panose="020B0604020202020204" pitchFamily="34" charset="0"/>
-                <a:ea typeface="Source Sans Pro SemiBold" panose="020B0503030403020204" pitchFamily="34" charset="0"/>
-                <a:cs typeface="Arial" panose="020B0604020202020204" pitchFamily="34" charset="0"/>
-              </a:rPr>
-              <a:t/>
+              <a:t>Follow-Up vs Probe Question</a:t>
             </a:r>
             <a:br>
               <a:rPr lang="en-US" sz="3600" b="1" cap="all" dirty="0">
@@ -13869,17 +13123,6 @@
                 <a:cs typeface="Arial" panose="020B0604020202020204" pitchFamily="34" charset="0"/>
               </a:rPr>
             </a:br>
-            <a:r>
-              <a:rPr lang="en-US" sz="3600" b="1" cap="all" dirty="0">
-                <a:solidFill>
-                  <a:schemeClr val="tx2"/>
-                </a:solidFill>
-                <a:latin typeface="Arial" panose="020B0604020202020204" pitchFamily="34" charset="0"/>
-                <a:ea typeface="Source Sans Pro SemiBold" panose="020B0503030403020204" pitchFamily="34" charset="0"/>
-                <a:cs typeface="Arial" panose="020B0604020202020204" pitchFamily="34" charset="0"/>
-              </a:rPr>
-              <a:t/>
-            </a:r>
             <a:br>
               <a:rPr lang="en-US" sz="3600" b="1" cap="all" dirty="0">
                 <a:solidFill>
@@ -13891,7 +13134,7 @@
               </a:rPr>
             </a:br>
             <a:r>
-              <a:rPr lang="en-US" sz="2700" b="1" dirty="0" err="1" smtClean="0">
+              <a:rPr lang="en-US" sz="2700" b="1" dirty="0" err="1">
                 <a:solidFill>
                   <a:srgbClr val="000000"/>
                 </a:solidFill>
@@ -13899,20 +13142,12 @@
               <a:t>Question</a:t>
             </a:r>
             <a:r>
-              <a:rPr lang="en-US" sz="2700" b="1" dirty="0" smtClean="0">
+              <a:rPr lang="en-US" sz="2700" b="1" dirty="0">
                 <a:solidFill>
                   <a:srgbClr val="000000"/>
                 </a:solidFill>
               </a:rPr>
-              <a:t> </a:t>
-            </a:r>
-            <a:r>
-              <a:rPr lang="en-US" sz="2700" b="1" dirty="0">
-                <a:solidFill>
-                  <a:srgbClr val="000000"/>
-                </a:solidFill>
-              </a:rPr>
-              <a:t>1: </a:t>
+              <a:t> 1: </a:t>
             </a:r>
             <a:r>
               <a:rPr lang="en-US" sz="2700" b="1" i="1" dirty="0">
@@ -13922,14 +13157,6 @@
               </a:rPr>
               <a:t>(Required)</a:t>
             </a:r>
-            <a:r>
-              <a:rPr lang="en-US" sz="2700" dirty="0">
-                <a:solidFill>
-                  <a:srgbClr val="000000"/>
-                </a:solidFill>
-              </a:rPr>
-              <a:t/>
-            </a:r>
             <a:br>
               <a:rPr lang="en-US" sz="2700" dirty="0">
                 <a:solidFill>
@@ -13937,14 +13164,6 @@
                 </a:solidFill>
               </a:rPr>
             </a:br>
-            <a:r>
-              <a:rPr lang="en-US" sz="2700" dirty="0">
-                <a:solidFill>
-                  <a:srgbClr val="000000"/>
-                </a:solidFill>
-              </a:rPr>
-              <a:t/>
-            </a:r>
             <a:br>
               <a:rPr lang="en-US" sz="2700" dirty="0">
                 <a:solidFill>
@@ -13953,36 +13172,12 @@
               </a:rPr>
             </a:br>
             <a:r>
-              <a:rPr lang="en-US" sz="2700" dirty="0" smtClean="0">
+              <a:rPr lang="en-US" sz="2700" dirty="0">
                 <a:solidFill>
                   <a:srgbClr val="000000"/>
                 </a:solidFill>
               </a:rPr>
-              <a:t>	Tell </a:t>
-            </a:r>
-            <a:r>
-              <a:rPr lang="en-US" sz="2700" dirty="0">
-                <a:solidFill>
-                  <a:srgbClr val="000000"/>
-                </a:solidFill>
-              </a:rPr>
-              <a:t>me about a time you had to overcome a stakeholder </a:t>
-            </a:r>
-            <a:r>
-              <a:rPr lang="en-US" sz="2700" dirty="0" smtClean="0">
-                <a:solidFill>
-                  <a:srgbClr val="000000"/>
-                </a:solidFill>
-              </a:rPr>
-              <a:t>challenge.</a:t>
-            </a:r>
-            <a:r>
-              <a:rPr lang="en-US" sz="2700" dirty="0">
-                <a:solidFill>
-                  <a:srgbClr val="000000"/>
-                </a:solidFill>
-              </a:rPr>
-              <a:t/>
+              <a:t>	Tell me about a time you had to overcome a stakeholder challenge.</a:t>
             </a:r>
             <a:br>
               <a:rPr lang="en-US" sz="2700" dirty="0">
@@ -13991,14 +13186,6 @@
                 </a:solidFill>
               </a:rPr>
             </a:br>
-            <a:r>
-              <a:rPr lang="en-US" sz="2700" dirty="0">
-                <a:solidFill>
-                  <a:srgbClr val="000000"/>
-                </a:solidFill>
-              </a:rPr>
-              <a:t/>
-            </a:r>
             <a:br>
               <a:rPr lang="en-US" sz="2700" dirty="0">
                 <a:solidFill>
@@ -14022,14 +13209,6 @@
               </a:rPr>
               <a:t>(required if not covered in the response):</a:t>
             </a:r>
-            <a:r>
-              <a:rPr lang="en-US" sz="2700" dirty="0">
-                <a:solidFill>
-                  <a:srgbClr val="000000"/>
-                </a:solidFill>
-              </a:rPr>
-              <a:t/>
-            </a:r>
             <a:br>
               <a:rPr lang="en-US" sz="2700" dirty="0">
                 <a:solidFill>
@@ -14053,36 +13232,12 @@
               </a:rPr>
             </a:br>
             <a:r>
-              <a:rPr lang="en-US" sz="2700" dirty="0" smtClean="0">
+              <a:rPr lang="en-US" sz="2700" dirty="0">
                 <a:solidFill>
                   <a:srgbClr val="000000"/>
                 </a:solidFill>
               </a:rPr>
-              <a:t>	What </a:t>
-            </a:r>
-            <a:r>
-              <a:rPr lang="en-US" sz="2700" dirty="0">
-                <a:solidFill>
-                  <a:srgbClr val="000000"/>
-                </a:solidFill>
-              </a:rPr>
-              <a:t>were the results</a:t>
-            </a:r>
-            <a:r>
-              <a:rPr lang="en-US" sz="2700" dirty="0" smtClean="0">
-                <a:solidFill>
-                  <a:srgbClr val="000000"/>
-                </a:solidFill>
-              </a:rPr>
-              <a:t>? </a:t>
-            </a:r>
-            <a:r>
-              <a:rPr lang="en-US" sz="2700" dirty="0">
-                <a:solidFill>
-                  <a:srgbClr val="000000"/>
-                </a:solidFill>
-              </a:rPr>
-              <a:t/>
+              <a:t>	What were the results? </a:t>
             </a:r>
             <a:br>
               <a:rPr lang="en-US" sz="2700" dirty="0">
@@ -14091,14 +13246,6 @@
                 </a:solidFill>
               </a:rPr>
             </a:br>
-            <a:r>
-              <a:rPr lang="en-US" sz="2700" dirty="0">
-                <a:solidFill>
-                  <a:srgbClr val="000000"/>
-                </a:solidFill>
-              </a:rPr>
-              <a:t/>
-            </a:r>
             <a:br>
               <a:rPr lang="en-US" sz="2700" dirty="0">
                 <a:solidFill>
@@ -14114,14 +13261,6 @@
               </a:rPr>
               <a:t>Probe questions (Optional): </a:t>
             </a:r>
-            <a:r>
-              <a:rPr lang="en-US" sz="2700" dirty="0">
-                <a:solidFill>
-                  <a:srgbClr val="000000"/>
-                </a:solidFill>
-              </a:rPr>
-              <a:t/>
-            </a:r>
             <a:br>
               <a:rPr lang="en-US" sz="2700" dirty="0">
                 <a:solidFill>
@@ -14220,16 +13359,8 @@
               </a:rPr>
               <a:t>	</a:t>
             </a:r>
-            <a:r>
-              <a:rPr lang="en-US" sz="2700" dirty="0" smtClean="0">
-                <a:solidFill>
-                  <a:srgbClr val="000000"/>
-                </a:solidFill>
-              </a:rPr>
-              <a:t/>
-            </a:r>
             <a:br>
-              <a:rPr lang="en-US" sz="2700" dirty="0" smtClean="0">
+              <a:rPr lang="en-US" sz="2700" dirty="0">
                 <a:solidFill>
                   <a:srgbClr val="000000"/>
                 </a:solidFill>
@@ -14242,19 +13373,8 @@
             <a:br>
               <a:rPr lang="en-US" sz="3600" dirty="0"/>
             </a:br>
-            <a:r>
-              <a:rPr lang="en-US" sz="3600" b="1" cap="all" dirty="0" smtClean="0">
-                <a:solidFill>
-                  <a:schemeClr val="tx2"/>
-                </a:solidFill>
-                <a:latin typeface="Arial" panose="020B0604020202020204" pitchFamily="34" charset="0"/>
-                <a:ea typeface="Source Sans Pro SemiBold" panose="020B0503030403020204" pitchFamily="34" charset="0"/>
-                <a:cs typeface="Arial" panose="020B0604020202020204" pitchFamily="34" charset="0"/>
-              </a:rPr>
-              <a:t/>
-            </a:r>
             <a:br>
-              <a:rPr lang="en-US" sz="3600" b="1" cap="all" dirty="0" smtClean="0">
+              <a:rPr lang="en-US" sz="3600" b="1" cap="all" dirty="0">
                 <a:solidFill>
                   <a:schemeClr val="tx2"/>
                 </a:solidFill>

</xml_diff>